<commit_message>
Working on L03 shiz
</commit_message>
<xml_diff>
--- a/Blank/Lecture_03_ Tokenization.pptx
+++ b/Blank/Lecture_03_ Tokenization.pptx
@@ -23,6 +23,10 @@
     <p:sldId id="268" r:id="rId17"/>
     <p:sldId id="269" r:id="rId18"/>
     <p:sldId id="270" r:id="rId19"/>
+    <p:sldId id="271" r:id="rId20"/>
+    <p:sldId id="272" r:id="rId21"/>
+    <p:sldId id="273" r:id="rId22"/>
+    <p:sldId id="274" r:id="rId23"/>
   </p:sldIdLst>
   <p:sldSz cy="6858000" cx="9144000"/>
   <p:notesSz cx="6858000" cy="9144000"/>
@@ -257,7 +261,7 @@
   </p:defaultTextStyle>
   <p:extLst>
     <p:ext uri="GoogleSlidesCustomDataVersion2">
-      <go:slidesCustomData xmlns:go="http://customooxmlschemas.google.com/" r:id="rId20" roundtripDataSignature="AMtx7mgIGfWeGNaij6N1bRhtuTPJ4+V87g=="/>
+      <go:slidesCustomData xmlns:go="http://customooxmlschemas.google.com/" r:id="rId24" roundtripDataSignature="AMtx7mjNowJRmbtirrXgmjhBxZgqEWbJfw=="/>
     </p:ext>
   </p:extLst>
 </p:presentation>
@@ -1338,7 +1342,7 @@
       </p:grpSpPr>
       <p:sp>
         <p:nvSpPr>
-          <p:cNvPr id="120" name="Google Shape;120;g3b8409de4d6_0_40:notes"/>
+          <p:cNvPr id="120" name="Google Shape;120;g3b8409de4d6_0_103:notes"/>
           <p:cNvSpPr/>
           <p:nvPr>
             <p:ph idx="2" type="sldImg"/>
@@ -1373,7 +1377,7 @@
       </p:sp>
       <p:sp>
         <p:nvSpPr>
-          <p:cNvPr id="121" name="Google Shape;121;g3b8409de4d6_0_40:notes"/>
+          <p:cNvPr id="121" name="Google Shape;121;g3b8409de4d6_0_103:notes"/>
           <p:cNvSpPr txBox="1"/>
           <p:nvPr>
             <p:ph idx="1" type="body"/>
@@ -1437,7 +1441,124 @@
       </p:grpSpPr>
       <p:sp>
         <p:nvSpPr>
-          <p:cNvPr id="126" name="Google Shape;126;g3b8409de4d6_0_90:notes"/>
+          <p:cNvPr id="126" name="Google Shape;126;g3b8409de4d6_0_95:notes"/>
+          <p:cNvSpPr/>
+          <p:nvPr>
+            <p:ph idx="2" type="sldImg"/>
+          </p:nvPr>
+        </p:nvSpPr>
+        <p:spPr>
+          <a:xfrm>
+            <a:off x="1143309" y="685800"/>
+            <a:ext cx="4572000" cy="3429000"/>
+          </a:xfrm>
+          <a:custGeom>
+            <a:rect b="b" l="l" r="r" t="t"/>
+            <a:pathLst>
+              <a:path extrusionOk="0" h="120000" w="120000">
+                <a:moveTo>
+                  <a:pt x="0" y="0"/>
+                </a:moveTo>
+                <a:lnTo>
+                  <a:pt x="120000" y="0"/>
+                </a:lnTo>
+                <a:lnTo>
+                  <a:pt x="120000" y="120000"/>
+                </a:lnTo>
+                <a:lnTo>
+                  <a:pt x="0" y="120000"/>
+                </a:lnTo>
+                <a:close/>
+              </a:path>
+            </a:pathLst>
+          </a:custGeom>
+          <a:noFill/>
+          <a:ln cap="flat" cmpd="sng" w="9525">
+            <a:solidFill>
+              <a:srgbClr val="000000"/>
+            </a:solidFill>
+            <a:prstDash val="solid"/>
+            <a:round/>
+            <a:headEnd len="sm" w="sm" type="none"/>
+            <a:tailEnd len="sm" w="sm" type="none"/>
+          </a:ln>
+        </p:spPr>
+      </p:sp>
+      <p:sp>
+        <p:nvSpPr>
+          <p:cNvPr id="127" name="Google Shape;127;g3b8409de4d6_0_95:notes"/>
+          <p:cNvSpPr txBox="1"/>
+          <p:nvPr>
+            <p:ph idx="1" type="body"/>
+          </p:nvPr>
+        </p:nvSpPr>
+        <p:spPr>
+          <a:xfrm>
+            <a:off x="685800" y="4343400"/>
+            <a:ext cx="5486400" cy="4114800"/>
+          </a:xfrm>
+          <a:prstGeom prst="rect">
+            <a:avLst/>
+          </a:prstGeom>
+          <a:noFill/>
+          <a:ln>
+            <a:noFill/>
+          </a:ln>
+        </p:spPr>
+        <p:txBody>
+          <a:bodyPr anchorCtr="0" anchor="t" bIns="91425" lIns="91425" spcFirstLastPara="1" rIns="91425" wrap="square" tIns="91425">
+            <a:noAutofit/>
+          </a:bodyPr>
+          <a:lstStyle/>
+          <a:p>
+            <a:pPr indent="0" lvl="0" marL="0" rtl="0" algn="l">
+              <a:lnSpc>
+                <a:spcPct val="100000"/>
+              </a:lnSpc>
+              <a:spcBef>
+                <a:spcPts val="0"/>
+              </a:spcBef>
+              <a:spcAft>
+                <a:spcPts val="0"/>
+              </a:spcAft>
+              <a:buSzPts val="1400"/>
+              <a:buNone/>
+            </a:pPr>
+            <a:r>
+              <a:t/>
+            </a:r>
+            <a:endParaRPr/>
+          </a:p>
+        </p:txBody>
+      </p:sp>
+    </p:spTree>
+  </p:cSld>
+  <p:clrMapOvr>
+    <a:masterClrMapping/>
+  </p:clrMapOvr>
+</p:notes>
+</file>
+
+<file path=ppt/notesSlides/notesSlide16.xml><?xml version="1.0" encoding="utf-8"?>
+<p:notes xmlns:a="http://schemas.openxmlformats.org/drawingml/2006/main" xmlns:r="http://schemas.openxmlformats.org/officeDocument/2006/relationships" xmlns:mc="http://schemas.openxmlformats.org/markup-compatibility/2006" xmlns:mv="urn:schemas-microsoft-com:mac:vml" xmlns:p="http://schemas.openxmlformats.org/presentationml/2006/main" xmlns:c="http://schemas.openxmlformats.org/drawingml/2006/chart" xmlns:dgm="http://schemas.openxmlformats.org/drawingml/2006/diagram" xmlns:o="urn:schemas-microsoft-com:office:office" xmlns:v="urn:schemas-microsoft-com:vml" xmlns:pvml="urn:schemas-microsoft-com:office:powerpoint" xmlns:com="http://schemas.openxmlformats.org/drawingml/2006/compatibility" xmlns:p14="http://schemas.microsoft.com/office/powerpoint/2010/main" xmlns:p15="http://schemas.microsoft.com/office/powerpoint/2012/main" xmlns:ahyp="http://schemas.microsoft.com/office/drawing/2018/hyperlinkcolor" showMasterPhAnim="0" showMasterSp="0">
+  <p:cSld>
+    <p:spTree>
+      <p:nvGrpSpPr>
+        <p:cNvPr id="134" name="Shape 134"/>
+        <p:cNvGrpSpPr/>
+        <p:nvPr/>
+      </p:nvGrpSpPr>
+      <p:grpSpPr>
+        <a:xfrm>
+          <a:off x="0" y="0"/>
+          <a:ext cx="0" cy="0"/>
+          <a:chOff x="0" y="0"/>
+          <a:chExt cx="0" cy="0"/>
+        </a:xfrm>
+      </p:grpSpPr>
+      <p:sp>
+        <p:nvSpPr>
+          <p:cNvPr id="135" name="Google Shape;135;g3b8409de4d6_0_40:notes"/>
           <p:cNvSpPr/>
           <p:nvPr>
             <p:ph idx="2" type="sldImg"/>
@@ -1472,7 +1593,304 @@
       </p:sp>
       <p:sp>
         <p:nvSpPr>
-          <p:cNvPr id="127" name="Google Shape;127;g3b8409de4d6_0_90:notes"/>
+          <p:cNvPr id="136" name="Google Shape;136;g3b8409de4d6_0_40:notes"/>
+          <p:cNvSpPr txBox="1"/>
+          <p:nvPr>
+            <p:ph idx="1" type="body"/>
+          </p:nvPr>
+        </p:nvSpPr>
+        <p:spPr>
+          <a:xfrm>
+            <a:off x="685800" y="4343400"/>
+            <a:ext cx="5486400" cy="4114800"/>
+          </a:xfrm>
+          <a:prstGeom prst="rect">
+            <a:avLst/>
+          </a:prstGeom>
+        </p:spPr>
+        <p:txBody>
+          <a:bodyPr anchorCtr="0" anchor="t" bIns="91425" lIns="91425" spcFirstLastPara="1" rIns="91425" wrap="square" tIns="91425">
+            <a:noAutofit/>
+          </a:bodyPr>
+          <a:lstStyle/>
+          <a:p>
+            <a:pPr indent="0" lvl="0" marL="0" rtl="0" algn="l">
+              <a:spcBef>
+                <a:spcPts val="0"/>
+              </a:spcBef>
+              <a:spcAft>
+                <a:spcPts val="0"/>
+              </a:spcAft>
+              <a:buNone/>
+            </a:pPr>
+            <a:r>
+              <a:t/>
+            </a:r>
+            <a:endParaRPr/>
+          </a:p>
+        </p:txBody>
+      </p:sp>
+    </p:spTree>
+  </p:cSld>
+  <p:clrMapOvr>
+    <a:masterClrMapping/>
+  </p:clrMapOvr>
+</p:notes>
+</file>
+
+<file path=ppt/notesSlides/notesSlide17.xml><?xml version="1.0" encoding="utf-8"?>
+<p:notes xmlns:a="http://schemas.openxmlformats.org/drawingml/2006/main" xmlns:r="http://schemas.openxmlformats.org/officeDocument/2006/relationships" xmlns:mc="http://schemas.openxmlformats.org/markup-compatibility/2006" xmlns:mv="urn:schemas-microsoft-com:mac:vml" xmlns:p="http://schemas.openxmlformats.org/presentationml/2006/main" xmlns:c="http://schemas.openxmlformats.org/drawingml/2006/chart" xmlns:dgm="http://schemas.openxmlformats.org/drawingml/2006/diagram" xmlns:o="urn:schemas-microsoft-com:office:office" xmlns:v="urn:schemas-microsoft-com:vml" xmlns:pvml="urn:schemas-microsoft-com:office:powerpoint" xmlns:com="http://schemas.openxmlformats.org/drawingml/2006/compatibility" xmlns:p14="http://schemas.microsoft.com/office/powerpoint/2010/main" xmlns:p15="http://schemas.microsoft.com/office/powerpoint/2012/main" xmlns:ahyp="http://schemas.microsoft.com/office/drawing/2018/hyperlinkcolor" showMasterPhAnim="0" showMasterSp="0">
+  <p:cSld>
+    <p:spTree>
+      <p:nvGrpSpPr>
+        <p:cNvPr id="140" name="Shape 140"/>
+        <p:cNvGrpSpPr/>
+        <p:nvPr/>
+      </p:nvGrpSpPr>
+      <p:grpSpPr>
+        <a:xfrm>
+          <a:off x="0" y="0"/>
+          <a:ext cx="0" cy="0"/>
+          <a:chOff x="0" y="0"/>
+          <a:chExt cx="0" cy="0"/>
+        </a:xfrm>
+      </p:grpSpPr>
+      <p:sp>
+        <p:nvSpPr>
+          <p:cNvPr id="141" name="Google Shape;141;g3b8409de4d6_0_118:notes"/>
+          <p:cNvSpPr/>
+          <p:nvPr>
+            <p:ph idx="2" type="sldImg"/>
+          </p:nvPr>
+        </p:nvSpPr>
+        <p:spPr>
+          <a:xfrm>
+            <a:off x="1143309" y="685800"/>
+            <a:ext cx="4572000" cy="3429000"/>
+          </a:xfrm>
+          <a:custGeom>
+            <a:rect b="b" l="l" r="r" t="t"/>
+            <a:pathLst>
+              <a:path extrusionOk="0" h="120000" w="120000">
+                <a:moveTo>
+                  <a:pt x="0" y="0"/>
+                </a:moveTo>
+                <a:lnTo>
+                  <a:pt x="120000" y="0"/>
+                </a:lnTo>
+                <a:lnTo>
+                  <a:pt x="120000" y="120000"/>
+                </a:lnTo>
+                <a:lnTo>
+                  <a:pt x="0" y="120000"/>
+                </a:lnTo>
+                <a:close/>
+              </a:path>
+            </a:pathLst>
+          </a:custGeom>
+        </p:spPr>
+      </p:sp>
+      <p:sp>
+        <p:nvSpPr>
+          <p:cNvPr id="142" name="Google Shape;142;g3b8409de4d6_0_118:notes"/>
+          <p:cNvSpPr txBox="1"/>
+          <p:nvPr>
+            <p:ph idx="1" type="body"/>
+          </p:nvPr>
+        </p:nvSpPr>
+        <p:spPr>
+          <a:xfrm>
+            <a:off x="685800" y="4343400"/>
+            <a:ext cx="5486400" cy="4114800"/>
+          </a:xfrm>
+          <a:prstGeom prst="rect">
+            <a:avLst/>
+          </a:prstGeom>
+        </p:spPr>
+        <p:txBody>
+          <a:bodyPr anchorCtr="0" anchor="t" bIns="91425" lIns="91425" spcFirstLastPara="1" rIns="91425" wrap="square" tIns="91425">
+            <a:noAutofit/>
+          </a:bodyPr>
+          <a:lstStyle/>
+          <a:p>
+            <a:pPr indent="0" lvl="0" marL="0" rtl="0" algn="l">
+              <a:spcBef>
+                <a:spcPts val="0"/>
+              </a:spcBef>
+              <a:spcAft>
+                <a:spcPts val="0"/>
+              </a:spcAft>
+              <a:buNone/>
+            </a:pPr>
+            <a:r>
+              <a:t/>
+            </a:r>
+            <a:endParaRPr/>
+          </a:p>
+        </p:txBody>
+      </p:sp>
+    </p:spTree>
+  </p:cSld>
+  <p:clrMapOvr>
+    <a:masterClrMapping/>
+  </p:clrMapOvr>
+</p:notes>
+</file>
+
+<file path=ppt/notesSlides/notesSlide18.xml><?xml version="1.0" encoding="utf-8"?>
+<p:notes xmlns:a="http://schemas.openxmlformats.org/drawingml/2006/main" xmlns:r="http://schemas.openxmlformats.org/officeDocument/2006/relationships" xmlns:mc="http://schemas.openxmlformats.org/markup-compatibility/2006" xmlns:mv="urn:schemas-microsoft-com:mac:vml" xmlns:p="http://schemas.openxmlformats.org/presentationml/2006/main" xmlns:c="http://schemas.openxmlformats.org/drawingml/2006/chart" xmlns:dgm="http://schemas.openxmlformats.org/drawingml/2006/diagram" xmlns:o="urn:schemas-microsoft-com:office:office" xmlns:v="urn:schemas-microsoft-com:vml" xmlns:pvml="urn:schemas-microsoft-com:office:powerpoint" xmlns:com="http://schemas.openxmlformats.org/drawingml/2006/compatibility" xmlns:p14="http://schemas.microsoft.com/office/powerpoint/2010/main" xmlns:p15="http://schemas.microsoft.com/office/powerpoint/2012/main" xmlns:ahyp="http://schemas.microsoft.com/office/drawing/2018/hyperlinkcolor" showMasterPhAnim="0" showMasterSp="0">
+  <p:cSld>
+    <p:spTree>
+      <p:nvGrpSpPr>
+        <p:cNvPr id="146" name="Shape 146"/>
+        <p:cNvGrpSpPr/>
+        <p:nvPr/>
+      </p:nvGrpSpPr>
+      <p:grpSpPr>
+        <a:xfrm>
+          <a:off x="0" y="0"/>
+          <a:ext cx="0" cy="0"/>
+          <a:chOff x="0" y="0"/>
+          <a:chExt cx="0" cy="0"/>
+        </a:xfrm>
+      </p:grpSpPr>
+      <p:sp>
+        <p:nvSpPr>
+          <p:cNvPr id="147" name="Google Shape;147;g3b8409de4d6_0_126:notes"/>
+          <p:cNvSpPr/>
+          <p:nvPr>
+            <p:ph idx="2" type="sldImg"/>
+          </p:nvPr>
+        </p:nvSpPr>
+        <p:spPr>
+          <a:xfrm>
+            <a:off x="1143309" y="685800"/>
+            <a:ext cx="4572000" cy="3429000"/>
+          </a:xfrm>
+          <a:custGeom>
+            <a:rect b="b" l="l" r="r" t="t"/>
+            <a:pathLst>
+              <a:path extrusionOk="0" h="120000" w="120000">
+                <a:moveTo>
+                  <a:pt x="0" y="0"/>
+                </a:moveTo>
+                <a:lnTo>
+                  <a:pt x="120000" y="0"/>
+                </a:lnTo>
+                <a:lnTo>
+                  <a:pt x="120000" y="120000"/>
+                </a:lnTo>
+                <a:lnTo>
+                  <a:pt x="0" y="120000"/>
+                </a:lnTo>
+                <a:close/>
+              </a:path>
+            </a:pathLst>
+          </a:custGeom>
+        </p:spPr>
+      </p:sp>
+      <p:sp>
+        <p:nvSpPr>
+          <p:cNvPr id="148" name="Google Shape;148;g3b8409de4d6_0_126:notes"/>
+          <p:cNvSpPr txBox="1"/>
+          <p:nvPr>
+            <p:ph idx="1" type="body"/>
+          </p:nvPr>
+        </p:nvSpPr>
+        <p:spPr>
+          <a:xfrm>
+            <a:off x="685800" y="4343400"/>
+            <a:ext cx="5486400" cy="4114800"/>
+          </a:xfrm>
+          <a:prstGeom prst="rect">
+            <a:avLst/>
+          </a:prstGeom>
+        </p:spPr>
+        <p:txBody>
+          <a:bodyPr anchorCtr="0" anchor="t" bIns="91425" lIns="91425" spcFirstLastPara="1" rIns="91425" wrap="square" tIns="91425">
+            <a:noAutofit/>
+          </a:bodyPr>
+          <a:lstStyle/>
+          <a:p>
+            <a:pPr indent="0" lvl="0" marL="0" rtl="0" algn="l">
+              <a:spcBef>
+                <a:spcPts val="0"/>
+              </a:spcBef>
+              <a:spcAft>
+                <a:spcPts val="0"/>
+              </a:spcAft>
+              <a:buNone/>
+            </a:pPr>
+            <a:r>
+              <a:t/>
+            </a:r>
+            <a:endParaRPr/>
+          </a:p>
+        </p:txBody>
+      </p:sp>
+    </p:spTree>
+  </p:cSld>
+  <p:clrMapOvr>
+    <a:masterClrMapping/>
+  </p:clrMapOvr>
+</p:notes>
+</file>
+
+<file path=ppt/notesSlides/notesSlide19.xml><?xml version="1.0" encoding="utf-8"?>
+<p:notes xmlns:a="http://schemas.openxmlformats.org/drawingml/2006/main" xmlns:r="http://schemas.openxmlformats.org/officeDocument/2006/relationships" xmlns:mc="http://schemas.openxmlformats.org/markup-compatibility/2006" xmlns:mv="urn:schemas-microsoft-com:mac:vml" xmlns:p="http://schemas.openxmlformats.org/presentationml/2006/main" xmlns:c="http://schemas.openxmlformats.org/drawingml/2006/chart" xmlns:dgm="http://schemas.openxmlformats.org/drawingml/2006/diagram" xmlns:o="urn:schemas-microsoft-com:office:office" xmlns:v="urn:schemas-microsoft-com:vml" xmlns:pvml="urn:schemas-microsoft-com:office:powerpoint" xmlns:com="http://schemas.openxmlformats.org/drawingml/2006/compatibility" xmlns:p14="http://schemas.microsoft.com/office/powerpoint/2010/main" xmlns:p15="http://schemas.microsoft.com/office/powerpoint/2012/main" xmlns:ahyp="http://schemas.microsoft.com/office/drawing/2018/hyperlinkcolor" showMasterPhAnim="0" showMasterSp="0">
+  <p:cSld>
+    <p:spTree>
+      <p:nvGrpSpPr>
+        <p:cNvPr id="152" name="Shape 152"/>
+        <p:cNvGrpSpPr/>
+        <p:nvPr/>
+      </p:nvGrpSpPr>
+      <p:grpSpPr>
+        <a:xfrm>
+          <a:off x="0" y="0"/>
+          <a:ext cx="0" cy="0"/>
+          <a:chOff x="0" y="0"/>
+          <a:chExt cx="0" cy="0"/>
+        </a:xfrm>
+      </p:grpSpPr>
+      <p:sp>
+        <p:nvSpPr>
+          <p:cNvPr id="153" name="Google Shape;153;g3b8409de4d6_0_108:notes"/>
+          <p:cNvSpPr/>
+          <p:nvPr>
+            <p:ph idx="2" type="sldImg"/>
+          </p:nvPr>
+        </p:nvSpPr>
+        <p:spPr>
+          <a:xfrm>
+            <a:off x="1143309" y="685800"/>
+            <a:ext cx="4572000" cy="3429000"/>
+          </a:xfrm>
+          <a:custGeom>
+            <a:rect b="b" l="l" r="r" t="t"/>
+            <a:pathLst>
+              <a:path extrusionOk="0" h="120000" w="120000">
+                <a:moveTo>
+                  <a:pt x="0" y="0"/>
+                </a:moveTo>
+                <a:lnTo>
+                  <a:pt x="120000" y="0"/>
+                </a:lnTo>
+                <a:lnTo>
+                  <a:pt x="120000" y="120000"/>
+                </a:lnTo>
+                <a:lnTo>
+                  <a:pt x="0" y="120000"/>
+                </a:lnTo>
+                <a:close/>
+              </a:path>
+            </a:pathLst>
+          </a:custGeom>
+        </p:spPr>
+      </p:sp>
+      <p:sp>
+        <p:nvSpPr>
+          <p:cNvPr id="154" name="Google Shape;154;g3b8409de4d6_0_108:notes"/>
           <p:cNvSpPr txBox="1"/>
           <p:nvPr>
             <p:ph idx="1" type="body"/>
@@ -7856,7 +8274,7 @@
       </p:grpSpPr>
       <p:sp>
         <p:nvSpPr>
-          <p:cNvPr id="123" name="Google Shape;123;g3b8409de4d6_0_40"/>
+          <p:cNvPr id="123" name="Google Shape;123;g3b8409de4d6_0_103"/>
           <p:cNvSpPr txBox="1"/>
           <p:nvPr>
             <p:ph type="title"/>
@@ -7887,20 +8305,40 @@
               <a:buNone/>
             </a:pPr>
             <a:r>
+              <a:rPr lang="en">
+                <a:solidFill>
+                  <a:srgbClr val="A31415"/>
+                </a:solidFill>
+                <a:latin typeface="Consolas"/>
+                <a:ea typeface="Consolas"/>
+                <a:cs typeface="Consolas"/>
+                <a:sym typeface="Consolas"/>
+              </a:rPr>
+              <a:t>p</a:t>
+            </a:r>
+            <a:r>
+              <a:rPr lang="en">
+                <a:solidFill>
+                  <a:srgbClr val="A31415"/>
+                </a:solidFill>
+                <a:latin typeface="Consolas"/>
+                <a:ea typeface="Consolas"/>
+                <a:cs typeface="Consolas"/>
+                <a:sym typeface="Consolas"/>
+              </a:rPr>
+              <a:t>rogramming</a:t>
+            </a:r>
+            <a:r>
               <a:rPr lang="en"/>
-              <a:t>Byte-Pair Encoding Tokenization </a:t>
-            </a:r>
-            <a:r>
-              <a:rPr lang="en" sz="1800"/>
-              <a:t>(1994)</a:t>
-            </a:r>
-            <a:endParaRPr sz="1800"/>
+              <a:t>: Classes</a:t>
+            </a:r>
+            <a:endParaRPr/>
           </a:p>
         </p:txBody>
       </p:sp>
       <p:sp>
         <p:nvSpPr>
-          <p:cNvPr id="124" name="Google Shape;124;g3b8409de4d6_0_40"/>
+          <p:cNvPr id="124" name="Google Shape;124;g3b8409de4d6_0_103"/>
           <p:cNvSpPr txBox="1"/>
           <p:nvPr>
             <p:ph idx="1" type="body"/>
@@ -7964,7 +8402,762 @@
       </p:grpSpPr>
       <p:sp>
         <p:nvSpPr>
-          <p:cNvPr id="129" name="Google Shape;129;g3b8409de4d6_0_90"/>
+          <p:cNvPr id="129" name="Google Shape;129;g3b8409de4d6_0_95"/>
+          <p:cNvSpPr txBox="1"/>
+          <p:nvPr>
+            <p:ph type="title"/>
+          </p:nvPr>
+        </p:nvSpPr>
+        <p:spPr>
+          <a:xfrm>
+            <a:off x="457200" y="274638"/>
+            <a:ext cx="8229600" cy="1143000"/>
+          </a:xfrm>
+          <a:prstGeom prst="rect">
+            <a:avLst/>
+          </a:prstGeom>
+          <a:noFill/>
+          <a:ln>
+            <a:noFill/>
+          </a:ln>
+        </p:spPr>
+        <p:txBody>
+          <a:bodyPr anchorCtr="0" anchor="b" bIns="91425" lIns="91425" spcFirstLastPara="1" rIns="91425" wrap="square" tIns="91425">
+            <a:noAutofit/>
+          </a:bodyPr>
+          <a:lstStyle/>
+          <a:p>
+            <a:pPr indent="0" lvl="0" marL="0" rtl="0" algn="l">
+              <a:lnSpc>
+                <a:spcPct val="100000"/>
+              </a:lnSpc>
+              <a:spcBef>
+                <a:spcPts val="0"/>
+              </a:spcBef>
+              <a:spcAft>
+                <a:spcPts val="0"/>
+              </a:spcAft>
+              <a:buSzPts val="3600"/>
+              <a:buNone/>
+            </a:pPr>
+            <a:r>
+              <a:rPr lang="en"/>
+              <a:t>Last Class - Text as Data</a:t>
+            </a:r>
+            <a:endParaRPr/>
+          </a:p>
+        </p:txBody>
+      </p:sp>
+      <p:sp>
+        <p:nvSpPr>
+          <p:cNvPr id="130" name="Google Shape;130;g3b8409de4d6_0_95"/>
+          <p:cNvSpPr txBox="1"/>
+          <p:nvPr>
+            <p:ph idx="1" type="body"/>
+          </p:nvPr>
+        </p:nvSpPr>
+        <p:spPr>
+          <a:xfrm>
+            <a:off x="457200" y="1765116"/>
+            <a:ext cx="3078000" cy="4459800"/>
+          </a:xfrm>
+          <a:prstGeom prst="rect">
+            <a:avLst/>
+          </a:prstGeom>
+          <a:noFill/>
+          <a:ln cap="flat" cmpd="sng" w="35550">
+            <a:solidFill>
+              <a:srgbClr val="002B5B"/>
+            </a:solidFill>
+            <a:prstDash val="solid"/>
+            <a:round/>
+            <a:headEnd len="sm" w="sm" type="none"/>
+            <a:tailEnd len="sm" w="sm" type="none"/>
+          </a:ln>
+        </p:spPr>
+        <p:txBody>
+          <a:bodyPr anchorCtr="0" anchor="t" bIns="85325" lIns="85325" spcFirstLastPara="1" rIns="85325" wrap="square" tIns="85325">
+            <a:noAutofit/>
+          </a:bodyPr>
+          <a:lstStyle/>
+          <a:p>
+            <a:pPr indent="0" lvl="0" marL="0" rtl="0" algn="l">
+              <a:lnSpc>
+                <a:spcPct val="100000"/>
+              </a:lnSpc>
+              <a:spcBef>
+                <a:spcPts val="560"/>
+              </a:spcBef>
+              <a:spcAft>
+                <a:spcPts val="0"/>
+              </a:spcAft>
+              <a:buSzPts val="2800"/>
+              <a:buNone/>
+            </a:pPr>
+            <a:r>
+              <a:rPr lang="en" sz="1120">
+                <a:latin typeface="Consolas"/>
+                <a:ea typeface="Consolas"/>
+                <a:cs typeface="Consolas"/>
+                <a:sym typeface="Consolas"/>
+              </a:rPr>
+              <a:t>"Jabberwocky"</a:t>
+            </a:r>
+            <a:endParaRPr sz="1120">
+              <a:latin typeface="Consolas"/>
+              <a:ea typeface="Consolas"/>
+              <a:cs typeface="Consolas"/>
+              <a:sym typeface="Consolas"/>
+            </a:endParaRPr>
+          </a:p>
+          <a:p>
+            <a:pPr indent="0" lvl="0" marL="0" rtl="0" algn="l">
+              <a:lnSpc>
+                <a:spcPct val="100000"/>
+              </a:lnSpc>
+              <a:spcBef>
+                <a:spcPts val="560"/>
+              </a:spcBef>
+              <a:spcAft>
+                <a:spcPts val="0"/>
+              </a:spcAft>
+              <a:buSzPts val="2800"/>
+              <a:buNone/>
+            </a:pPr>
+            <a:r>
+              <a:rPr lang="en" sz="1120">
+                <a:latin typeface="Consolas"/>
+                <a:ea typeface="Consolas"/>
+                <a:cs typeface="Consolas"/>
+                <a:sym typeface="Consolas"/>
+              </a:rPr>
+              <a:t>by Lewis Carroll</a:t>
+            </a:r>
+            <a:endParaRPr sz="1120">
+              <a:latin typeface="Consolas"/>
+              <a:ea typeface="Consolas"/>
+              <a:cs typeface="Consolas"/>
+              <a:sym typeface="Consolas"/>
+            </a:endParaRPr>
+          </a:p>
+          <a:p>
+            <a:pPr indent="0" lvl="0" marL="0" rtl="0" algn="l">
+              <a:lnSpc>
+                <a:spcPct val="100000"/>
+              </a:lnSpc>
+              <a:spcBef>
+                <a:spcPts val="560"/>
+              </a:spcBef>
+              <a:spcAft>
+                <a:spcPts val="0"/>
+              </a:spcAft>
+              <a:buSzPts val="2800"/>
+              <a:buNone/>
+            </a:pPr>
+            <a:r>
+              <a:t/>
+            </a:r>
+            <a:endParaRPr sz="1120">
+              <a:latin typeface="Consolas"/>
+              <a:ea typeface="Consolas"/>
+              <a:cs typeface="Consolas"/>
+              <a:sym typeface="Consolas"/>
+            </a:endParaRPr>
+          </a:p>
+          <a:p>
+            <a:pPr indent="0" lvl="0" marL="0" rtl="0" algn="l">
+              <a:lnSpc>
+                <a:spcPct val="100000"/>
+              </a:lnSpc>
+              <a:spcBef>
+                <a:spcPts val="560"/>
+              </a:spcBef>
+              <a:spcAft>
+                <a:spcPts val="0"/>
+              </a:spcAft>
+              <a:buSzPts val="2800"/>
+              <a:buNone/>
+            </a:pPr>
+            <a:r>
+              <a:rPr lang="en" sz="1120">
+                <a:latin typeface="Consolas"/>
+                <a:ea typeface="Consolas"/>
+                <a:cs typeface="Consolas"/>
+                <a:sym typeface="Consolas"/>
+              </a:rPr>
+              <a:t>'Twas brillig, and the slithy toves</a:t>
+            </a:r>
+            <a:endParaRPr sz="1120">
+              <a:latin typeface="Consolas"/>
+              <a:ea typeface="Consolas"/>
+              <a:cs typeface="Consolas"/>
+              <a:sym typeface="Consolas"/>
+            </a:endParaRPr>
+          </a:p>
+          <a:p>
+            <a:pPr indent="0" lvl="0" marL="0" rtl="0" algn="l">
+              <a:lnSpc>
+                <a:spcPct val="100000"/>
+              </a:lnSpc>
+              <a:spcBef>
+                <a:spcPts val="560"/>
+              </a:spcBef>
+              <a:spcAft>
+                <a:spcPts val="0"/>
+              </a:spcAft>
+              <a:buSzPts val="2800"/>
+              <a:buNone/>
+            </a:pPr>
+            <a:r>
+              <a:rPr lang="en" sz="1120">
+                <a:latin typeface="Consolas"/>
+                <a:ea typeface="Consolas"/>
+                <a:cs typeface="Consolas"/>
+                <a:sym typeface="Consolas"/>
+              </a:rPr>
+              <a:t>Did gyre and gimble in the wabe;</a:t>
+            </a:r>
+            <a:endParaRPr sz="1120">
+              <a:latin typeface="Consolas"/>
+              <a:ea typeface="Consolas"/>
+              <a:cs typeface="Consolas"/>
+              <a:sym typeface="Consolas"/>
+            </a:endParaRPr>
+          </a:p>
+          <a:p>
+            <a:pPr indent="0" lvl="0" marL="0" rtl="0" algn="l">
+              <a:lnSpc>
+                <a:spcPct val="100000"/>
+              </a:lnSpc>
+              <a:spcBef>
+                <a:spcPts val="560"/>
+              </a:spcBef>
+              <a:spcAft>
+                <a:spcPts val="0"/>
+              </a:spcAft>
+              <a:buSzPts val="2800"/>
+              <a:buNone/>
+            </a:pPr>
+            <a:r>
+              <a:rPr lang="en" sz="1120">
+                <a:latin typeface="Consolas"/>
+                <a:ea typeface="Consolas"/>
+                <a:cs typeface="Consolas"/>
+                <a:sym typeface="Consolas"/>
+              </a:rPr>
+              <a:t>All mimsy were the borogoves,</a:t>
+            </a:r>
+            <a:endParaRPr sz="1120">
+              <a:latin typeface="Consolas"/>
+              <a:ea typeface="Consolas"/>
+              <a:cs typeface="Consolas"/>
+              <a:sym typeface="Consolas"/>
+            </a:endParaRPr>
+          </a:p>
+          <a:p>
+            <a:pPr indent="0" lvl="0" marL="0" rtl="0" algn="l">
+              <a:lnSpc>
+                <a:spcPct val="100000"/>
+              </a:lnSpc>
+              <a:spcBef>
+                <a:spcPts val="560"/>
+              </a:spcBef>
+              <a:spcAft>
+                <a:spcPts val="0"/>
+              </a:spcAft>
+              <a:buSzPts val="2800"/>
+              <a:buNone/>
+            </a:pPr>
+            <a:r>
+              <a:rPr lang="en" sz="1120">
+                <a:latin typeface="Consolas"/>
+                <a:ea typeface="Consolas"/>
+                <a:cs typeface="Consolas"/>
+                <a:sym typeface="Consolas"/>
+              </a:rPr>
+              <a:t>And the mome raths outgrabe.</a:t>
+            </a:r>
+            <a:endParaRPr sz="1120">
+              <a:latin typeface="Consolas"/>
+              <a:ea typeface="Consolas"/>
+              <a:cs typeface="Consolas"/>
+              <a:sym typeface="Consolas"/>
+            </a:endParaRPr>
+          </a:p>
+          <a:p>
+            <a:pPr indent="0" lvl="0" marL="0" rtl="0" algn="l">
+              <a:lnSpc>
+                <a:spcPct val="100000"/>
+              </a:lnSpc>
+              <a:spcBef>
+                <a:spcPts val="560"/>
+              </a:spcBef>
+              <a:spcAft>
+                <a:spcPts val="0"/>
+              </a:spcAft>
+              <a:buSzPts val="2800"/>
+              <a:buNone/>
+            </a:pPr>
+            <a:r>
+              <a:t/>
+            </a:r>
+            <a:endParaRPr sz="1120">
+              <a:latin typeface="Consolas"/>
+              <a:ea typeface="Consolas"/>
+              <a:cs typeface="Consolas"/>
+              <a:sym typeface="Consolas"/>
+            </a:endParaRPr>
+          </a:p>
+          <a:p>
+            <a:pPr indent="0" lvl="0" marL="0" rtl="0" algn="l">
+              <a:lnSpc>
+                <a:spcPct val="100000"/>
+              </a:lnSpc>
+              <a:spcBef>
+                <a:spcPts val="560"/>
+              </a:spcBef>
+              <a:spcAft>
+                <a:spcPts val="0"/>
+              </a:spcAft>
+              <a:buSzPts val="2800"/>
+              <a:buNone/>
+            </a:pPr>
+            <a:r>
+              <a:rPr lang="en" sz="1120">
+                <a:latin typeface="Consolas"/>
+                <a:ea typeface="Consolas"/>
+                <a:cs typeface="Consolas"/>
+                <a:sym typeface="Consolas"/>
+              </a:rPr>
+              <a:t>"Beware the Jabberwock, my son!</a:t>
+            </a:r>
+            <a:endParaRPr sz="1120">
+              <a:latin typeface="Consolas"/>
+              <a:ea typeface="Consolas"/>
+              <a:cs typeface="Consolas"/>
+              <a:sym typeface="Consolas"/>
+            </a:endParaRPr>
+          </a:p>
+          <a:p>
+            <a:pPr indent="0" lvl="0" marL="0" rtl="0" algn="l">
+              <a:lnSpc>
+                <a:spcPct val="100000"/>
+              </a:lnSpc>
+              <a:spcBef>
+                <a:spcPts val="560"/>
+              </a:spcBef>
+              <a:spcAft>
+                <a:spcPts val="0"/>
+              </a:spcAft>
+              <a:buSzPts val="2800"/>
+              <a:buNone/>
+            </a:pPr>
+            <a:r>
+              <a:rPr lang="en" sz="1120">
+                <a:latin typeface="Consolas"/>
+                <a:ea typeface="Consolas"/>
+                <a:cs typeface="Consolas"/>
+                <a:sym typeface="Consolas"/>
+              </a:rPr>
+              <a:t>The jaws that bite, the claws that catch!</a:t>
+            </a:r>
+            <a:endParaRPr sz="1120">
+              <a:latin typeface="Consolas"/>
+              <a:ea typeface="Consolas"/>
+              <a:cs typeface="Consolas"/>
+              <a:sym typeface="Consolas"/>
+            </a:endParaRPr>
+          </a:p>
+          <a:p>
+            <a:pPr indent="0" lvl="0" marL="0" rtl="0" algn="l">
+              <a:lnSpc>
+                <a:spcPct val="100000"/>
+              </a:lnSpc>
+              <a:spcBef>
+                <a:spcPts val="560"/>
+              </a:spcBef>
+              <a:spcAft>
+                <a:spcPts val="0"/>
+              </a:spcAft>
+              <a:buSzPts val="2800"/>
+              <a:buNone/>
+            </a:pPr>
+            <a:r>
+              <a:rPr lang="en" sz="1120">
+                <a:latin typeface="Consolas"/>
+                <a:ea typeface="Consolas"/>
+                <a:cs typeface="Consolas"/>
+                <a:sym typeface="Consolas"/>
+              </a:rPr>
+              <a:t>Beware the Jubjub bird, and shun</a:t>
+            </a:r>
+            <a:endParaRPr sz="1120">
+              <a:latin typeface="Consolas"/>
+              <a:ea typeface="Consolas"/>
+              <a:cs typeface="Consolas"/>
+              <a:sym typeface="Consolas"/>
+            </a:endParaRPr>
+          </a:p>
+          <a:p>
+            <a:pPr indent="0" lvl="0" marL="0" rtl="0" algn="l">
+              <a:lnSpc>
+                <a:spcPct val="100000"/>
+              </a:lnSpc>
+              <a:spcBef>
+                <a:spcPts val="560"/>
+              </a:spcBef>
+              <a:spcAft>
+                <a:spcPts val="0"/>
+              </a:spcAft>
+              <a:buSzPts val="2800"/>
+              <a:buNone/>
+            </a:pPr>
+            <a:r>
+              <a:rPr lang="en" sz="1120">
+                <a:latin typeface="Consolas"/>
+                <a:ea typeface="Consolas"/>
+                <a:cs typeface="Consolas"/>
+                <a:sym typeface="Consolas"/>
+              </a:rPr>
+              <a:t>The frumious Bandersnatch!"</a:t>
+            </a:r>
+            <a:endParaRPr sz="1120">
+              <a:latin typeface="Consolas"/>
+              <a:ea typeface="Consolas"/>
+              <a:cs typeface="Consolas"/>
+              <a:sym typeface="Consolas"/>
+            </a:endParaRPr>
+          </a:p>
+          <a:p>
+            <a:pPr indent="0" lvl="0" marL="0" rtl="0" algn="l">
+              <a:lnSpc>
+                <a:spcPct val="100000"/>
+              </a:lnSpc>
+              <a:spcBef>
+                <a:spcPts val="560"/>
+              </a:spcBef>
+              <a:spcAft>
+                <a:spcPts val="0"/>
+              </a:spcAft>
+              <a:buSzPts val="2800"/>
+              <a:buNone/>
+            </a:pPr>
+            <a:r>
+              <a:t/>
+            </a:r>
+            <a:endParaRPr sz="1120">
+              <a:latin typeface="Consolas"/>
+              <a:ea typeface="Consolas"/>
+              <a:cs typeface="Consolas"/>
+              <a:sym typeface="Consolas"/>
+            </a:endParaRPr>
+          </a:p>
+          <a:p>
+            <a:pPr indent="0" lvl="0" marL="0" rtl="0" algn="l">
+              <a:lnSpc>
+                <a:spcPct val="100000"/>
+              </a:lnSpc>
+              <a:spcBef>
+                <a:spcPts val="560"/>
+              </a:spcBef>
+              <a:spcAft>
+                <a:spcPts val="0"/>
+              </a:spcAft>
+              <a:buSzPts val="2800"/>
+              <a:buNone/>
+            </a:pPr>
+            <a:r>
+              <a:rPr lang="en" sz="1120">
+                <a:latin typeface="Consolas"/>
+                <a:ea typeface="Consolas"/>
+                <a:cs typeface="Consolas"/>
+                <a:sym typeface="Consolas"/>
+              </a:rPr>
+              <a:t>He took his vorpal sword in hand:</a:t>
+            </a:r>
+            <a:endParaRPr sz="1120">
+              <a:latin typeface="Consolas"/>
+              <a:ea typeface="Consolas"/>
+              <a:cs typeface="Consolas"/>
+              <a:sym typeface="Consolas"/>
+            </a:endParaRPr>
+          </a:p>
+          <a:p>
+            <a:pPr indent="0" lvl="0" marL="0" rtl="0" algn="l">
+              <a:lnSpc>
+                <a:spcPct val="100000"/>
+              </a:lnSpc>
+              <a:spcBef>
+                <a:spcPts val="560"/>
+              </a:spcBef>
+              <a:spcAft>
+                <a:spcPts val="0"/>
+              </a:spcAft>
+              <a:buSzPts val="2800"/>
+              <a:buNone/>
+            </a:pPr>
+            <a:r>
+              <a:rPr lang="en" sz="1120">
+                <a:latin typeface="Consolas"/>
+                <a:ea typeface="Consolas"/>
+                <a:cs typeface="Consolas"/>
+                <a:sym typeface="Consolas"/>
+              </a:rPr>
+              <a:t>Long time the manxome foe he sought—</a:t>
+            </a:r>
+            <a:endParaRPr sz="1120">
+              <a:latin typeface="Consolas"/>
+              <a:ea typeface="Consolas"/>
+              <a:cs typeface="Consolas"/>
+              <a:sym typeface="Consolas"/>
+            </a:endParaRPr>
+          </a:p>
+          <a:p>
+            <a:pPr indent="0" lvl="0" marL="0" rtl="0" algn="l">
+              <a:lnSpc>
+                <a:spcPct val="100000"/>
+              </a:lnSpc>
+              <a:spcBef>
+                <a:spcPts val="560"/>
+              </a:spcBef>
+              <a:spcAft>
+                <a:spcPts val="0"/>
+              </a:spcAft>
+              <a:buSzPts val="2800"/>
+              <a:buNone/>
+            </a:pPr>
+            <a:r>
+              <a:rPr lang="en" sz="1120">
+                <a:latin typeface="Consolas"/>
+                <a:ea typeface="Consolas"/>
+                <a:cs typeface="Consolas"/>
+                <a:sym typeface="Consolas"/>
+              </a:rPr>
+              <a:t>So rested he by the Tumtum tree,</a:t>
+            </a:r>
+            <a:endParaRPr sz="1120">
+              <a:latin typeface="Consolas"/>
+              <a:ea typeface="Consolas"/>
+              <a:cs typeface="Consolas"/>
+              <a:sym typeface="Consolas"/>
+            </a:endParaRPr>
+          </a:p>
+          <a:p>
+            <a:pPr indent="0" lvl="0" marL="0" rtl="0" algn="l">
+              <a:lnSpc>
+                <a:spcPct val="100000"/>
+              </a:lnSpc>
+              <a:spcBef>
+                <a:spcPts val="560"/>
+              </a:spcBef>
+              <a:spcAft>
+                <a:spcPts val="0"/>
+              </a:spcAft>
+              <a:buSzPts val="2800"/>
+              <a:buNone/>
+            </a:pPr>
+            <a:r>
+              <a:rPr lang="en" sz="1120">
+                <a:latin typeface="Consolas"/>
+                <a:ea typeface="Consolas"/>
+                <a:cs typeface="Consolas"/>
+                <a:sym typeface="Consolas"/>
+              </a:rPr>
+              <a:t>And stood awhile in thought.</a:t>
+            </a:r>
+            <a:endParaRPr sz="1120">
+              <a:latin typeface="Consolas"/>
+              <a:ea typeface="Consolas"/>
+              <a:cs typeface="Consolas"/>
+              <a:sym typeface="Consolas"/>
+            </a:endParaRPr>
+          </a:p>
+        </p:txBody>
+      </p:sp>
+      <p:sp>
+        <p:nvSpPr>
+          <p:cNvPr id="131" name="Google Shape;131;g3b8409de4d6_0_95"/>
+          <p:cNvSpPr txBox="1"/>
+          <p:nvPr/>
+        </p:nvSpPr>
+        <p:spPr>
+          <a:xfrm>
+            <a:off x="1401418" y="1465801"/>
+            <a:ext cx="2133600" cy="251100"/>
+          </a:xfrm>
+          <a:prstGeom prst="rect">
+            <a:avLst/>
+          </a:prstGeom>
+          <a:noFill/>
+          <a:ln>
+            <a:noFill/>
+          </a:ln>
+        </p:spPr>
+        <p:txBody>
+          <a:bodyPr anchorCtr="0" anchor="ctr" bIns="85325" lIns="85325" spcFirstLastPara="1" rIns="85325" wrap="square" tIns="85325">
+            <a:noAutofit/>
+          </a:bodyPr>
+          <a:lstStyle/>
+          <a:p>
+            <a:pPr indent="0" lvl="0" marL="0" marR="0" rtl="0" algn="r">
+              <a:lnSpc>
+                <a:spcPct val="100000"/>
+              </a:lnSpc>
+              <a:spcBef>
+                <a:spcPts val="0"/>
+              </a:spcBef>
+              <a:spcAft>
+                <a:spcPts val="0"/>
+              </a:spcAft>
+              <a:buClr>
+                <a:srgbClr val="000000"/>
+              </a:buClr>
+              <a:buSzPts val="1680"/>
+              <a:buFont typeface="Arial"/>
+              <a:buNone/>
+            </a:pPr>
+            <a:r>
+              <a:rPr b="1" i="0" lang="en" sz="1680" u="none" cap="none" strike="noStrike">
+                <a:solidFill>
+                  <a:srgbClr val="DCB439"/>
+                </a:solidFill>
+                <a:latin typeface="Consolas"/>
+                <a:ea typeface="Consolas"/>
+                <a:cs typeface="Consolas"/>
+                <a:sym typeface="Consolas"/>
+              </a:rPr>
+              <a:t>jabberwocky.txt</a:t>
+            </a:r>
+            <a:endParaRPr b="1" i="0" sz="1680" u="none" cap="none" strike="noStrike">
+              <a:solidFill>
+                <a:srgbClr val="DCB439"/>
+              </a:solidFill>
+              <a:latin typeface="Consolas"/>
+              <a:ea typeface="Consolas"/>
+              <a:cs typeface="Consolas"/>
+              <a:sym typeface="Consolas"/>
+            </a:endParaRPr>
+          </a:p>
+        </p:txBody>
+      </p:sp>
+      <p:sp>
+        <p:nvSpPr>
+          <p:cNvPr id="132" name="Google Shape;132;g3b8409de4d6_0_95"/>
+          <p:cNvSpPr/>
+          <p:nvPr/>
+        </p:nvSpPr>
+        <p:spPr>
+          <a:xfrm>
+            <a:off x="457200" y="1417650"/>
+            <a:ext cx="3078000" cy="347400"/>
+          </a:xfrm>
+          <a:prstGeom prst="rect">
+            <a:avLst/>
+          </a:prstGeom>
+          <a:noFill/>
+          <a:ln cap="flat" cmpd="sng" w="35550">
+            <a:solidFill>
+              <a:srgbClr val="002B5B"/>
+            </a:solidFill>
+            <a:prstDash val="solid"/>
+            <a:round/>
+            <a:headEnd len="sm" w="sm" type="none"/>
+            <a:tailEnd len="sm" w="sm" type="none"/>
+          </a:ln>
+        </p:spPr>
+        <p:txBody>
+          <a:bodyPr anchorCtr="0" anchor="ctr" bIns="85325" lIns="85325" spcFirstLastPara="1" rIns="85325" wrap="square" tIns="85325">
+            <a:noAutofit/>
+          </a:bodyPr>
+          <a:lstStyle/>
+          <a:p>
+            <a:pPr indent="0" lvl="0" marL="0" marR="0" rtl="0" algn="r">
+              <a:lnSpc>
+                <a:spcPct val="100000"/>
+              </a:lnSpc>
+              <a:spcBef>
+                <a:spcPts val="0"/>
+              </a:spcBef>
+              <a:spcAft>
+                <a:spcPts val="0"/>
+              </a:spcAft>
+              <a:buClr>
+                <a:srgbClr val="000000"/>
+              </a:buClr>
+              <a:buSzPts val="1307"/>
+              <a:buFont typeface="Arial"/>
+              <a:buNone/>
+            </a:pPr>
+            <a:r>
+              <a:t/>
+            </a:r>
+            <a:endParaRPr b="0" i="0" sz="1306" u="none" cap="none" strike="noStrike">
+              <a:solidFill>
+                <a:srgbClr val="000000"/>
+              </a:solidFill>
+              <a:latin typeface="Arial"/>
+              <a:ea typeface="Arial"/>
+              <a:cs typeface="Arial"/>
+              <a:sym typeface="Arial"/>
+            </a:endParaRPr>
+          </a:p>
+        </p:txBody>
+      </p:sp>
+      <p:pic>
+        <p:nvPicPr>
+          <p:cNvPr id="133" name="Google Shape;133;g3b8409de4d6_0_95"/>
+          <p:cNvPicPr preferRelativeResize="0"/>
+          <p:nvPr/>
+        </p:nvPicPr>
+        <p:blipFill rotWithShape="1">
+          <a:blip r:embed="rId3">
+            <a:alphaModFix/>
+          </a:blip>
+          <a:srcRect b="12536" l="18278" r="18430" t="12303"/>
+          <a:stretch/>
+        </p:blipFill>
+        <p:spPr>
+          <a:xfrm>
+            <a:off x="493859" y="1447565"/>
+            <a:ext cx="242227" cy="287648"/>
+          </a:xfrm>
+          <a:prstGeom prst="rect">
+            <a:avLst/>
+          </a:prstGeom>
+          <a:noFill/>
+          <a:ln>
+            <a:noFill/>
+          </a:ln>
+        </p:spPr>
+      </p:pic>
+    </p:spTree>
+  </p:cSld>
+  <p:clrMapOvr>
+    <a:masterClrMapping/>
+  </p:clrMapOvr>
+</p:sld>
+</file>
+
+<file path=ppt/slides/slide16.xml><?xml version="1.0" encoding="utf-8"?>
+<p:sld xmlns:a="http://schemas.openxmlformats.org/drawingml/2006/main" xmlns:r="http://schemas.openxmlformats.org/officeDocument/2006/relationships" xmlns:mc="http://schemas.openxmlformats.org/markup-compatibility/2006" xmlns:mv="urn:schemas-microsoft-com:mac:vml" xmlns:p="http://schemas.openxmlformats.org/presentationml/2006/main" xmlns:c="http://schemas.openxmlformats.org/drawingml/2006/chart" xmlns:dgm="http://schemas.openxmlformats.org/drawingml/2006/diagram" xmlns:o="urn:schemas-microsoft-com:office:office" xmlns:v="urn:schemas-microsoft-com:vml" xmlns:pvml="urn:schemas-microsoft-com:office:powerpoint" xmlns:com="http://schemas.openxmlformats.org/drawingml/2006/compatibility" xmlns:p14="http://schemas.microsoft.com/office/powerpoint/2010/main" xmlns:p15="http://schemas.microsoft.com/office/powerpoint/2012/main" xmlns:ahyp="http://schemas.microsoft.com/office/drawing/2018/hyperlinkcolor">
+  <p:cSld>
+    <p:spTree>
+      <p:nvGrpSpPr>
+        <p:cNvPr id="137" name="Shape 137"/>
+        <p:cNvGrpSpPr/>
+        <p:nvPr/>
+      </p:nvGrpSpPr>
+      <p:grpSpPr>
+        <a:xfrm>
+          <a:off x="0" y="0"/>
+          <a:ext cx="0" cy="0"/>
+          <a:chOff x="0" y="0"/>
+          <a:chExt cx="0" cy="0"/>
+        </a:xfrm>
+      </p:grpSpPr>
+      <p:sp>
+        <p:nvSpPr>
+          <p:cNvPr id="138" name="Google Shape;138;g3b8409de4d6_0_40"/>
           <p:cNvSpPr txBox="1"/>
           <p:nvPr>
             <p:ph type="title"/>
@@ -7996,7 +9189,127 @@
             </a:pPr>
             <a:r>
               <a:rPr lang="en"/>
-              <a:t>Programming: Classes</a:t>
+              <a:t>Byte-Pair Encoding Tokenization </a:t>
+            </a:r>
+            <a:r>
+              <a:rPr lang="en" sz="1800"/>
+              <a:t>(1994)</a:t>
+            </a:r>
+            <a:endParaRPr sz="1800"/>
+          </a:p>
+        </p:txBody>
+      </p:sp>
+      <p:sp>
+        <p:nvSpPr>
+          <p:cNvPr id="139" name="Google Shape;139;g3b8409de4d6_0_40"/>
+          <p:cNvSpPr txBox="1"/>
+          <p:nvPr>
+            <p:ph idx="1" type="body"/>
+          </p:nvPr>
+        </p:nvSpPr>
+        <p:spPr>
+          <a:xfrm>
+            <a:off x="457200" y="1600200"/>
+            <a:ext cx="8229600" cy="4967700"/>
+          </a:xfrm>
+          <a:prstGeom prst="rect">
+            <a:avLst/>
+          </a:prstGeom>
+        </p:spPr>
+        <p:txBody>
+          <a:bodyPr anchorCtr="0" anchor="t" bIns="91425" lIns="91425" spcFirstLastPara="1" rIns="91425" wrap="square" tIns="91425">
+            <a:noAutofit/>
+          </a:bodyPr>
+          <a:lstStyle/>
+          <a:p>
+            <a:pPr indent="0" lvl="0" marL="0" rtl="0" algn="l">
+              <a:spcBef>
+                <a:spcPts val="600"/>
+              </a:spcBef>
+              <a:spcAft>
+                <a:spcPts val="0"/>
+              </a:spcAft>
+              <a:buNone/>
+            </a:pPr>
+            <a:r>
+              <a:t/>
+            </a:r>
+            <a:endParaRPr/>
+          </a:p>
+        </p:txBody>
+      </p:sp>
+    </p:spTree>
+  </p:cSld>
+  <p:clrMapOvr>
+    <a:masterClrMapping/>
+  </p:clrMapOvr>
+</p:sld>
+</file>
+
+<file path=ppt/slides/slide17.xml><?xml version="1.0" encoding="utf-8"?>
+<p:sld xmlns:a="http://schemas.openxmlformats.org/drawingml/2006/main" xmlns:r="http://schemas.openxmlformats.org/officeDocument/2006/relationships" xmlns:mc="http://schemas.openxmlformats.org/markup-compatibility/2006" xmlns:mv="urn:schemas-microsoft-com:mac:vml" xmlns:p="http://schemas.openxmlformats.org/presentationml/2006/main" xmlns:c="http://schemas.openxmlformats.org/drawingml/2006/chart" xmlns:dgm="http://schemas.openxmlformats.org/drawingml/2006/diagram" xmlns:o="urn:schemas-microsoft-com:office:office" xmlns:v="urn:schemas-microsoft-com:vml" xmlns:pvml="urn:schemas-microsoft-com:office:powerpoint" xmlns:com="http://schemas.openxmlformats.org/drawingml/2006/compatibility" xmlns:p14="http://schemas.microsoft.com/office/powerpoint/2010/main" xmlns:p15="http://schemas.microsoft.com/office/powerpoint/2012/main" xmlns:ahyp="http://schemas.microsoft.com/office/drawing/2018/hyperlinkcolor">
+  <p:cSld>
+    <p:spTree>
+      <p:nvGrpSpPr>
+        <p:cNvPr id="143" name="Shape 143"/>
+        <p:cNvGrpSpPr/>
+        <p:nvPr/>
+      </p:nvGrpSpPr>
+      <p:grpSpPr>
+        <a:xfrm>
+          <a:off x="0" y="0"/>
+          <a:ext cx="0" cy="0"/>
+          <a:chOff x="0" y="0"/>
+          <a:chExt cx="0" cy="0"/>
+        </a:xfrm>
+      </p:grpSpPr>
+      <p:sp>
+        <p:nvSpPr>
+          <p:cNvPr id="144" name="Google Shape;144;g3b8409de4d6_0_118"/>
+          <p:cNvSpPr txBox="1"/>
+          <p:nvPr>
+            <p:ph type="title"/>
+          </p:nvPr>
+        </p:nvSpPr>
+        <p:spPr>
+          <a:xfrm>
+            <a:off x="457200" y="274638"/>
+            <a:ext cx="8229600" cy="1143000"/>
+          </a:xfrm>
+          <a:prstGeom prst="rect">
+            <a:avLst/>
+          </a:prstGeom>
+        </p:spPr>
+        <p:txBody>
+          <a:bodyPr anchorCtr="0" anchor="b" bIns="91425" lIns="91425" spcFirstLastPara="1" rIns="91425" wrap="square" tIns="91425">
+            <a:noAutofit/>
+          </a:bodyPr>
+          <a:lstStyle/>
+          <a:p>
+            <a:pPr indent="0" lvl="0" marL="0" rtl="0" algn="l">
+              <a:spcBef>
+                <a:spcPts val="0"/>
+              </a:spcBef>
+              <a:spcAft>
+                <a:spcPts val="0"/>
+              </a:spcAft>
+              <a:buNone/>
+            </a:pPr>
+            <a:r>
+              <a:rPr lang="en">
+                <a:solidFill>
+                  <a:srgbClr val="A31415"/>
+                </a:solidFill>
+                <a:latin typeface="Consolas"/>
+                <a:ea typeface="Consolas"/>
+                <a:cs typeface="Consolas"/>
+                <a:sym typeface="Consolas"/>
+              </a:rPr>
+              <a:t>programming</a:t>
+            </a:r>
+            <a:r>
+              <a:rPr lang="en"/>
+              <a:t>: Regex</a:t>
             </a:r>
             <a:endParaRPr/>
           </a:p>
@@ -8004,7 +9317,227 @@
       </p:sp>
       <p:sp>
         <p:nvSpPr>
-          <p:cNvPr id="130" name="Google Shape;130;g3b8409de4d6_0_90"/>
+          <p:cNvPr id="145" name="Google Shape;145;g3b8409de4d6_0_118"/>
+          <p:cNvSpPr txBox="1"/>
+          <p:nvPr>
+            <p:ph idx="1" type="body"/>
+          </p:nvPr>
+        </p:nvSpPr>
+        <p:spPr>
+          <a:xfrm>
+            <a:off x="457200" y="1600200"/>
+            <a:ext cx="8229600" cy="4967700"/>
+          </a:xfrm>
+          <a:prstGeom prst="rect">
+            <a:avLst/>
+          </a:prstGeom>
+        </p:spPr>
+        <p:txBody>
+          <a:bodyPr anchorCtr="0" anchor="t" bIns="91425" lIns="91425" spcFirstLastPara="1" rIns="91425" wrap="square" tIns="91425">
+            <a:noAutofit/>
+          </a:bodyPr>
+          <a:lstStyle/>
+          <a:p>
+            <a:pPr indent="0" lvl="0" marL="0" rtl="0" algn="l">
+              <a:spcBef>
+                <a:spcPts val="600"/>
+              </a:spcBef>
+              <a:spcAft>
+                <a:spcPts val="0"/>
+              </a:spcAft>
+              <a:buNone/>
+            </a:pPr>
+            <a:r>
+              <a:t/>
+            </a:r>
+            <a:endParaRPr/>
+          </a:p>
+        </p:txBody>
+      </p:sp>
+    </p:spTree>
+  </p:cSld>
+  <p:clrMapOvr>
+    <a:masterClrMapping/>
+  </p:clrMapOvr>
+</p:sld>
+</file>
+
+<file path=ppt/slides/slide18.xml><?xml version="1.0" encoding="utf-8"?>
+<p:sld xmlns:a="http://schemas.openxmlformats.org/drawingml/2006/main" xmlns:r="http://schemas.openxmlformats.org/officeDocument/2006/relationships" xmlns:mc="http://schemas.openxmlformats.org/markup-compatibility/2006" xmlns:mv="urn:schemas-microsoft-com:mac:vml" xmlns:p="http://schemas.openxmlformats.org/presentationml/2006/main" xmlns:c="http://schemas.openxmlformats.org/drawingml/2006/chart" xmlns:dgm="http://schemas.openxmlformats.org/drawingml/2006/diagram" xmlns:o="urn:schemas-microsoft-com:office:office" xmlns:v="urn:schemas-microsoft-com:vml" xmlns:pvml="urn:schemas-microsoft-com:office:powerpoint" xmlns:com="http://schemas.openxmlformats.org/drawingml/2006/compatibility" xmlns:p14="http://schemas.microsoft.com/office/powerpoint/2010/main" xmlns:p15="http://schemas.microsoft.com/office/powerpoint/2012/main" xmlns:ahyp="http://schemas.microsoft.com/office/drawing/2018/hyperlinkcolor">
+  <p:cSld>
+    <p:spTree>
+      <p:nvGrpSpPr>
+        <p:cNvPr id="149" name="Shape 149"/>
+        <p:cNvGrpSpPr/>
+        <p:nvPr/>
+      </p:nvGrpSpPr>
+      <p:grpSpPr>
+        <a:xfrm>
+          <a:off x="0" y="0"/>
+          <a:ext cx="0" cy="0"/>
+          <a:chOff x="0" y="0"/>
+          <a:chExt cx="0" cy="0"/>
+        </a:xfrm>
+      </p:grpSpPr>
+      <p:sp>
+        <p:nvSpPr>
+          <p:cNvPr id="150" name="Google Shape;150;g3b8409de4d6_0_126"/>
+          <p:cNvSpPr txBox="1"/>
+          <p:nvPr>
+            <p:ph type="title"/>
+          </p:nvPr>
+        </p:nvSpPr>
+        <p:spPr>
+          <a:xfrm>
+            <a:off x="457200" y="274638"/>
+            <a:ext cx="8229600" cy="1143000"/>
+          </a:xfrm>
+          <a:prstGeom prst="rect">
+            <a:avLst/>
+          </a:prstGeom>
+        </p:spPr>
+        <p:txBody>
+          <a:bodyPr anchorCtr="0" anchor="b" bIns="91425" lIns="91425" spcFirstLastPara="1" rIns="91425" wrap="square" tIns="91425">
+            <a:noAutofit/>
+          </a:bodyPr>
+          <a:lstStyle/>
+          <a:p>
+            <a:pPr indent="0" lvl="0" marL="0" rtl="0" algn="l">
+              <a:spcBef>
+                <a:spcPts val="0"/>
+              </a:spcBef>
+              <a:spcAft>
+                <a:spcPts val="0"/>
+              </a:spcAft>
+              <a:buNone/>
+            </a:pPr>
+            <a:r>
+              <a:rPr lang="en">
+                <a:solidFill>
+                  <a:srgbClr val="A31415"/>
+                </a:solidFill>
+                <a:latin typeface="Consolas"/>
+                <a:ea typeface="Consolas"/>
+                <a:cs typeface="Consolas"/>
+                <a:sym typeface="Consolas"/>
+              </a:rPr>
+              <a:t>programming</a:t>
+            </a:r>
+            <a:r>
+              <a:rPr lang="en"/>
+              <a:t>: List Slices</a:t>
+            </a:r>
+            <a:endParaRPr/>
+          </a:p>
+        </p:txBody>
+      </p:sp>
+      <p:sp>
+        <p:nvSpPr>
+          <p:cNvPr id="151" name="Google Shape;151;g3b8409de4d6_0_126"/>
+          <p:cNvSpPr txBox="1"/>
+          <p:nvPr>
+            <p:ph idx="1" type="body"/>
+          </p:nvPr>
+        </p:nvSpPr>
+        <p:spPr>
+          <a:xfrm>
+            <a:off x="457200" y="1600200"/>
+            <a:ext cx="8229600" cy="4967700"/>
+          </a:xfrm>
+          <a:prstGeom prst="rect">
+            <a:avLst/>
+          </a:prstGeom>
+        </p:spPr>
+        <p:txBody>
+          <a:bodyPr anchorCtr="0" anchor="t" bIns="91425" lIns="91425" spcFirstLastPara="1" rIns="91425" wrap="square" tIns="91425">
+            <a:noAutofit/>
+          </a:bodyPr>
+          <a:lstStyle/>
+          <a:p>
+            <a:pPr indent="0" lvl="0" marL="0" rtl="0" algn="l">
+              <a:spcBef>
+                <a:spcPts val="600"/>
+              </a:spcBef>
+              <a:spcAft>
+                <a:spcPts val="0"/>
+              </a:spcAft>
+              <a:buNone/>
+            </a:pPr>
+            <a:r>
+              <a:t/>
+            </a:r>
+            <a:endParaRPr/>
+          </a:p>
+        </p:txBody>
+      </p:sp>
+    </p:spTree>
+  </p:cSld>
+  <p:clrMapOvr>
+    <a:masterClrMapping/>
+  </p:clrMapOvr>
+</p:sld>
+</file>
+
+<file path=ppt/slides/slide19.xml><?xml version="1.0" encoding="utf-8"?>
+<p:sld xmlns:a="http://schemas.openxmlformats.org/drawingml/2006/main" xmlns:r="http://schemas.openxmlformats.org/officeDocument/2006/relationships" xmlns:mc="http://schemas.openxmlformats.org/markup-compatibility/2006" xmlns:mv="urn:schemas-microsoft-com:mac:vml" xmlns:p="http://schemas.openxmlformats.org/presentationml/2006/main" xmlns:c="http://schemas.openxmlformats.org/drawingml/2006/chart" xmlns:dgm="http://schemas.openxmlformats.org/drawingml/2006/diagram" xmlns:o="urn:schemas-microsoft-com:office:office" xmlns:v="urn:schemas-microsoft-com:vml" xmlns:pvml="urn:schemas-microsoft-com:office:powerpoint" xmlns:com="http://schemas.openxmlformats.org/drawingml/2006/compatibility" xmlns:p14="http://schemas.microsoft.com/office/powerpoint/2010/main" xmlns:p15="http://schemas.microsoft.com/office/powerpoint/2012/main" xmlns:ahyp="http://schemas.microsoft.com/office/drawing/2018/hyperlinkcolor">
+  <p:cSld>
+    <p:spTree>
+      <p:nvGrpSpPr>
+        <p:cNvPr id="155" name="Shape 155"/>
+        <p:cNvGrpSpPr/>
+        <p:nvPr/>
+      </p:nvGrpSpPr>
+      <p:grpSpPr>
+        <a:xfrm>
+          <a:off x="0" y="0"/>
+          <a:ext cx="0" cy="0"/>
+          <a:chOff x="0" y="0"/>
+          <a:chExt cx="0" cy="0"/>
+        </a:xfrm>
+      </p:grpSpPr>
+      <p:sp>
+        <p:nvSpPr>
+          <p:cNvPr id="156" name="Google Shape;156;g3b8409de4d6_0_108"/>
+          <p:cNvSpPr txBox="1"/>
+          <p:nvPr>
+            <p:ph type="title"/>
+          </p:nvPr>
+        </p:nvSpPr>
+        <p:spPr>
+          <a:xfrm>
+            <a:off x="457200" y="274638"/>
+            <a:ext cx="8229600" cy="1143000"/>
+          </a:xfrm>
+          <a:prstGeom prst="rect">
+            <a:avLst/>
+          </a:prstGeom>
+        </p:spPr>
+        <p:txBody>
+          <a:bodyPr anchorCtr="0" anchor="b" bIns="91425" lIns="91425" spcFirstLastPara="1" rIns="91425" wrap="square" tIns="91425">
+            <a:noAutofit/>
+          </a:bodyPr>
+          <a:lstStyle/>
+          <a:p>
+            <a:pPr indent="0" lvl="0" marL="0" rtl="0" algn="l">
+              <a:spcBef>
+                <a:spcPts val="0"/>
+              </a:spcBef>
+              <a:spcAft>
+                <a:spcPts val="0"/>
+              </a:spcAft>
+              <a:buNone/>
+            </a:pPr>
+            <a:r>
+              <a:rPr lang="en"/>
+              <a:t>nanochat Tokenizer</a:t>
+            </a:r>
+            <a:endParaRPr/>
+          </a:p>
+        </p:txBody>
+      </p:sp>
+      <p:sp>
+        <p:nvSpPr>
+          <p:cNvPr id="157" name="Google Shape;157;g3b8409de4d6_0_108"/>
           <p:cNvSpPr txBox="1"/>
           <p:nvPr>
             <p:ph idx="1" type="body"/>
@@ -10329,6 +11862,285 @@
 </file>
 
 <file path=ppt/theme/theme1.xml><?xml version="1.0" encoding="utf-8"?>
+<a:theme xmlns:a="http://schemas.openxmlformats.org/drawingml/2006/main" xmlns:r="http://schemas.openxmlformats.org/officeDocument/2006/relationships" name="PB Theme">
+  <a:themeElements>
+    <a:clrScheme name="Custom 347">
+      <a:dk1>
+        <a:srgbClr val="000000"/>
+      </a:dk1>
+      <a:lt1>
+        <a:srgbClr val="FFFFFF"/>
+      </a:lt1>
+      <a:dk2>
+        <a:srgbClr val="666666"/>
+      </a:dk2>
+      <a:lt2>
+        <a:srgbClr val="CCCCCC"/>
+      </a:lt2>
+      <a:accent1>
+        <a:srgbClr val="3A81BA"/>
+      </a:accent1>
+      <a:accent2>
+        <a:srgbClr val="D89F39"/>
+      </a:accent2>
+      <a:accent3>
+        <a:srgbClr val="8BAB42"/>
+      </a:accent3>
+      <a:accent4>
+        <a:srgbClr val="57A7B5"/>
+      </a:accent4>
+      <a:accent5>
+        <a:srgbClr val="8B81D2"/>
+      </a:accent5>
+      <a:accent6>
+        <a:srgbClr val="963334"/>
+      </a:accent6>
+      <a:hlink>
+        <a:srgbClr val="1155CC"/>
+      </a:hlink>
+      <a:folHlink>
+        <a:srgbClr val="6611CC"/>
+      </a:folHlink>
+    </a:clrScheme>
+    <a:fontScheme name="Office">
+      <a:majorFont>
+        <a:latin typeface="Arial"/>
+        <a:ea typeface=""/>
+        <a:cs typeface=""/>
+        <a:font script="Jpan" typeface="ＭＳ Ｐゴシック"/>
+        <a:font script="Hang" typeface="맑은 고딕"/>
+        <a:font script="Hans" typeface="宋体"/>
+        <a:font script="Hant" typeface="新細明體"/>
+        <a:font script="Arab" typeface="Times New Roman"/>
+        <a:font script="Hebr" typeface="Times New Roman"/>
+        <a:font script="Thai" typeface="Angsana New"/>
+        <a:font script="Ethi" typeface="Nyala"/>
+        <a:font script="Beng" typeface="Vrinda"/>
+        <a:font script="Gujr" typeface="Shruti"/>
+        <a:font script="Khmr" typeface="MoolBoran"/>
+        <a:font script="Knda" typeface="Tunga"/>
+        <a:font script="Guru" typeface="Raavi"/>
+        <a:font script="Cans" typeface="Euphemia"/>
+        <a:font script="Cher" typeface="Plantagenet Cherokee"/>
+        <a:font script="Yiii" typeface="Microsoft Yi Baiti"/>
+        <a:font script="Tibt" typeface="Microsoft Himalaya"/>
+        <a:font script="Thaa" typeface="MV Boli"/>
+        <a:font script="Deva" typeface="Mangal"/>
+        <a:font script="Telu" typeface="Gautami"/>
+        <a:font script="Taml" typeface="Latha"/>
+        <a:font script="Syrc" typeface="Estrangelo Edessa"/>
+        <a:font script="Orya" typeface="Kalinga"/>
+        <a:font script="Mlym" typeface="Kartika"/>
+        <a:font script="Laoo" typeface="DokChampa"/>
+        <a:font script="Sinh" typeface="Iskoola Pota"/>
+        <a:font script="Mong" typeface="Mongolian Baiti"/>
+        <a:font script="Viet" typeface="Times New Roman"/>
+        <a:font script="Uigh" typeface="Microsoft Uighur"/>
+        <a:font script="Geor" typeface="Sylfaen"/>
+      </a:majorFont>
+      <a:minorFont>
+        <a:latin typeface="Arial"/>
+        <a:ea typeface=""/>
+        <a:cs typeface=""/>
+        <a:font script="Jpan" typeface="ＭＳ Ｐゴシック"/>
+        <a:font script="Hang" typeface="맑은 고딕"/>
+        <a:font script="Hans" typeface="宋体"/>
+        <a:font script="Hant" typeface="新細明體"/>
+        <a:font script="Arab" typeface="Arial"/>
+        <a:font script="Hebr" typeface="Arial"/>
+        <a:font script="Thai" typeface="Cordia New"/>
+        <a:font script="Ethi" typeface="Nyala"/>
+        <a:font script="Beng" typeface="Vrinda"/>
+        <a:font script="Gujr" typeface="Shruti"/>
+        <a:font script="Khmr" typeface="DaunPenh"/>
+        <a:font script="Knda" typeface="Tunga"/>
+        <a:font script="Guru" typeface="Raavi"/>
+        <a:font script="Cans" typeface="Euphemia"/>
+        <a:font script="Cher" typeface="Plantagenet Cherokee"/>
+        <a:font script="Yiii" typeface="Microsoft Yi Baiti"/>
+        <a:font script="Tibt" typeface="Microsoft Himalaya"/>
+        <a:font script="Thaa" typeface="MV Boli"/>
+        <a:font script="Deva" typeface="Mangal"/>
+        <a:font script="Telu" typeface="Gautami"/>
+        <a:font script="Taml" typeface="Latha"/>
+        <a:font script="Syrc" typeface="Estrangelo Edessa"/>
+        <a:font script="Orya" typeface="Kalinga"/>
+        <a:font script="Mlym" typeface="Kartika"/>
+        <a:font script="Laoo" typeface="DokChampa"/>
+        <a:font script="Sinh" typeface="Iskoola Pota"/>
+        <a:font script="Mong" typeface="Mongolian Baiti"/>
+        <a:font script="Viet" typeface="Arial"/>
+        <a:font script="Uigh" typeface="Microsoft Uighur"/>
+        <a:font script="Geor" typeface="Sylfaen"/>
+      </a:minorFont>
+    </a:fontScheme>
+    <a:fmtScheme name="Office">
+      <a:fillStyleLst>
+        <a:solidFill>
+          <a:schemeClr val="phClr"/>
+        </a:solidFill>
+        <a:gradFill rotWithShape="1">
+          <a:gsLst>
+            <a:gs pos="0">
+              <a:schemeClr val="phClr">
+                <a:tint val="50000"/>
+                <a:satMod val="300000"/>
+              </a:schemeClr>
+            </a:gs>
+            <a:gs pos="35000">
+              <a:schemeClr val="phClr">
+                <a:tint val="37000"/>
+                <a:satMod val="300000"/>
+              </a:schemeClr>
+            </a:gs>
+            <a:gs pos="100000">
+              <a:schemeClr val="phClr">
+                <a:tint val="15000"/>
+                <a:satMod val="350000"/>
+              </a:schemeClr>
+            </a:gs>
+          </a:gsLst>
+          <a:lin ang="16200000" scaled="1"/>
+        </a:gradFill>
+        <a:gradFill rotWithShape="1">
+          <a:gsLst>
+            <a:gs pos="0">
+              <a:schemeClr val="phClr">
+                <a:tint val="100000"/>
+                <a:shade val="100000"/>
+                <a:satMod val="130000"/>
+              </a:schemeClr>
+            </a:gs>
+            <a:gs pos="100000">
+              <a:schemeClr val="phClr">
+                <a:tint val="50000"/>
+                <a:shade val="100000"/>
+                <a:satMod val="350000"/>
+              </a:schemeClr>
+            </a:gs>
+          </a:gsLst>
+          <a:lin ang="16200000" scaled="0"/>
+        </a:gradFill>
+      </a:fillStyleLst>
+      <a:lnStyleLst>
+        <a:ln w="9525" cap="flat" cmpd="sng" algn="ctr">
+          <a:solidFill>
+            <a:schemeClr val="phClr">
+              <a:shade val="95000"/>
+              <a:satMod val="105000"/>
+            </a:schemeClr>
+          </a:solidFill>
+          <a:prstDash val="solid"/>
+        </a:ln>
+        <a:ln w="25400" cap="flat" cmpd="sng" algn="ctr">
+          <a:solidFill>
+            <a:schemeClr val="phClr"/>
+          </a:solidFill>
+          <a:prstDash val="solid"/>
+        </a:ln>
+        <a:ln w="38100" cap="flat" cmpd="sng" algn="ctr">
+          <a:solidFill>
+            <a:schemeClr val="phClr"/>
+          </a:solidFill>
+          <a:prstDash val="solid"/>
+        </a:ln>
+      </a:lnStyleLst>
+      <a:effectStyleLst>
+        <a:effectStyle>
+          <a:effectLst>
+            <a:outerShdw blurRad="40000" dist="20000" dir="5400000" rotWithShape="0">
+              <a:srgbClr val="000000">
+                <a:alpha val="38000"/>
+              </a:srgbClr>
+            </a:outerShdw>
+          </a:effectLst>
+        </a:effectStyle>
+        <a:effectStyle>
+          <a:effectLst>
+            <a:outerShdw blurRad="40000" dist="23000" dir="5400000" rotWithShape="0">
+              <a:srgbClr val="000000">
+                <a:alpha val="35000"/>
+              </a:srgbClr>
+            </a:outerShdw>
+          </a:effectLst>
+        </a:effectStyle>
+        <a:effectStyle>
+          <a:effectLst>
+            <a:outerShdw blurRad="40000" dist="23000" dir="5400000" rotWithShape="0">
+              <a:srgbClr val="000000">
+                <a:alpha val="35000"/>
+              </a:srgbClr>
+            </a:outerShdw>
+          </a:effectLst>
+          <a:scene3d>
+            <a:camera prst="orthographicFront">
+              <a:rot lat="0" lon="0" rev="0"/>
+            </a:camera>
+            <a:lightRig rig="threePt" dir="t">
+              <a:rot lat="0" lon="0" rev="1200000"/>
+            </a:lightRig>
+          </a:scene3d>
+          <a:sp3d>
+            <a:bevelT w="63500" h="25400"/>
+          </a:sp3d>
+        </a:effectStyle>
+      </a:effectStyleLst>
+      <a:bgFillStyleLst>
+        <a:solidFill>
+          <a:schemeClr val="phClr"/>
+        </a:solidFill>
+        <a:gradFill rotWithShape="1">
+          <a:gsLst>
+            <a:gs pos="0">
+              <a:schemeClr val="phClr">
+                <a:tint val="40000"/>
+                <a:satMod val="350000"/>
+              </a:schemeClr>
+            </a:gs>
+            <a:gs pos="40000">
+              <a:schemeClr val="phClr">
+                <a:tint val="45000"/>
+                <a:shade val="99000"/>
+                <a:satMod val="350000"/>
+              </a:schemeClr>
+            </a:gs>
+            <a:gs pos="100000">
+              <a:schemeClr val="phClr">
+                <a:shade val="20000"/>
+                <a:satMod val="255000"/>
+              </a:schemeClr>
+            </a:gs>
+          </a:gsLst>
+          <a:path path="circle">
+            <a:fillToRect l="50000" t="-80000" r="50000" b="180000"/>
+          </a:path>
+        </a:gradFill>
+        <a:gradFill rotWithShape="1">
+          <a:gsLst>
+            <a:gs pos="0">
+              <a:schemeClr val="phClr">
+                <a:tint val="80000"/>
+                <a:satMod val="300000"/>
+              </a:schemeClr>
+            </a:gs>
+            <a:gs pos="100000">
+              <a:schemeClr val="phClr">
+                <a:shade val="30000"/>
+                <a:satMod val="200000"/>
+              </a:schemeClr>
+            </a:gs>
+          </a:gsLst>
+          <a:path path="circle">
+            <a:fillToRect l="50000" t="50000" r="50000" b="50000"/>
+          </a:path>
+        </a:gradFill>
+      </a:bgFillStyleLst>
+    </a:fmtScheme>
+  </a:themeElements>
+</a:theme>
+</file>
+
+<file path=ppt/theme/theme2.xml><?xml version="1.0" encoding="utf-8"?>
 <a:theme xmlns:a="http://schemas.openxmlformats.org/drawingml/2006/main" xmlns:r="http://schemas.openxmlformats.org/officeDocument/2006/relationships">
   <a:themeElements>
     <a:clrScheme name="Default">
@@ -10605,283 +12417,4 @@
     </a:fmtScheme>
   </a:themeElements>
 </a:theme>
-</file>
-
-<file path=ppt/theme/theme2.xml><?xml version="1.0" encoding="utf-8"?>
-<a:theme xmlns:a="http://schemas.openxmlformats.org/drawingml/2006/main" xmlns:r="http://schemas.openxmlformats.org/officeDocument/2006/relationships" name="PB Theme">
-  <a:themeElements>
-    <a:clrScheme name="Custom 347">
-      <a:dk1>
-        <a:srgbClr val="000000"/>
-      </a:dk1>
-      <a:lt1>
-        <a:srgbClr val="FFFFFF"/>
-      </a:lt1>
-      <a:dk2>
-        <a:srgbClr val="666666"/>
-      </a:dk2>
-      <a:lt2>
-        <a:srgbClr val="CCCCCC"/>
-      </a:lt2>
-      <a:accent1>
-        <a:srgbClr val="3A81BA"/>
-      </a:accent1>
-      <a:accent2>
-        <a:srgbClr val="D89F39"/>
-      </a:accent2>
-      <a:accent3>
-        <a:srgbClr val="8BAB42"/>
-      </a:accent3>
-      <a:accent4>
-        <a:srgbClr val="57A7B5"/>
-      </a:accent4>
-      <a:accent5>
-        <a:srgbClr val="8B81D2"/>
-      </a:accent5>
-      <a:accent6>
-        <a:srgbClr val="963334"/>
-      </a:accent6>
-      <a:hlink>
-        <a:srgbClr val="1155CC"/>
-      </a:hlink>
-      <a:folHlink>
-        <a:srgbClr val="6611CC"/>
-      </a:folHlink>
-    </a:clrScheme>
-    <a:fontScheme name="Office">
-      <a:majorFont>
-        <a:latin typeface="Arial"/>
-        <a:ea typeface=""/>
-        <a:cs typeface=""/>
-        <a:font script="Jpan" typeface="ＭＳ Ｐゴシック"/>
-        <a:font script="Hang" typeface="맑은 고딕"/>
-        <a:font script="Hans" typeface="宋体"/>
-        <a:font script="Hant" typeface="新細明體"/>
-        <a:font script="Arab" typeface="Times New Roman"/>
-        <a:font script="Hebr" typeface="Times New Roman"/>
-        <a:font script="Thai" typeface="Angsana New"/>
-        <a:font script="Ethi" typeface="Nyala"/>
-        <a:font script="Beng" typeface="Vrinda"/>
-        <a:font script="Gujr" typeface="Shruti"/>
-        <a:font script="Khmr" typeface="MoolBoran"/>
-        <a:font script="Knda" typeface="Tunga"/>
-        <a:font script="Guru" typeface="Raavi"/>
-        <a:font script="Cans" typeface="Euphemia"/>
-        <a:font script="Cher" typeface="Plantagenet Cherokee"/>
-        <a:font script="Yiii" typeface="Microsoft Yi Baiti"/>
-        <a:font script="Tibt" typeface="Microsoft Himalaya"/>
-        <a:font script="Thaa" typeface="MV Boli"/>
-        <a:font script="Deva" typeface="Mangal"/>
-        <a:font script="Telu" typeface="Gautami"/>
-        <a:font script="Taml" typeface="Latha"/>
-        <a:font script="Syrc" typeface="Estrangelo Edessa"/>
-        <a:font script="Orya" typeface="Kalinga"/>
-        <a:font script="Mlym" typeface="Kartika"/>
-        <a:font script="Laoo" typeface="DokChampa"/>
-        <a:font script="Sinh" typeface="Iskoola Pota"/>
-        <a:font script="Mong" typeface="Mongolian Baiti"/>
-        <a:font script="Viet" typeface="Times New Roman"/>
-        <a:font script="Uigh" typeface="Microsoft Uighur"/>
-        <a:font script="Geor" typeface="Sylfaen"/>
-      </a:majorFont>
-      <a:minorFont>
-        <a:latin typeface="Arial"/>
-        <a:ea typeface=""/>
-        <a:cs typeface=""/>
-        <a:font script="Jpan" typeface="ＭＳ Ｐゴシック"/>
-        <a:font script="Hang" typeface="맑은 고딕"/>
-        <a:font script="Hans" typeface="宋体"/>
-        <a:font script="Hant" typeface="新細明體"/>
-        <a:font script="Arab" typeface="Arial"/>
-        <a:font script="Hebr" typeface="Arial"/>
-        <a:font script="Thai" typeface="Cordia New"/>
-        <a:font script="Ethi" typeface="Nyala"/>
-        <a:font script="Beng" typeface="Vrinda"/>
-        <a:font script="Gujr" typeface="Shruti"/>
-        <a:font script="Khmr" typeface="DaunPenh"/>
-        <a:font script="Knda" typeface="Tunga"/>
-        <a:font script="Guru" typeface="Raavi"/>
-        <a:font script="Cans" typeface="Euphemia"/>
-        <a:font script="Cher" typeface="Plantagenet Cherokee"/>
-        <a:font script="Yiii" typeface="Microsoft Yi Baiti"/>
-        <a:font script="Tibt" typeface="Microsoft Himalaya"/>
-        <a:font script="Thaa" typeface="MV Boli"/>
-        <a:font script="Deva" typeface="Mangal"/>
-        <a:font script="Telu" typeface="Gautami"/>
-        <a:font script="Taml" typeface="Latha"/>
-        <a:font script="Syrc" typeface="Estrangelo Edessa"/>
-        <a:font script="Orya" typeface="Kalinga"/>
-        <a:font script="Mlym" typeface="Kartika"/>
-        <a:font script="Laoo" typeface="DokChampa"/>
-        <a:font script="Sinh" typeface="Iskoola Pota"/>
-        <a:font script="Mong" typeface="Mongolian Baiti"/>
-        <a:font script="Viet" typeface="Arial"/>
-        <a:font script="Uigh" typeface="Microsoft Uighur"/>
-        <a:font script="Geor" typeface="Sylfaen"/>
-      </a:minorFont>
-    </a:fontScheme>
-    <a:fmtScheme name="Office">
-      <a:fillStyleLst>
-        <a:solidFill>
-          <a:schemeClr val="phClr"/>
-        </a:solidFill>
-        <a:gradFill rotWithShape="1">
-          <a:gsLst>
-            <a:gs pos="0">
-              <a:schemeClr val="phClr">
-                <a:tint val="50000"/>
-                <a:satMod val="300000"/>
-              </a:schemeClr>
-            </a:gs>
-            <a:gs pos="35000">
-              <a:schemeClr val="phClr">
-                <a:tint val="37000"/>
-                <a:satMod val="300000"/>
-              </a:schemeClr>
-            </a:gs>
-            <a:gs pos="100000">
-              <a:schemeClr val="phClr">
-                <a:tint val="15000"/>
-                <a:satMod val="350000"/>
-              </a:schemeClr>
-            </a:gs>
-          </a:gsLst>
-          <a:lin ang="16200000" scaled="1"/>
-        </a:gradFill>
-        <a:gradFill rotWithShape="1">
-          <a:gsLst>
-            <a:gs pos="0">
-              <a:schemeClr val="phClr">
-                <a:tint val="100000"/>
-                <a:shade val="100000"/>
-                <a:satMod val="130000"/>
-              </a:schemeClr>
-            </a:gs>
-            <a:gs pos="100000">
-              <a:schemeClr val="phClr">
-                <a:tint val="50000"/>
-                <a:shade val="100000"/>
-                <a:satMod val="350000"/>
-              </a:schemeClr>
-            </a:gs>
-          </a:gsLst>
-          <a:lin ang="16200000" scaled="0"/>
-        </a:gradFill>
-      </a:fillStyleLst>
-      <a:lnStyleLst>
-        <a:ln w="9525" cap="flat" cmpd="sng" algn="ctr">
-          <a:solidFill>
-            <a:schemeClr val="phClr">
-              <a:shade val="95000"/>
-              <a:satMod val="105000"/>
-            </a:schemeClr>
-          </a:solidFill>
-          <a:prstDash val="solid"/>
-        </a:ln>
-        <a:ln w="25400" cap="flat" cmpd="sng" algn="ctr">
-          <a:solidFill>
-            <a:schemeClr val="phClr"/>
-          </a:solidFill>
-          <a:prstDash val="solid"/>
-        </a:ln>
-        <a:ln w="38100" cap="flat" cmpd="sng" algn="ctr">
-          <a:solidFill>
-            <a:schemeClr val="phClr"/>
-          </a:solidFill>
-          <a:prstDash val="solid"/>
-        </a:ln>
-      </a:lnStyleLst>
-      <a:effectStyleLst>
-        <a:effectStyle>
-          <a:effectLst>
-            <a:outerShdw blurRad="40000" dist="20000" dir="5400000" rotWithShape="0">
-              <a:srgbClr val="000000">
-                <a:alpha val="38000"/>
-              </a:srgbClr>
-            </a:outerShdw>
-          </a:effectLst>
-        </a:effectStyle>
-        <a:effectStyle>
-          <a:effectLst>
-            <a:outerShdw blurRad="40000" dist="23000" dir="5400000" rotWithShape="0">
-              <a:srgbClr val="000000">
-                <a:alpha val="35000"/>
-              </a:srgbClr>
-            </a:outerShdw>
-          </a:effectLst>
-        </a:effectStyle>
-        <a:effectStyle>
-          <a:effectLst>
-            <a:outerShdw blurRad="40000" dist="23000" dir="5400000" rotWithShape="0">
-              <a:srgbClr val="000000">
-                <a:alpha val="35000"/>
-              </a:srgbClr>
-            </a:outerShdw>
-          </a:effectLst>
-          <a:scene3d>
-            <a:camera prst="orthographicFront">
-              <a:rot lat="0" lon="0" rev="0"/>
-            </a:camera>
-            <a:lightRig rig="threePt" dir="t">
-              <a:rot lat="0" lon="0" rev="1200000"/>
-            </a:lightRig>
-          </a:scene3d>
-          <a:sp3d>
-            <a:bevelT w="63500" h="25400"/>
-          </a:sp3d>
-        </a:effectStyle>
-      </a:effectStyleLst>
-      <a:bgFillStyleLst>
-        <a:solidFill>
-          <a:schemeClr val="phClr"/>
-        </a:solidFill>
-        <a:gradFill rotWithShape="1">
-          <a:gsLst>
-            <a:gs pos="0">
-              <a:schemeClr val="phClr">
-                <a:tint val="40000"/>
-                <a:satMod val="350000"/>
-              </a:schemeClr>
-            </a:gs>
-            <a:gs pos="40000">
-              <a:schemeClr val="phClr">
-                <a:tint val="45000"/>
-                <a:shade val="99000"/>
-                <a:satMod val="350000"/>
-              </a:schemeClr>
-            </a:gs>
-            <a:gs pos="100000">
-              <a:schemeClr val="phClr">
-                <a:shade val="20000"/>
-                <a:satMod val="255000"/>
-              </a:schemeClr>
-            </a:gs>
-          </a:gsLst>
-          <a:path path="circle">
-            <a:fillToRect l="50000" t="-80000" r="50000" b="180000"/>
-          </a:path>
-        </a:gradFill>
-        <a:gradFill rotWithShape="1">
-          <a:gsLst>
-            <a:gs pos="0">
-              <a:schemeClr val="phClr">
-                <a:tint val="80000"/>
-                <a:satMod val="300000"/>
-              </a:schemeClr>
-            </a:gs>
-            <a:gs pos="100000">
-              <a:schemeClr val="phClr">
-                <a:shade val="30000"/>
-                <a:satMod val="200000"/>
-              </a:schemeClr>
-            </a:gs>
-          </a:gsLst>
-          <a:path path="circle">
-            <a:fillToRect l="50000" t="50000" r="50000" b="50000"/>
-          </a:path>
-        </a:gradFill>
-      </a:bgFillStyleLst>
-    </a:fmtScheme>
-  </a:themeElements>
-</a:theme>
 </file>
</xml_diff>

<commit_message>
Adding some extra uts
</commit_message>
<xml_diff>
--- a/Blank/Lecture_03_ Tokenization.pptx
+++ b/Blank/Lecture_03_ Tokenization.pptx
@@ -27,6 +27,7 @@
     <p:sldId id="272" r:id="rId21"/>
     <p:sldId id="273" r:id="rId22"/>
     <p:sldId id="274" r:id="rId23"/>
+    <p:sldId id="275" r:id="rId24"/>
   </p:sldIdLst>
   <p:sldSz cy="6858000" cx="9144000"/>
   <p:notesSz cx="6858000" cy="9144000"/>
@@ -261,7 +262,7 @@
   </p:defaultTextStyle>
   <p:extLst>
     <p:ext uri="GoogleSlidesCustomDataVersion2">
-      <go:slidesCustomData xmlns:go="http://customooxmlschemas.google.com/" r:id="rId24" roundtripDataSignature="AMtx7mjNowJRmbtirrXgmjhBxZgqEWbJfw=="/>
+      <go:slidesCustomData xmlns:go="http://customooxmlschemas.google.com/" r:id="rId25" roundtripDataSignature="AMtx7mhD6PyUtI7kcVb0GboBjvrqZOLBPA=="/>
     </p:ext>
   </p:extLst>
 </p:presentation>
@@ -932,7 +933,7 @@
   <p:cSld>
     <p:spTree>
       <p:nvGrpSpPr>
-        <p:cNvPr id="95" name="Shape 95"/>
+        <p:cNvPr id="103" name="Shape 103"/>
         <p:cNvGrpSpPr/>
         <p:nvPr/>
       </p:nvGrpSpPr>
@@ -946,7 +947,7 @@
       </p:grpSpPr>
       <p:sp>
         <p:nvSpPr>
-          <p:cNvPr id="96" name="Google Shape;96;g3b8409de4d6_0_21:notes"/>
+          <p:cNvPr id="104" name="Google Shape;104;g3b938ea6dd9_0_11:notes"/>
           <p:cNvSpPr/>
           <p:nvPr>
             <p:ph idx="2" type="sldImg"/>
@@ -981,7 +982,7 @@
       </p:sp>
       <p:sp>
         <p:nvSpPr>
-          <p:cNvPr id="97" name="Google Shape;97;g3b8409de4d6_0_21:notes"/>
+          <p:cNvPr id="105" name="Google Shape;105;g3b938ea6dd9_0_11:notes"/>
           <p:cNvSpPr txBox="1"/>
           <p:nvPr>
             <p:ph idx="1" type="body"/>
@@ -1031,7 +1032,7 @@
   <p:cSld>
     <p:spTree>
       <p:nvGrpSpPr>
-        <p:cNvPr id="101" name="Shape 101"/>
+        <p:cNvPr id="109" name="Shape 109"/>
         <p:cNvGrpSpPr/>
         <p:nvPr/>
       </p:nvGrpSpPr>
@@ -1045,403 +1046,7 @@
       </p:grpSpPr>
       <p:sp>
         <p:nvSpPr>
-          <p:cNvPr id="102" name="Google Shape;102;g3b8409de4d6_0_28:notes"/>
-          <p:cNvSpPr/>
-          <p:nvPr>
-            <p:ph idx="2" type="sldImg"/>
-          </p:nvPr>
-        </p:nvSpPr>
-        <p:spPr>
-          <a:xfrm>
-            <a:off x="1143309" y="685800"/>
-            <a:ext cx="4572000" cy="3429000"/>
-          </a:xfrm>
-          <a:custGeom>
-            <a:rect b="b" l="l" r="r" t="t"/>
-            <a:pathLst>
-              <a:path extrusionOk="0" h="120000" w="120000">
-                <a:moveTo>
-                  <a:pt x="0" y="0"/>
-                </a:moveTo>
-                <a:lnTo>
-                  <a:pt x="120000" y="0"/>
-                </a:lnTo>
-                <a:lnTo>
-                  <a:pt x="120000" y="120000"/>
-                </a:lnTo>
-                <a:lnTo>
-                  <a:pt x="0" y="120000"/>
-                </a:lnTo>
-                <a:close/>
-              </a:path>
-            </a:pathLst>
-          </a:custGeom>
-        </p:spPr>
-      </p:sp>
-      <p:sp>
-        <p:nvSpPr>
-          <p:cNvPr id="103" name="Google Shape;103;g3b8409de4d6_0_28:notes"/>
-          <p:cNvSpPr txBox="1"/>
-          <p:nvPr>
-            <p:ph idx="1" type="body"/>
-          </p:nvPr>
-        </p:nvSpPr>
-        <p:spPr>
-          <a:xfrm>
-            <a:off x="685800" y="4343400"/>
-            <a:ext cx="5486400" cy="4114800"/>
-          </a:xfrm>
-          <a:prstGeom prst="rect">
-            <a:avLst/>
-          </a:prstGeom>
-        </p:spPr>
-        <p:txBody>
-          <a:bodyPr anchorCtr="0" anchor="t" bIns="91425" lIns="91425" spcFirstLastPara="1" rIns="91425" wrap="square" tIns="91425">
-            <a:noAutofit/>
-          </a:bodyPr>
-          <a:lstStyle/>
-          <a:p>
-            <a:pPr indent="0" lvl="0" marL="0" rtl="0" algn="l">
-              <a:spcBef>
-                <a:spcPts val="0"/>
-              </a:spcBef>
-              <a:spcAft>
-                <a:spcPts val="0"/>
-              </a:spcAft>
-              <a:buNone/>
-            </a:pPr>
-            <a:r>
-              <a:t/>
-            </a:r>
-            <a:endParaRPr/>
-          </a:p>
-        </p:txBody>
-      </p:sp>
-    </p:spTree>
-  </p:cSld>
-  <p:clrMapOvr>
-    <a:masterClrMapping/>
-  </p:clrMapOvr>
-</p:notes>
-</file>
-
-<file path=ppt/notesSlides/notesSlide12.xml><?xml version="1.0" encoding="utf-8"?>
-<p:notes xmlns:a="http://schemas.openxmlformats.org/drawingml/2006/main" xmlns:r="http://schemas.openxmlformats.org/officeDocument/2006/relationships" xmlns:mc="http://schemas.openxmlformats.org/markup-compatibility/2006" xmlns:mv="urn:schemas-microsoft-com:mac:vml" xmlns:p="http://schemas.openxmlformats.org/presentationml/2006/main" xmlns:c="http://schemas.openxmlformats.org/drawingml/2006/chart" xmlns:dgm="http://schemas.openxmlformats.org/drawingml/2006/diagram" xmlns:o="urn:schemas-microsoft-com:office:office" xmlns:v="urn:schemas-microsoft-com:vml" xmlns:pvml="urn:schemas-microsoft-com:office:powerpoint" xmlns:com="http://schemas.openxmlformats.org/drawingml/2006/compatibility" xmlns:p14="http://schemas.microsoft.com/office/powerpoint/2010/main" xmlns:p15="http://schemas.microsoft.com/office/powerpoint/2012/main" xmlns:ahyp="http://schemas.microsoft.com/office/drawing/2018/hyperlinkcolor" showMasterPhAnim="0" showMasterSp="0">
-  <p:cSld>
-    <p:spTree>
-      <p:nvGrpSpPr>
-        <p:cNvPr id="107" name="Shape 107"/>
-        <p:cNvGrpSpPr/>
-        <p:nvPr/>
-      </p:nvGrpSpPr>
-      <p:grpSpPr>
-        <a:xfrm>
-          <a:off x="0" y="0"/>
-          <a:ext cx="0" cy="0"/>
-          <a:chOff x="0" y="0"/>
-          <a:chExt cx="0" cy="0"/>
-        </a:xfrm>
-      </p:grpSpPr>
-      <p:sp>
-        <p:nvSpPr>
-          <p:cNvPr id="108" name="Google Shape;108;g3b8409de4d6_0_4:notes"/>
-          <p:cNvSpPr/>
-          <p:nvPr>
-            <p:ph idx="2" type="sldImg"/>
-          </p:nvPr>
-        </p:nvSpPr>
-        <p:spPr>
-          <a:xfrm>
-            <a:off x="1143309" y="685800"/>
-            <a:ext cx="4572000" cy="3429000"/>
-          </a:xfrm>
-          <a:custGeom>
-            <a:rect b="b" l="l" r="r" t="t"/>
-            <a:pathLst>
-              <a:path extrusionOk="0" h="120000" w="120000">
-                <a:moveTo>
-                  <a:pt x="0" y="0"/>
-                </a:moveTo>
-                <a:lnTo>
-                  <a:pt x="120000" y="0"/>
-                </a:lnTo>
-                <a:lnTo>
-                  <a:pt x="120000" y="120000"/>
-                </a:lnTo>
-                <a:lnTo>
-                  <a:pt x="0" y="120000"/>
-                </a:lnTo>
-                <a:close/>
-              </a:path>
-            </a:pathLst>
-          </a:custGeom>
-        </p:spPr>
-      </p:sp>
-      <p:sp>
-        <p:nvSpPr>
-          <p:cNvPr id="109" name="Google Shape;109;g3b8409de4d6_0_4:notes"/>
-          <p:cNvSpPr txBox="1"/>
-          <p:nvPr>
-            <p:ph idx="1" type="body"/>
-          </p:nvPr>
-        </p:nvSpPr>
-        <p:spPr>
-          <a:xfrm>
-            <a:off x="685800" y="4343400"/>
-            <a:ext cx="5486400" cy="4114800"/>
-          </a:xfrm>
-          <a:prstGeom prst="rect">
-            <a:avLst/>
-          </a:prstGeom>
-        </p:spPr>
-        <p:txBody>
-          <a:bodyPr anchorCtr="0" anchor="t" bIns="91425" lIns="91425" spcFirstLastPara="1" rIns="91425" wrap="square" tIns="91425">
-            <a:noAutofit/>
-          </a:bodyPr>
-          <a:lstStyle/>
-          <a:p>
-            <a:pPr indent="0" lvl="0" marL="0" rtl="0" algn="l">
-              <a:spcBef>
-                <a:spcPts val="0"/>
-              </a:spcBef>
-              <a:spcAft>
-                <a:spcPts val="0"/>
-              </a:spcAft>
-              <a:buNone/>
-            </a:pPr>
-            <a:r>
-              <a:t/>
-            </a:r>
-            <a:endParaRPr/>
-          </a:p>
-        </p:txBody>
-      </p:sp>
-    </p:spTree>
-  </p:cSld>
-  <p:clrMapOvr>
-    <a:masterClrMapping/>
-  </p:clrMapOvr>
-</p:notes>
-</file>
-
-<file path=ppt/notesSlides/notesSlide13.xml><?xml version="1.0" encoding="utf-8"?>
-<p:notes xmlns:a="http://schemas.openxmlformats.org/drawingml/2006/main" xmlns:r="http://schemas.openxmlformats.org/officeDocument/2006/relationships" xmlns:mc="http://schemas.openxmlformats.org/markup-compatibility/2006" xmlns:mv="urn:schemas-microsoft-com:mac:vml" xmlns:p="http://schemas.openxmlformats.org/presentationml/2006/main" xmlns:c="http://schemas.openxmlformats.org/drawingml/2006/chart" xmlns:dgm="http://schemas.openxmlformats.org/drawingml/2006/diagram" xmlns:o="urn:schemas-microsoft-com:office:office" xmlns:v="urn:schemas-microsoft-com:vml" xmlns:pvml="urn:schemas-microsoft-com:office:powerpoint" xmlns:com="http://schemas.openxmlformats.org/drawingml/2006/compatibility" xmlns:p14="http://schemas.microsoft.com/office/powerpoint/2010/main" xmlns:p15="http://schemas.microsoft.com/office/powerpoint/2012/main" xmlns:ahyp="http://schemas.microsoft.com/office/drawing/2018/hyperlinkcolor" showMasterPhAnim="0" showMasterSp="0">
-  <p:cSld>
-    <p:spTree>
-      <p:nvGrpSpPr>
-        <p:cNvPr id="113" name="Shape 113"/>
-        <p:cNvGrpSpPr/>
-        <p:nvPr/>
-      </p:nvGrpSpPr>
-      <p:grpSpPr>
-        <a:xfrm>
-          <a:off x="0" y="0"/>
-          <a:ext cx="0" cy="0"/>
-          <a:chOff x="0" y="0"/>
-          <a:chExt cx="0" cy="0"/>
-        </a:xfrm>
-      </p:grpSpPr>
-      <p:sp>
-        <p:nvSpPr>
-          <p:cNvPr id="114" name="Google Shape;114;g3b8409de4d6_0_35:notes"/>
-          <p:cNvSpPr/>
-          <p:nvPr>
-            <p:ph idx="2" type="sldImg"/>
-          </p:nvPr>
-        </p:nvSpPr>
-        <p:spPr>
-          <a:xfrm>
-            <a:off x="1143309" y="685800"/>
-            <a:ext cx="4572000" cy="3429000"/>
-          </a:xfrm>
-          <a:custGeom>
-            <a:rect b="b" l="l" r="r" t="t"/>
-            <a:pathLst>
-              <a:path extrusionOk="0" h="120000" w="120000">
-                <a:moveTo>
-                  <a:pt x="0" y="0"/>
-                </a:moveTo>
-                <a:lnTo>
-                  <a:pt x="120000" y="0"/>
-                </a:lnTo>
-                <a:lnTo>
-                  <a:pt x="120000" y="120000"/>
-                </a:lnTo>
-                <a:lnTo>
-                  <a:pt x="0" y="120000"/>
-                </a:lnTo>
-                <a:close/>
-              </a:path>
-            </a:pathLst>
-          </a:custGeom>
-        </p:spPr>
-      </p:sp>
-      <p:sp>
-        <p:nvSpPr>
-          <p:cNvPr id="115" name="Google Shape;115;g3b8409de4d6_0_35:notes"/>
-          <p:cNvSpPr txBox="1"/>
-          <p:nvPr>
-            <p:ph idx="1" type="body"/>
-          </p:nvPr>
-        </p:nvSpPr>
-        <p:spPr>
-          <a:xfrm>
-            <a:off x="685800" y="4343400"/>
-            <a:ext cx="5486400" cy="4114800"/>
-          </a:xfrm>
-          <a:prstGeom prst="rect">
-            <a:avLst/>
-          </a:prstGeom>
-        </p:spPr>
-        <p:txBody>
-          <a:bodyPr anchorCtr="0" anchor="t" bIns="91425" lIns="91425" spcFirstLastPara="1" rIns="91425" wrap="square" tIns="91425">
-            <a:noAutofit/>
-          </a:bodyPr>
-          <a:lstStyle/>
-          <a:p>
-            <a:pPr indent="0" lvl="0" marL="0" rtl="0" algn="l">
-              <a:spcBef>
-                <a:spcPts val="0"/>
-              </a:spcBef>
-              <a:spcAft>
-                <a:spcPts val="0"/>
-              </a:spcAft>
-              <a:buNone/>
-            </a:pPr>
-            <a:r>
-              <a:t/>
-            </a:r>
-            <a:endParaRPr/>
-          </a:p>
-        </p:txBody>
-      </p:sp>
-    </p:spTree>
-  </p:cSld>
-  <p:clrMapOvr>
-    <a:masterClrMapping/>
-  </p:clrMapOvr>
-</p:notes>
-</file>
-
-<file path=ppt/notesSlides/notesSlide14.xml><?xml version="1.0" encoding="utf-8"?>
-<p:notes xmlns:a="http://schemas.openxmlformats.org/drawingml/2006/main" xmlns:r="http://schemas.openxmlformats.org/officeDocument/2006/relationships" xmlns:mc="http://schemas.openxmlformats.org/markup-compatibility/2006" xmlns:mv="urn:schemas-microsoft-com:mac:vml" xmlns:p="http://schemas.openxmlformats.org/presentationml/2006/main" xmlns:c="http://schemas.openxmlformats.org/drawingml/2006/chart" xmlns:dgm="http://schemas.openxmlformats.org/drawingml/2006/diagram" xmlns:o="urn:schemas-microsoft-com:office:office" xmlns:v="urn:schemas-microsoft-com:vml" xmlns:pvml="urn:schemas-microsoft-com:office:powerpoint" xmlns:com="http://schemas.openxmlformats.org/drawingml/2006/compatibility" xmlns:p14="http://schemas.microsoft.com/office/powerpoint/2010/main" xmlns:p15="http://schemas.microsoft.com/office/powerpoint/2012/main" xmlns:ahyp="http://schemas.microsoft.com/office/drawing/2018/hyperlinkcolor" showMasterPhAnim="0" showMasterSp="0">
-  <p:cSld>
-    <p:spTree>
-      <p:nvGrpSpPr>
-        <p:cNvPr id="119" name="Shape 119"/>
-        <p:cNvGrpSpPr/>
-        <p:nvPr/>
-      </p:nvGrpSpPr>
-      <p:grpSpPr>
-        <a:xfrm>
-          <a:off x="0" y="0"/>
-          <a:ext cx="0" cy="0"/>
-          <a:chOff x="0" y="0"/>
-          <a:chExt cx="0" cy="0"/>
-        </a:xfrm>
-      </p:grpSpPr>
-      <p:sp>
-        <p:nvSpPr>
-          <p:cNvPr id="120" name="Google Shape;120;g3b8409de4d6_0_103:notes"/>
-          <p:cNvSpPr/>
-          <p:nvPr>
-            <p:ph idx="2" type="sldImg"/>
-          </p:nvPr>
-        </p:nvSpPr>
-        <p:spPr>
-          <a:xfrm>
-            <a:off x="1143309" y="685800"/>
-            <a:ext cx="4572000" cy="3429000"/>
-          </a:xfrm>
-          <a:custGeom>
-            <a:rect b="b" l="l" r="r" t="t"/>
-            <a:pathLst>
-              <a:path extrusionOk="0" h="120000" w="120000">
-                <a:moveTo>
-                  <a:pt x="0" y="0"/>
-                </a:moveTo>
-                <a:lnTo>
-                  <a:pt x="120000" y="0"/>
-                </a:lnTo>
-                <a:lnTo>
-                  <a:pt x="120000" y="120000"/>
-                </a:lnTo>
-                <a:lnTo>
-                  <a:pt x="0" y="120000"/>
-                </a:lnTo>
-                <a:close/>
-              </a:path>
-            </a:pathLst>
-          </a:custGeom>
-        </p:spPr>
-      </p:sp>
-      <p:sp>
-        <p:nvSpPr>
-          <p:cNvPr id="121" name="Google Shape;121;g3b8409de4d6_0_103:notes"/>
-          <p:cNvSpPr txBox="1"/>
-          <p:nvPr>
-            <p:ph idx="1" type="body"/>
-          </p:nvPr>
-        </p:nvSpPr>
-        <p:spPr>
-          <a:xfrm>
-            <a:off x="685800" y="4343400"/>
-            <a:ext cx="5486400" cy="4114800"/>
-          </a:xfrm>
-          <a:prstGeom prst="rect">
-            <a:avLst/>
-          </a:prstGeom>
-        </p:spPr>
-        <p:txBody>
-          <a:bodyPr anchorCtr="0" anchor="t" bIns="91425" lIns="91425" spcFirstLastPara="1" rIns="91425" wrap="square" tIns="91425">
-            <a:noAutofit/>
-          </a:bodyPr>
-          <a:lstStyle/>
-          <a:p>
-            <a:pPr indent="0" lvl="0" marL="0" rtl="0" algn="l">
-              <a:spcBef>
-                <a:spcPts val="0"/>
-              </a:spcBef>
-              <a:spcAft>
-                <a:spcPts val="0"/>
-              </a:spcAft>
-              <a:buNone/>
-            </a:pPr>
-            <a:r>
-              <a:t/>
-            </a:r>
-            <a:endParaRPr/>
-          </a:p>
-        </p:txBody>
-      </p:sp>
-    </p:spTree>
-  </p:cSld>
-  <p:clrMapOvr>
-    <a:masterClrMapping/>
-  </p:clrMapOvr>
-</p:notes>
-</file>
-
-<file path=ppt/notesSlides/notesSlide15.xml><?xml version="1.0" encoding="utf-8"?>
-<p:notes xmlns:a="http://schemas.openxmlformats.org/drawingml/2006/main" xmlns:r="http://schemas.openxmlformats.org/officeDocument/2006/relationships" xmlns:mc="http://schemas.openxmlformats.org/markup-compatibility/2006" xmlns:mv="urn:schemas-microsoft-com:mac:vml" xmlns:p="http://schemas.openxmlformats.org/presentationml/2006/main" xmlns:c="http://schemas.openxmlformats.org/drawingml/2006/chart" xmlns:dgm="http://schemas.openxmlformats.org/drawingml/2006/diagram" xmlns:o="urn:schemas-microsoft-com:office:office" xmlns:v="urn:schemas-microsoft-com:vml" xmlns:pvml="urn:schemas-microsoft-com:office:powerpoint" xmlns:com="http://schemas.openxmlformats.org/drawingml/2006/compatibility" xmlns:p14="http://schemas.microsoft.com/office/powerpoint/2010/main" xmlns:p15="http://schemas.microsoft.com/office/powerpoint/2012/main" xmlns:ahyp="http://schemas.microsoft.com/office/drawing/2018/hyperlinkcolor" showMasterPhAnim="0" showMasterSp="0">
-  <p:cSld>
-    <p:spTree>
-      <p:nvGrpSpPr>
-        <p:cNvPr id="125" name="Shape 125"/>
-        <p:cNvGrpSpPr/>
-        <p:nvPr/>
-      </p:nvGrpSpPr>
-      <p:grpSpPr>
-        <a:xfrm>
-          <a:off x="0" y="0"/>
-          <a:ext cx="0" cy="0"/>
-          <a:chOff x="0" y="0"/>
-          <a:chExt cx="0" cy="0"/>
-        </a:xfrm>
-      </p:grpSpPr>
-      <p:sp>
-        <p:nvSpPr>
-          <p:cNvPr id="126" name="Google Shape;126;g3b8409de4d6_0_95:notes"/>
+          <p:cNvPr id="110" name="Google Shape;110;g3ba79990f52_0_5:notes"/>
           <p:cNvSpPr/>
           <p:nvPr>
             <p:ph idx="2" type="sldImg"/>
@@ -1486,7 +1091,7 @@
       </p:sp>
       <p:sp>
         <p:nvSpPr>
-          <p:cNvPr id="127" name="Google Shape;127;g3b8409de4d6_0_95:notes"/>
+          <p:cNvPr id="111" name="Google Shape;111;g3ba79990f52_0_5:notes"/>
           <p:cNvSpPr txBox="1"/>
           <p:nvPr>
             <p:ph idx="1" type="body"/>
@@ -1539,12 +1144,12 @@
 </p:notes>
 </file>
 
-<file path=ppt/notesSlides/notesSlide16.xml><?xml version="1.0" encoding="utf-8"?>
+<file path=ppt/notesSlides/notesSlide12.xml><?xml version="1.0" encoding="utf-8"?>
 <p:notes xmlns:a="http://schemas.openxmlformats.org/drawingml/2006/main" xmlns:r="http://schemas.openxmlformats.org/officeDocument/2006/relationships" xmlns:mc="http://schemas.openxmlformats.org/markup-compatibility/2006" xmlns:mv="urn:schemas-microsoft-com:mac:vml" xmlns:p="http://schemas.openxmlformats.org/presentationml/2006/main" xmlns:c="http://schemas.openxmlformats.org/drawingml/2006/chart" xmlns:dgm="http://schemas.openxmlformats.org/drawingml/2006/diagram" xmlns:o="urn:schemas-microsoft-com:office:office" xmlns:v="urn:schemas-microsoft-com:vml" xmlns:pvml="urn:schemas-microsoft-com:office:powerpoint" xmlns:com="http://schemas.openxmlformats.org/drawingml/2006/compatibility" xmlns:p14="http://schemas.microsoft.com/office/powerpoint/2010/main" xmlns:p15="http://schemas.microsoft.com/office/powerpoint/2012/main" xmlns:ahyp="http://schemas.microsoft.com/office/drawing/2018/hyperlinkcolor" showMasterPhAnim="0" showMasterSp="0">
   <p:cSld>
     <p:spTree>
       <p:nvGrpSpPr>
-        <p:cNvPr id="134" name="Shape 134"/>
+        <p:cNvPr id="118" name="Shape 118"/>
         <p:cNvGrpSpPr/>
         <p:nvPr/>
       </p:nvGrpSpPr>
@@ -1558,7 +1163,7 @@
       </p:grpSpPr>
       <p:sp>
         <p:nvSpPr>
-          <p:cNvPr id="135" name="Google Shape;135;g3b8409de4d6_0_40:notes"/>
+          <p:cNvPr id="119" name="Google Shape;119;g3b938ea6dd9_0_16:notes"/>
           <p:cNvSpPr/>
           <p:nvPr>
             <p:ph idx="2" type="sldImg"/>
@@ -1593,7 +1198,7 @@
       </p:sp>
       <p:sp>
         <p:nvSpPr>
-          <p:cNvPr id="136" name="Google Shape;136;g3b8409de4d6_0_40:notes"/>
+          <p:cNvPr id="120" name="Google Shape;120;g3b938ea6dd9_0_16:notes"/>
           <p:cNvSpPr txBox="1"/>
           <p:nvPr>
             <p:ph idx="1" type="body"/>
@@ -1638,12 +1243,12 @@
 </p:notes>
 </file>
 
-<file path=ppt/notesSlides/notesSlide17.xml><?xml version="1.0" encoding="utf-8"?>
+<file path=ppt/notesSlides/notesSlide13.xml><?xml version="1.0" encoding="utf-8"?>
 <p:notes xmlns:a="http://schemas.openxmlformats.org/drawingml/2006/main" xmlns:r="http://schemas.openxmlformats.org/officeDocument/2006/relationships" xmlns:mc="http://schemas.openxmlformats.org/markup-compatibility/2006" xmlns:mv="urn:schemas-microsoft-com:mac:vml" xmlns:p="http://schemas.openxmlformats.org/presentationml/2006/main" xmlns:c="http://schemas.openxmlformats.org/drawingml/2006/chart" xmlns:dgm="http://schemas.openxmlformats.org/drawingml/2006/diagram" xmlns:o="urn:schemas-microsoft-com:office:office" xmlns:v="urn:schemas-microsoft-com:vml" xmlns:pvml="urn:schemas-microsoft-com:office:powerpoint" xmlns:com="http://schemas.openxmlformats.org/drawingml/2006/compatibility" xmlns:p14="http://schemas.microsoft.com/office/powerpoint/2010/main" xmlns:p15="http://schemas.microsoft.com/office/powerpoint/2012/main" xmlns:ahyp="http://schemas.microsoft.com/office/drawing/2018/hyperlinkcolor" showMasterPhAnim="0" showMasterSp="0">
   <p:cSld>
     <p:spTree>
       <p:nvGrpSpPr>
-        <p:cNvPr id="140" name="Shape 140"/>
+        <p:cNvPr id="124" name="Shape 124"/>
         <p:cNvGrpSpPr/>
         <p:nvPr/>
       </p:nvGrpSpPr>
@@ -1657,7 +1262,7 @@
       </p:grpSpPr>
       <p:sp>
         <p:nvSpPr>
-          <p:cNvPr id="141" name="Google Shape;141;g3b8409de4d6_0_118:notes"/>
+          <p:cNvPr id="125" name="Google Shape;125;g3b8409de4d6_0_9:notes"/>
           <p:cNvSpPr/>
           <p:nvPr>
             <p:ph idx="2" type="sldImg"/>
@@ -1692,7 +1297,7 @@
       </p:sp>
       <p:sp>
         <p:nvSpPr>
-          <p:cNvPr id="142" name="Google Shape;142;g3b8409de4d6_0_118:notes"/>
+          <p:cNvPr id="126" name="Google Shape;126;g3b8409de4d6_0_9:notes"/>
           <p:cNvSpPr txBox="1"/>
           <p:nvPr>
             <p:ph idx="1" type="body"/>
@@ -1737,12 +1342,12 @@
 </p:notes>
 </file>
 
-<file path=ppt/notesSlides/notesSlide18.xml><?xml version="1.0" encoding="utf-8"?>
+<file path=ppt/notesSlides/notesSlide14.xml><?xml version="1.0" encoding="utf-8"?>
 <p:notes xmlns:a="http://schemas.openxmlformats.org/drawingml/2006/main" xmlns:r="http://schemas.openxmlformats.org/officeDocument/2006/relationships" xmlns:mc="http://schemas.openxmlformats.org/markup-compatibility/2006" xmlns:mv="urn:schemas-microsoft-com:mac:vml" xmlns:p="http://schemas.openxmlformats.org/presentationml/2006/main" xmlns:c="http://schemas.openxmlformats.org/drawingml/2006/chart" xmlns:dgm="http://schemas.openxmlformats.org/drawingml/2006/diagram" xmlns:o="urn:schemas-microsoft-com:office:office" xmlns:v="urn:schemas-microsoft-com:vml" xmlns:pvml="urn:schemas-microsoft-com:office:powerpoint" xmlns:com="http://schemas.openxmlformats.org/drawingml/2006/compatibility" xmlns:p14="http://schemas.microsoft.com/office/powerpoint/2010/main" xmlns:p15="http://schemas.microsoft.com/office/powerpoint/2012/main" xmlns:ahyp="http://schemas.microsoft.com/office/drawing/2018/hyperlinkcolor" showMasterPhAnim="0" showMasterSp="0">
   <p:cSld>
     <p:spTree>
       <p:nvGrpSpPr>
-        <p:cNvPr id="146" name="Shape 146"/>
+        <p:cNvPr id="130" name="Shape 130"/>
         <p:cNvGrpSpPr/>
         <p:nvPr/>
       </p:nvGrpSpPr>
@@ -1756,7 +1361,7 @@
       </p:grpSpPr>
       <p:sp>
         <p:nvSpPr>
-          <p:cNvPr id="147" name="Google Shape;147;g3b8409de4d6_0_126:notes"/>
+          <p:cNvPr id="131" name="Google Shape;131;g3b8409de4d6_0_4:notes"/>
           <p:cNvSpPr/>
           <p:nvPr>
             <p:ph idx="2" type="sldImg"/>
@@ -1791,7 +1396,7 @@
       </p:sp>
       <p:sp>
         <p:nvSpPr>
-          <p:cNvPr id="148" name="Google Shape;148;g3b8409de4d6_0_126:notes"/>
+          <p:cNvPr id="132" name="Google Shape;132;g3b8409de4d6_0_4:notes"/>
           <p:cNvSpPr txBox="1"/>
           <p:nvPr>
             <p:ph idx="1" type="body"/>
@@ -1836,12 +1441,12 @@
 </p:notes>
 </file>
 
-<file path=ppt/notesSlides/notesSlide19.xml><?xml version="1.0" encoding="utf-8"?>
+<file path=ppt/notesSlides/notesSlide15.xml><?xml version="1.0" encoding="utf-8"?>
 <p:notes xmlns:a="http://schemas.openxmlformats.org/drawingml/2006/main" xmlns:r="http://schemas.openxmlformats.org/officeDocument/2006/relationships" xmlns:mc="http://schemas.openxmlformats.org/markup-compatibility/2006" xmlns:mv="urn:schemas-microsoft-com:mac:vml" xmlns:p="http://schemas.openxmlformats.org/presentationml/2006/main" xmlns:c="http://schemas.openxmlformats.org/drawingml/2006/chart" xmlns:dgm="http://schemas.openxmlformats.org/drawingml/2006/diagram" xmlns:o="urn:schemas-microsoft-com:office:office" xmlns:v="urn:schemas-microsoft-com:vml" xmlns:pvml="urn:schemas-microsoft-com:office:powerpoint" xmlns:com="http://schemas.openxmlformats.org/drawingml/2006/compatibility" xmlns:p14="http://schemas.microsoft.com/office/powerpoint/2010/main" xmlns:p15="http://schemas.microsoft.com/office/powerpoint/2012/main" xmlns:ahyp="http://schemas.microsoft.com/office/drawing/2018/hyperlinkcolor" showMasterPhAnim="0" showMasterSp="0">
   <p:cSld>
     <p:spTree>
       <p:nvGrpSpPr>
-        <p:cNvPr id="152" name="Shape 152"/>
+        <p:cNvPr id="136" name="Shape 136"/>
         <p:cNvGrpSpPr/>
         <p:nvPr/>
       </p:nvGrpSpPr>
@@ -1855,7 +1460,7 @@
       </p:grpSpPr>
       <p:sp>
         <p:nvSpPr>
-          <p:cNvPr id="153" name="Google Shape;153;g3b8409de4d6_0_108:notes"/>
+          <p:cNvPr id="137" name="Google Shape;137;g3b8409de4d6_0_103:notes"/>
           <p:cNvSpPr/>
           <p:nvPr>
             <p:ph idx="2" type="sldImg"/>
@@ -1890,7 +1495,421 @@
       </p:sp>
       <p:sp>
         <p:nvSpPr>
-          <p:cNvPr id="154" name="Google Shape;154;g3b8409de4d6_0_108:notes"/>
+          <p:cNvPr id="138" name="Google Shape;138;g3b8409de4d6_0_103:notes"/>
+          <p:cNvSpPr txBox="1"/>
+          <p:nvPr>
+            <p:ph idx="1" type="body"/>
+          </p:nvPr>
+        </p:nvSpPr>
+        <p:spPr>
+          <a:xfrm>
+            <a:off x="685800" y="4343400"/>
+            <a:ext cx="5486400" cy="4114800"/>
+          </a:xfrm>
+          <a:prstGeom prst="rect">
+            <a:avLst/>
+          </a:prstGeom>
+        </p:spPr>
+        <p:txBody>
+          <a:bodyPr anchorCtr="0" anchor="t" bIns="91425" lIns="91425" spcFirstLastPara="1" rIns="91425" wrap="square" tIns="91425">
+            <a:noAutofit/>
+          </a:bodyPr>
+          <a:lstStyle/>
+          <a:p>
+            <a:pPr indent="0" lvl="0" marL="0" rtl="0" algn="l">
+              <a:spcBef>
+                <a:spcPts val="0"/>
+              </a:spcBef>
+              <a:spcAft>
+                <a:spcPts val="0"/>
+              </a:spcAft>
+              <a:buNone/>
+            </a:pPr>
+            <a:r>
+              <a:t/>
+            </a:r>
+            <a:endParaRPr/>
+          </a:p>
+        </p:txBody>
+      </p:sp>
+    </p:spTree>
+  </p:cSld>
+  <p:clrMapOvr>
+    <a:masterClrMapping/>
+  </p:clrMapOvr>
+</p:notes>
+</file>
+
+<file path=ppt/notesSlides/notesSlide16.xml><?xml version="1.0" encoding="utf-8"?>
+<p:notes xmlns:a="http://schemas.openxmlformats.org/drawingml/2006/main" xmlns:r="http://schemas.openxmlformats.org/officeDocument/2006/relationships" xmlns:mc="http://schemas.openxmlformats.org/markup-compatibility/2006" xmlns:mv="urn:schemas-microsoft-com:mac:vml" xmlns:p="http://schemas.openxmlformats.org/presentationml/2006/main" xmlns:c="http://schemas.openxmlformats.org/drawingml/2006/chart" xmlns:dgm="http://schemas.openxmlformats.org/drawingml/2006/diagram" xmlns:o="urn:schemas-microsoft-com:office:office" xmlns:v="urn:schemas-microsoft-com:vml" xmlns:pvml="urn:schemas-microsoft-com:office:powerpoint" xmlns:com="http://schemas.openxmlformats.org/drawingml/2006/compatibility" xmlns:p14="http://schemas.microsoft.com/office/powerpoint/2010/main" xmlns:p15="http://schemas.microsoft.com/office/powerpoint/2012/main" xmlns:ahyp="http://schemas.microsoft.com/office/drawing/2018/hyperlinkcolor" showMasterPhAnim="0" showMasterSp="0">
+  <p:cSld>
+    <p:spTree>
+      <p:nvGrpSpPr>
+        <p:cNvPr id="142" name="Shape 142"/>
+        <p:cNvGrpSpPr/>
+        <p:nvPr/>
+      </p:nvGrpSpPr>
+      <p:grpSpPr>
+        <a:xfrm>
+          <a:off x="0" y="0"/>
+          <a:ext cx="0" cy="0"/>
+          <a:chOff x="0" y="0"/>
+          <a:chExt cx="0" cy="0"/>
+        </a:xfrm>
+      </p:grpSpPr>
+      <p:sp>
+        <p:nvSpPr>
+          <p:cNvPr id="143" name="Google Shape;143;g3b8409de4d6_0_95:notes"/>
+          <p:cNvSpPr/>
+          <p:nvPr>
+            <p:ph idx="2" type="sldImg"/>
+          </p:nvPr>
+        </p:nvSpPr>
+        <p:spPr>
+          <a:xfrm>
+            <a:off x="1143309" y="685800"/>
+            <a:ext cx="4572000" cy="3429000"/>
+          </a:xfrm>
+          <a:custGeom>
+            <a:rect b="b" l="l" r="r" t="t"/>
+            <a:pathLst>
+              <a:path extrusionOk="0" h="120000" w="120000">
+                <a:moveTo>
+                  <a:pt x="0" y="0"/>
+                </a:moveTo>
+                <a:lnTo>
+                  <a:pt x="120000" y="0"/>
+                </a:lnTo>
+                <a:lnTo>
+                  <a:pt x="120000" y="120000"/>
+                </a:lnTo>
+                <a:lnTo>
+                  <a:pt x="0" y="120000"/>
+                </a:lnTo>
+                <a:close/>
+              </a:path>
+            </a:pathLst>
+          </a:custGeom>
+          <a:noFill/>
+          <a:ln cap="flat" cmpd="sng" w="9525">
+            <a:solidFill>
+              <a:srgbClr val="000000"/>
+            </a:solidFill>
+            <a:prstDash val="solid"/>
+            <a:round/>
+            <a:headEnd len="sm" w="sm" type="none"/>
+            <a:tailEnd len="sm" w="sm" type="none"/>
+          </a:ln>
+        </p:spPr>
+      </p:sp>
+      <p:sp>
+        <p:nvSpPr>
+          <p:cNvPr id="144" name="Google Shape;144;g3b8409de4d6_0_95:notes"/>
+          <p:cNvSpPr txBox="1"/>
+          <p:nvPr>
+            <p:ph idx="1" type="body"/>
+          </p:nvPr>
+        </p:nvSpPr>
+        <p:spPr>
+          <a:xfrm>
+            <a:off x="685800" y="4343400"/>
+            <a:ext cx="5486400" cy="4114800"/>
+          </a:xfrm>
+          <a:prstGeom prst="rect">
+            <a:avLst/>
+          </a:prstGeom>
+          <a:noFill/>
+          <a:ln>
+            <a:noFill/>
+          </a:ln>
+        </p:spPr>
+        <p:txBody>
+          <a:bodyPr anchorCtr="0" anchor="t" bIns="91425" lIns="91425" spcFirstLastPara="1" rIns="91425" wrap="square" tIns="91425">
+            <a:noAutofit/>
+          </a:bodyPr>
+          <a:lstStyle/>
+          <a:p>
+            <a:pPr indent="0" lvl="0" marL="0" rtl="0" algn="l">
+              <a:lnSpc>
+                <a:spcPct val="100000"/>
+              </a:lnSpc>
+              <a:spcBef>
+                <a:spcPts val="0"/>
+              </a:spcBef>
+              <a:spcAft>
+                <a:spcPts val="0"/>
+              </a:spcAft>
+              <a:buSzPts val="1400"/>
+              <a:buNone/>
+            </a:pPr>
+            <a:r>
+              <a:t/>
+            </a:r>
+            <a:endParaRPr/>
+          </a:p>
+        </p:txBody>
+      </p:sp>
+    </p:spTree>
+  </p:cSld>
+  <p:clrMapOvr>
+    <a:masterClrMapping/>
+  </p:clrMapOvr>
+</p:notes>
+</file>
+
+<file path=ppt/notesSlides/notesSlide17.xml><?xml version="1.0" encoding="utf-8"?>
+<p:notes xmlns:a="http://schemas.openxmlformats.org/drawingml/2006/main" xmlns:r="http://schemas.openxmlformats.org/officeDocument/2006/relationships" xmlns:mc="http://schemas.openxmlformats.org/markup-compatibility/2006" xmlns:mv="urn:schemas-microsoft-com:mac:vml" xmlns:p="http://schemas.openxmlformats.org/presentationml/2006/main" xmlns:c="http://schemas.openxmlformats.org/drawingml/2006/chart" xmlns:dgm="http://schemas.openxmlformats.org/drawingml/2006/diagram" xmlns:o="urn:schemas-microsoft-com:office:office" xmlns:v="urn:schemas-microsoft-com:vml" xmlns:pvml="urn:schemas-microsoft-com:office:powerpoint" xmlns:com="http://schemas.openxmlformats.org/drawingml/2006/compatibility" xmlns:p14="http://schemas.microsoft.com/office/powerpoint/2010/main" xmlns:p15="http://schemas.microsoft.com/office/powerpoint/2012/main" xmlns:ahyp="http://schemas.microsoft.com/office/drawing/2018/hyperlinkcolor" showMasterPhAnim="0" showMasterSp="0">
+  <p:cSld>
+    <p:spTree>
+      <p:nvGrpSpPr>
+        <p:cNvPr id="151" name="Shape 151"/>
+        <p:cNvGrpSpPr/>
+        <p:nvPr/>
+      </p:nvGrpSpPr>
+      <p:grpSpPr>
+        <a:xfrm>
+          <a:off x="0" y="0"/>
+          <a:ext cx="0" cy="0"/>
+          <a:chOff x="0" y="0"/>
+          <a:chExt cx="0" cy="0"/>
+        </a:xfrm>
+      </p:grpSpPr>
+      <p:sp>
+        <p:nvSpPr>
+          <p:cNvPr id="152" name="Google Shape;152;g3b8409de4d6_0_40:notes"/>
+          <p:cNvSpPr/>
+          <p:nvPr>
+            <p:ph idx="2" type="sldImg"/>
+          </p:nvPr>
+        </p:nvSpPr>
+        <p:spPr>
+          <a:xfrm>
+            <a:off x="1143309" y="685800"/>
+            <a:ext cx="4572000" cy="3429000"/>
+          </a:xfrm>
+          <a:custGeom>
+            <a:rect b="b" l="l" r="r" t="t"/>
+            <a:pathLst>
+              <a:path extrusionOk="0" h="120000" w="120000">
+                <a:moveTo>
+                  <a:pt x="0" y="0"/>
+                </a:moveTo>
+                <a:lnTo>
+                  <a:pt x="120000" y="0"/>
+                </a:lnTo>
+                <a:lnTo>
+                  <a:pt x="120000" y="120000"/>
+                </a:lnTo>
+                <a:lnTo>
+                  <a:pt x="0" y="120000"/>
+                </a:lnTo>
+                <a:close/>
+              </a:path>
+            </a:pathLst>
+          </a:custGeom>
+        </p:spPr>
+      </p:sp>
+      <p:sp>
+        <p:nvSpPr>
+          <p:cNvPr id="153" name="Google Shape;153;g3b8409de4d6_0_40:notes"/>
+          <p:cNvSpPr txBox="1"/>
+          <p:nvPr>
+            <p:ph idx="1" type="body"/>
+          </p:nvPr>
+        </p:nvSpPr>
+        <p:spPr>
+          <a:xfrm>
+            <a:off x="685800" y="4343400"/>
+            <a:ext cx="5486400" cy="4114800"/>
+          </a:xfrm>
+          <a:prstGeom prst="rect">
+            <a:avLst/>
+          </a:prstGeom>
+        </p:spPr>
+        <p:txBody>
+          <a:bodyPr anchorCtr="0" anchor="t" bIns="91425" lIns="91425" spcFirstLastPara="1" rIns="91425" wrap="square" tIns="91425">
+            <a:noAutofit/>
+          </a:bodyPr>
+          <a:lstStyle/>
+          <a:p>
+            <a:pPr indent="0" lvl="0" marL="0" rtl="0" algn="l">
+              <a:spcBef>
+                <a:spcPts val="0"/>
+              </a:spcBef>
+              <a:spcAft>
+                <a:spcPts val="0"/>
+              </a:spcAft>
+              <a:buNone/>
+            </a:pPr>
+            <a:r>
+              <a:t/>
+            </a:r>
+            <a:endParaRPr/>
+          </a:p>
+        </p:txBody>
+      </p:sp>
+    </p:spTree>
+  </p:cSld>
+  <p:clrMapOvr>
+    <a:masterClrMapping/>
+  </p:clrMapOvr>
+</p:notes>
+</file>
+
+<file path=ppt/notesSlides/notesSlide18.xml><?xml version="1.0" encoding="utf-8"?>
+<p:notes xmlns:a="http://schemas.openxmlformats.org/drawingml/2006/main" xmlns:r="http://schemas.openxmlformats.org/officeDocument/2006/relationships" xmlns:mc="http://schemas.openxmlformats.org/markup-compatibility/2006" xmlns:mv="urn:schemas-microsoft-com:mac:vml" xmlns:p="http://schemas.openxmlformats.org/presentationml/2006/main" xmlns:c="http://schemas.openxmlformats.org/drawingml/2006/chart" xmlns:dgm="http://schemas.openxmlformats.org/drawingml/2006/diagram" xmlns:o="urn:schemas-microsoft-com:office:office" xmlns:v="urn:schemas-microsoft-com:vml" xmlns:pvml="urn:schemas-microsoft-com:office:powerpoint" xmlns:com="http://schemas.openxmlformats.org/drawingml/2006/compatibility" xmlns:p14="http://schemas.microsoft.com/office/powerpoint/2010/main" xmlns:p15="http://schemas.microsoft.com/office/powerpoint/2012/main" xmlns:ahyp="http://schemas.microsoft.com/office/drawing/2018/hyperlinkcolor" showMasterPhAnim="0" showMasterSp="0">
+  <p:cSld>
+    <p:spTree>
+      <p:nvGrpSpPr>
+        <p:cNvPr id="157" name="Shape 157"/>
+        <p:cNvGrpSpPr/>
+        <p:nvPr/>
+      </p:nvGrpSpPr>
+      <p:grpSpPr>
+        <a:xfrm>
+          <a:off x="0" y="0"/>
+          <a:ext cx="0" cy="0"/>
+          <a:chOff x="0" y="0"/>
+          <a:chExt cx="0" cy="0"/>
+        </a:xfrm>
+      </p:grpSpPr>
+      <p:sp>
+        <p:nvSpPr>
+          <p:cNvPr id="158" name="Google Shape;158;g3b8409de4d6_0_118:notes"/>
+          <p:cNvSpPr/>
+          <p:nvPr>
+            <p:ph idx="2" type="sldImg"/>
+          </p:nvPr>
+        </p:nvSpPr>
+        <p:spPr>
+          <a:xfrm>
+            <a:off x="1143309" y="685800"/>
+            <a:ext cx="4572000" cy="3429000"/>
+          </a:xfrm>
+          <a:custGeom>
+            <a:rect b="b" l="l" r="r" t="t"/>
+            <a:pathLst>
+              <a:path extrusionOk="0" h="120000" w="120000">
+                <a:moveTo>
+                  <a:pt x="0" y="0"/>
+                </a:moveTo>
+                <a:lnTo>
+                  <a:pt x="120000" y="0"/>
+                </a:lnTo>
+                <a:lnTo>
+                  <a:pt x="120000" y="120000"/>
+                </a:lnTo>
+                <a:lnTo>
+                  <a:pt x="0" y="120000"/>
+                </a:lnTo>
+                <a:close/>
+              </a:path>
+            </a:pathLst>
+          </a:custGeom>
+        </p:spPr>
+      </p:sp>
+      <p:sp>
+        <p:nvSpPr>
+          <p:cNvPr id="159" name="Google Shape;159;g3b8409de4d6_0_118:notes"/>
+          <p:cNvSpPr txBox="1"/>
+          <p:nvPr>
+            <p:ph idx="1" type="body"/>
+          </p:nvPr>
+        </p:nvSpPr>
+        <p:spPr>
+          <a:xfrm>
+            <a:off x="685800" y="4343400"/>
+            <a:ext cx="5486400" cy="4114800"/>
+          </a:xfrm>
+          <a:prstGeom prst="rect">
+            <a:avLst/>
+          </a:prstGeom>
+        </p:spPr>
+        <p:txBody>
+          <a:bodyPr anchorCtr="0" anchor="t" bIns="91425" lIns="91425" spcFirstLastPara="1" rIns="91425" wrap="square" tIns="91425">
+            <a:noAutofit/>
+          </a:bodyPr>
+          <a:lstStyle/>
+          <a:p>
+            <a:pPr indent="0" lvl="0" marL="0" rtl="0" algn="l">
+              <a:spcBef>
+                <a:spcPts val="0"/>
+              </a:spcBef>
+              <a:spcAft>
+                <a:spcPts val="0"/>
+              </a:spcAft>
+              <a:buNone/>
+            </a:pPr>
+            <a:r>
+              <a:t/>
+            </a:r>
+            <a:endParaRPr/>
+          </a:p>
+        </p:txBody>
+      </p:sp>
+    </p:spTree>
+  </p:cSld>
+  <p:clrMapOvr>
+    <a:masterClrMapping/>
+  </p:clrMapOvr>
+</p:notes>
+</file>
+
+<file path=ppt/notesSlides/notesSlide19.xml><?xml version="1.0" encoding="utf-8"?>
+<p:notes xmlns:a="http://schemas.openxmlformats.org/drawingml/2006/main" xmlns:r="http://schemas.openxmlformats.org/officeDocument/2006/relationships" xmlns:mc="http://schemas.openxmlformats.org/markup-compatibility/2006" xmlns:mv="urn:schemas-microsoft-com:mac:vml" xmlns:p="http://schemas.openxmlformats.org/presentationml/2006/main" xmlns:c="http://schemas.openxmlformats.org/drawingml/2006/chart" xmlns:dgm="http://schemas.openxmlformats.org/drawingml/2006/diagram" xmlns:o="urn:schemas-microsoft-com:office:office" xmlns:v="urn:schemas-microsoft-com:vml" xmlns:pvml="urn:schemas-microsoft-com:office:powerpoint" xmlns:com="http://schemas.openxmlformats.org/drawingml/2006/compatibility" xmlns:p14="http://schemas.microsoft.com/office/powerpoint/2010/main" xmlns:p15="http://schemas.microsoft.com/office/powerpoint/2012/main" xmlns:ahyp="http://schemas.microsoft.com/office/drawing/2018/hyperlinkcolor" showMasterPhAnim="0" showMasterSp="0">
+  <p:cSld>
+    <p:spTree>
+      <p:nvGrpSpPr>
+        <p:cNvPr id="163" name="Shape 163"/>
+        <p:cNvGrpSpPr/>
+        <p:nvPr/>
+      </p:nvGrpSpPr>
+      <p:grpSpPr>
+        <a:xfrm>
+          <a:off x="0" y="0"/>
+          <a:ext cx="0" cy="0"/>
+          <a:chOff x="0" y="0"/>
+          <a:chExt cx="0" cy="0"/>
+        </a:xfrm>
+      </p:grpSpPr>
+      <p:sp>
+        <p:nvSpPr>
+          <p:cNvPr id="164" name="Google Shape;164;g3b8409de4d6_0_126:notes"/>
+          <p:cNvSpPr/>
+          <p:nvPr>
+            <p:ph idx="2" type="sldImg"/>
+          </p:nvPr>
+        </p:nvSpPr>
+        <p:spPr>
+          <a:xfrm>
+            <a:off x="1143309" y="685800"/>
+            <a:ext cx="4572000" cy="3429000"/>
+          </a:xfrm>
+          <a:custGeom>
+            <a:rect b="b" l="l" r="r" t="t"/>
+            <a:pathLst>
+              <a:path extrusionOk="0" h="120000" w="120000">
+                <a:moveTo>
+                  <a:pt x="0" y="0"/>
+                </a:moveTo>
+                <a:lnTo>
+                  <a:pt x="120000" y="0"/>
+                </a:lnTo>
+                <a:lnTo>
+                  <a:pt x="120000" y="120000"/>
+                </a:lnTo>
+                <a:lnTo>
+                  <a:pt x="0" y="120000"/>
+                </a:lnTo>
+                <a:close/>
+              </a:path>
+            </a:pathLst>
+          </a:custGeom>
+        </p:spPr>
+      </p:sp>
+      <p:sp>
+        <p:nvSpPr>
+          <p:cNvPr id="165" name="Google Shape;165;g3b8409de4d6_0_126:notes"/>
           <p:cNvSpPr txBox="1"/>
           <p:nvPr>
             <p:ph idx="1" type="body"/>
@@ -1990,6 +2009,105 @@
       <p:sp>
         <p:nvSpPr>
           <p:cNvPr id="38" name="Google Shape;38;g3b8409de4d6_0_60:notes"/>
+          <p:cNvSpPr txBox="1"/>
+          <p:nvPr>
+            <p:ph idx="1" type="body"/>
+          </p:nvPr>
+        </p:nvSpPr>
+        <p:spPr>
+          <a:xfrm>
+            <a:off x="685800" y="4343400"/>
+            <a:ext cx="5486400" cy="4114800"/>
+          </a:xfrm>
+          <a:prstGeom prst="rect">
+            <a:avLst/>
+          </a:prstGeom>
+        </p:spPr>
+        <p:txBody>
+          <a:bodyPr anchorCtr="0" anchor="t" bIns="91425" lIns="91425" spcFirstLastPara="1" rIns="91425" wrap="square" tIns="91425">
+            <a:noAutofit/>
+          </a:bodyPr>
+          <a:lstStyle/>
+          <a:p>
+            <a:pPr indent="0" lvl="0" marL="0" rtl="0" algn="l">
+              <a:spcBef>
+                <a:spcPts val="0"/>
+              </a:spcBef>
+              <a:spcAft>
+                <a:spcPts val="0"/>
+              </a:spcAft>
+              <a:buNone/>
+            </a:pPr>
+            <a:r>
+              <a:t/>
+            </a:r>
+            <a:endParaRPr/>
+          </a:p>
+        </p:txBody>
+      </p:sp>
+    </p:spTree>
+  </p:cSld>
+  <p:clrMapOvr>
+    <a:masterClrMapping/>
+  </p:clrMapOvr>
+</p:notes>
+</file>
+
+<file path=ppt/notesSlides/notesSlide20.xml><?xml version="1.0" encoding="utf-8"?>
+<p:notes xmlns:a="http://schemas.openxmlformats.org/drawingml/2006/main" xmlns:r="http://schemas.openxmlformats.org/officeDocument/2006/relationships" xmlns:mc="http://schemas.openxmlformats.org/markup-compatibility/2006" xmlns:mv="urn:schemas-microsoft-com:mac:vml" xmlns:p="http://schemas.openxmlformats.org/presentationml/2006/main" xmlns:c="http://schemas.openxmlformats.org/drawingml/2006/chart" xmlns:dgm="http://schemas.openxmlformats.org/drawingml/2006/diagram" xmlns:o="urn:schemas-microsoft-com:office:office" xmlns:v="urn:schemas-microsoft-com:vml" xmlns:pvml="urn:schemas-microsoft-com:office:powerpoint" xmlns:com="http://schemas.openxmlformats.org/drawingml/2006/compatibility" xmlns:p14="http://schemas.microsoft.com/office/powerpoint/2010/main" xmlns:p15="http://schemas.microsoft.com/office/powerpoint/2012/main" xmlns:ahyp="http://schemas.microsoft.com/office/drawing/2018/hyperlinkcolor" showMasterPhAnim="0" showMasterSp="0">
+  <p:cSld>
+    <p:spTree>
+      <p:nvGrpSpPr>
+        <p:cNvPr id="169" name="Shape 169"/>
+        <p:cNvGrpSpPr/>
+        <p:nvPr/>
+      </p:nvGrpSpPr>
+      <p:grpSpPr>
+        <a:xfrm>
+          <a:off x="0" y="0"/>
+          <a:ext cx="0" cy="0"/>
+          <a:chOff x="0" y="0"/>
+          <a:chExt cx="0" cy="0"/>
+        </a:xfrm>
+      </p:grpSpPr>
+      <p:sp>
+        <p:nvSpPr>
+          <p:cNvPr id="170" name="Google Shape;170;g3b8409de4d6_0_108:notes"/>
+          <p:cNvSpPr/>
+          <p:nvPr>
+            <p:ph idx="2" type="sldImg"/>
+          </p:nvPr>
+        </p:nvSpPr>
+        <p:spPr>
+          <a:xfrm>
+            <a:off x="1143309" y="685800"/>
+            <a:ext cx="4572000" cy="3429000"/>
+          </a:xfrm>
+          <a:custGeom>
+            <a:rect b="b" l="l" r="r" t="t"/>
+            <a:pathLst>
+              <a:path extrusionOk="0" h="120000" w="120000">
+                <a:moveTo>
+                  <a:pt x="0" y="0"/>
+                </a:moveTo>
+                <a:lnTo>
+                  <a:pt x="120000" y="0"/>
+                </a:lnTo>
+                <a:lnTo>
+                  <a:pt x="120000" y="120000"/>
+                </a:lnTo>
+                <a:lnTo>
+                  <a:pt x="0" y="120000"/>
+                </a:lnTo>
+                <a:close/>
+              </a:path>
+            </a:pathLst>
+          </a:custGeom>
+        </p:spPr>
+      </p:sp>
+      <p:sp>
+        <p:nvSpPr>
+          <p:cNvPr id="171" name="Google Shape;171;g3b8409de4d6_0_108:notes"/>
           <p:cNvSpPr txBox="1"/>
           <p:nvPr>
             <p:ph idx="1" type="body"/>
@@ -2467,124 +2585,7 @@
       </p:grpSpPr>
       <p:sp>
         <p:nvSpPr>
-          <p:cNvPr id="74" name="Google Shape;74;g3ba79990f52_0_5:notes"/>
-          <p:cNvSpPr/>
-          <p:nvPr>
-            <p:ph idx="2" type="sldImg"/>
-          </p:nvPr>
-        </p:nvSpPr>
-        <p:spPr>
-          <a:xfrm>
-            <a:off x="1143309" y="685800"/>
-            <a:ext cx="4572000" cy="3429000"/>
-          </a:xfrm>
-          <a:custGeom>
-            <a:rect b="b" l="l" r="r" t="t"/>
-            <a:pathLst>
-              <a:path extrusionOk="0" h="120000" w="120000">
-                <a:moveTo>
-                  <a:pt x="0" y="0"/>
-                </a:moveTo>
-                <a:lnTo>
-                  <a:pt x="120000" y="0"/>
-                </a:lnTo>
-                <a:lnTo>
-                  <a:pt x="120000" y="120000"/>
-                </a:lnTo>
-                <a:lnTo>
-                  <a:pt x="0" y="120000"/>
-                </a:lnTo>
-                <a:close/>
-              </a:path>
-            </a:pathLst>
-          </a:custGeom>
-          <a:noFill/>
-          <a:ln cap="flat" cmpd="sng" w="9525">
-            <a:solidFill>
-              <a:srgbClr val="000000"/>
-            </a:solidFill>
-            <a:prstDash val="solid"/>
-            <a:round/>
-            <a:headEnd len="sm" w="sm" type="none"/>
-            <a:tailEnd len="sm" w="sm" type="none"/>
-          </a:ln>
-        </p:spPr>
-      </p:sp>
-      <p:sp>
-        <p:nvSpPr>
-          <p:cNvPr id="75" name="Google Shape;75;g3ba79990f52_0_5:notes"/>
-          <p:cNvSpPr txBox="1"/>
-          <p:nvPr>
-            <p:ph idx="1" type="body"/>
-          </p:nvPr>
-        </p:nvSpPr>
-        <p:spPr>
-          <a:xfrm>
-            <a:off x="685800" y="4343400"/>
-            <a:ext cx="5486400" cy="4114800"/>
-          </a:xfrm>
-          <a:prstGeom prst="rect">
-            <a:avLst/>
-          </a:prstGeom>
-          <a:noFill/>
-          <a:ln>
-            <a:noFill/>
-          </a:ln>
-        </p:spPr>
-        <p:txBody>
-          <a:bodyPr anchorCtr="0" anchor="t" bIns="91425" lIns="91425" spcFirstLastPara="1" rIns="91425" wrap="square" tIns="91425">
-            <a:noAutofit/>
-          </a:bodyPr>
-          <a:lstStyle/>
-          <a:p>
-            <a:pPr indent="0" lvl="0" marL="0" rtl="0" algn="l">
-              <a:lnSpc>
-                <a:spcPct val="100000"/>
-              </a:lnSpc>
-              <a:spcBef>
-                <a:spcPts val="0"/>
-              </a:spcBef>
-              <a:spcAft>
-                <a:spcPts val="0"/>
-              </a:spcAft>
-              <a:buSzPts val="1400"/>
-              <a:buNone/>
-            </a:pPr>
-            <a:r>
-              <a:t/>
-            </a:r>
-            <a:endParaRPr/>
-          </a:p>
-        </p:txBody>
-      </p:sp>
-    </p:spTree>
-  </p:cSld>
-  <p:clrMapOvr>
-    <a:masterClrMapping/>
-  </p:clrMapOvr>
-</p:notes>
-</file>
-
-<file path=ppt/notesSlides/notesSlide8.xml><?xml version="1.0" encoding="utf-8"?>
-<p:notes xmlns:a="http://schemas.openxmlformats.org/drawingml/2006/main" xmlns:r="http://schemas.openxmlformats.org/officeDocument/2006/relationships" xmlns:mc="http://schemas.openxmlformats.org/markup-compatibility/2006" xmlns:mv="urn:schemas-microsoft-com:mac:vml" xmlns:p="http://schemas.openxmlformats.org/presentationml/2006/main" xmlns:c="http://schemas.openxmlformats.org/drawingml/2006/chart" xmlns:dgm="http://schemas.openxmlformats.org/drawingml/2006/diagram" xmlns:o="urn:schemas-microsoft-com:office:office" xmlns:v="urn:schemas-microsoft-com:vml" xmlns:pvml="urn:schemas-microsoft-com:office:powerpoint" xmlns:com="http://schemas.openxmlformats.org/drawingml/2006/compatibility" xmlns:p14="http://schemas.microsoft.com/office/powerpoint/2010/main" xmlns:p15="http://schemas.microsoft.com/office/powerpoint/2012/main" xmlns:ahyp="http://schemas.microsoft.com/office/drawing/2018/hyperlinkcolor" showMasterPhAnim="0" showMasterSp="0">
-  <p:cSld>
-    <p:spTree>
-      <p:nvGrpSpPr>
-        <p:cNvPr id="82" name="Shape 82"/>
-        <p:cNvGrpSpPr/>
-        <p:nvPr/>
-      </p:nvGrpSpPr>
-      <p:grpSpPr>
-        <a:xfrm>
-          <a:off x="0" y="0"/>
-          <a:ext cx="0" cy="0"/>
-          <a:chOff x="0" y="0"/>
-          <a:chExt cx="0" cy="0"/>
-        </a:xfrm>
-      </p:grpSpPr>
-      <p:sp>
-        <p:nvSpPr>
-          <p:cNvPr id="83" name="Google Shape;83;g3b8409de4d6_0_9:notes"/>
+          <p:cNvPr id="74" name="Google Shape;74;g3b938ea6dd9_0_26:notes"/>
           <p:cNvSpPr/>
           <p:nvPr>
             <p:ph idx="2" type="sldImg"/>
@@ -2619,7 +2620,7 @@
       </p:sp>
       <p:sp>
         <p:nvSpPr>
-          <p:cNvPr id="84" name="Google Shape;84;g3b8409de4d6_0_9:notes"/>
+          <p:cNvPr id="75" name="Google Shape;75;g3b938ea6dd9_0_26:notes"/>
           <p:cNvSpPr txBox="1"/>
           <p:nvPr>
             <p:ph idx="1" type="body"/>
@@ -2664,12 +2665,12 @@
 </p:notes>
 </file>
 
-<file path=ppt/notesSlides/notesSlide9.xml><?xml version="1.0" encoding="utf-8"?>
+<file path=ppt/notesSlides/notesSlide8.xml><?xml version="1.0" encoding="utf-8"?>
 <p:notes xmlns:a="http://schemas.openxmlformats.org/drawingml/2006/main" xmlns:r="http://schemas.openxmlformats.org/officeDocument/2006/relationships" xmlns:mc="http://schemas.openxmlformats.org/markup-compatibility/2006" xmlns:mv="urn:schemas-microsoft-com:mac:vml" xmlns:p="http://schemas.openxmlformats.org/presentationml/2006/main" xmlns:c="http://schemas.openxmlformats.org/drawingml/2006/chart" xmlns:dgm="http://schemas.openxmlformats.org/drawingml/2006/diagram" xmlns:o="urn:schemas-microsoft-com:office:office" xmlns:v="urn:schemas-microsoft-com:vml" xmlns:pvml="urn:schemas-microsoft-com:office:powerpoint" xmlns:com="http://schemas.openxmlformats.org/drawingml/2006/compatibility" xmlns:p14="http://schemas.microsoft.com/office/powerpoint/2010/main" xmlns:p15="http://schemas.microsoft.com/office/powerpoint/2012/main" xmlns:ahyp="http://schemas.microsoft.com/office/drawing/2018/hyperlinkcolor" showMasterPhAnim="0" showMasterSp="0">
   <p:cSld>
     <p:spTree>
       <p:nvGrpSpPr>
-        <p:cNvPr id="88" name="Shape 88"/>
+        <p:cNvPr id="90" name="Shape 90"/>
         <p:cNvGrpSpPr/>
         <p:nvPr/>
       </p:nvGrpSpPr>
@@ -2683,7 +2684,7 @@
       </p:grpSpPr>
       <p:sp>
         <p:nvSpPr>
-          <p:cNvPr id="89" name="Google Shape;89;g3b8409de4d6_0_14:notes"/>
+          <p:cNvPr id="91" name="Google Shape;91;g3b938ea6dd9_0_0:notes"/>
           <p:cNvSpPr/>
           <p:nvPr>
             <p:ph idx="2" type="sldImg"/>
@@ -2718,7 +2719,106 @@
       </p:sp>
       <p:sp>
         <p:nvSpPr>
-          <p:cNvPr id="90" name="Google Shape;90;g3b8409de4d6_0_14:notes"/>
+          <p:cNvPr id="92" name="Google Shape;92;g3b938ea6dd9_0_0:notes"/>
+          <p:cNvSpPr txBox="1"/>
+          <p:nvPr>
+            <p:ph idx="1" type="body"/>
+          </p:nvPr>
+        </p:nvSpPr>
+        <p:spPr>
+          <a:xfrm>
+            <a:off x="685800" y="4343400"/>
+            <a:ext cx="5486400" cy="4114800"/>
+          </a:xfrm>
+          <a:prstGeom prst="rect">
+            <a:avLst/>
+          </a:prstGeom>
+        </p:spPr>
+        <p:txBody>
+          <a:bodyPr anchorCtr="0" anchor="t" bIns="91425" lIns="91425" spcFirstLastPara="1" rIns="91425" wrap="square" tIns="91425">
+            <a:noAutofit/>
+          </a:bodyPr>
+          <a:lstStyle/>
+          <a:p>
+            <a:pPr indent="0" lvl="0" marL="0" rtl="0" algn="l">
+              <a:spcBef>
+                <a:spcPts val="0"/>
+              </a:spcBef>
+              <a:spcAft>
+                <a:spcPts val="0"/>
+              </a:spcAft>
+              <a:buNone/>
+            </a:pPr>
+            <a:r>
+              <a:t/>
+            </a:r>
+            <a:endParaRPr/>
+          </a:p>
+        </p:txBody>
+      </p:sp>
+    </p:spTree>
+  </p:cSld>
+  <p:clrMapOvr>
+    <a:masterClrMapping/>
+  </p:clrMapOvr>
+</p:notes>
+</file>
+
+<file path=ppt/notesSlides/notesSlide9.xml><?xml version="1.0" encoding="utf-8"?>
+<p:notes xmlns:a="http://schemas.openxmlformats.org/drawingml/2006/main" xmlns:r="http://schemas.openxmlformats.org/officeDocument/2006/relationships" xmlns:mc="http://schemas.openxmlformats.org/markup-compatibility/2006" xmlns:mv="urn:schemas-microsoft-com:mac:vml" xmlns:p="http://schemas.openxmlformats.org/presentationml/2006/main" xmlns:c="http://schemas.openxmlformats.org/drawingml/2006/chart" xmlns:dgm="http://schemas.openxmlformats.org/drawingml/2006/diagram" xmlns:o="urn:schemas-microsoft-com:office:office" xmlns:v="urn:schemas-microsoft-com:vml" xmlns:pvml="urn:schemas-microsoft-com:office:powerpoint" xmlns:com="http://schemas.openxmlformats.org/drawingml/2006/compatibility" xmlns:p14="http://schemas.microsoft.com/office/powerpoint/2010/main" xmlns:p15="http://schemas.microsoft.com/office/powerpoint/2012/main" xmlns:ahyp="http://schemas.microsoft.com/office/drawing/2018/hyperlinkcolor" showMasterPhAnim="0" showMasterSp="0">
+  <p:cSld>
+    <p:spTree>
+      <p:nvGrpSpPr>
+        <p:cNvPr id="97" name="Shape 97"/>
+        <p:cNvGrpSpPr/>
+        <p:nvPr/>
+      </p:nvGrpSpPr>
+      <p:grpSpPr>
+        <a:xfrm>
+          <a:off x="0" y="0"/>
+          <a:ext cx="0" cy="0"/>
+          <a:chOff x="0" y="0"/>
+          <a:chExt cx="0" cy="0"/>
+        </a:xfrm>
+      </p:grpSpPr>
+      <p:sp>
+        <p:nvSpPr>
+          <p:cNvPr id="98" name="Google Shape;98;g3b938ea6dd9_0_6:notes"/>
+          <p:cNvSpPr/>
+          <p:nvPr>
+            <p:ph idx="2" type="sldImg"/>
+          </p:nvPr>
+        </p:nvSpPr>
+        <p:spPr>
+          <a:xfrm>
+            <a:off x="1143309" y="685800"/>
+            <a:ext cx="4572000" cy="3429000"/>
+          </a:xfrm>
+          <a:custGeom>
+            <a:rect b="b" l="l" r="r" t="t"/>
+            <a:pathLst>
+              <a:path extrusionOk="0" h="120000" w="120000">
+                <a:moveTo>
+                  <a:pt x="0" y="0"/>
+                </a:moveTo>
+                <a:lnTo>
+                  <a:pt x="120000" y="0"/>
+                </a:lnTo>
+                <a:lnTo>
+                  <a:pt x="120000" y="120000"/>
+                </a:lnTo>
+                <a:lnTo>
+                  <a:pt x="0" y="120000"/>
+                </a:lnTo>
+                <a:close/>
+              </a:path>
+            </a:pathLst>
+          </a:custGeom>
+        </p:spPr>
+      </p:sp>
+      <p:sp>
+        <p:nvSpPr>
+          <p:cNvPr id="99" name="Google Shape;99;g3b938ea6dd9_0_6:notes"/>
           <p:cNvSpPr txBox="1"/>
           <p:nvPr>
             <p:ph idx="1" type="body"/>
@@ -7866,7 +7966,7 @@
   <p:cSld>
     <p:spTree>
       <p:nvGrpSpPr>
-        <p:cNvPr id="98" name="Shape 98"/>
+        <p:cNvPr id="106" name="Shape 106"/>
         <p:cNvGrpSpPr/>
         <p:nvPr/>
       </p:nvGrpSpPr>
@@ -7880,7 +7980,7 @@
       </p:grpSpPr>
       <p:sp>
         <p:nvSpPr>
-          <p:cNvPr id="99" name="Google Shape;99;g3b8409de4d6_0_21"/>
+          <p:cNvPr id="107" name="Google Shape;107;g3b938ea6dd9_0_11"/>
           <p:cNvSpPr txBox="1"/>
           <p:nvPr>
             <p:ph type="title"/>
@@ -7912,7 +8012,7 @@
             </a:pPr>
             <a:r>
               <a:rPr lang="en"/>
-              <a:t>Tokens Today — Anthropic API</a:t>
+              <a:t>Tokens Today — Claude Code</a:t>
             </a:r>
             <a:endParaRPr/>
           </a:p>
@@ -7920,100 +8020,7 @@
       </p:sp>
       <p:pic>
         <p:nvPicPr>
-          <p:cNvPr id="100" name="Google Shape;100;g3b8409de4d6_0_21" title="Screenshot 2026-01-15 at 3.43.15 PM.png"/>
-          <p:cNvPicPr preferRelativeResize="0"/>
-          <p:nvPr/>
-        </p:nvPicPr>
-        <p:blipFill>
-          <a:blip r:embed="rId3">
-            <a:alphaModFix/>
-          </a:blip>
-          <a:stretch>
-            <a:fillRect/>
-          </a:stretch>
-        </p:blipFill>
-        <p:spPr>
-          <a:xfrm>
-            <a:off x="540650" y="1551799"/>
-            <a:ext cx="8062699" cy="5115250"/>
-          </a:xfrm>
-          <a:prstGeom prst="rect">
-            <a:avLst/>
-          </a:prstGeom>
-          <a:noFill/>
-          <a:ln>
-            <a:noFill/>
-          </a:ln>
-        </p:spPr>
-      </p:pic>
-    </p:spTree>
-  </p:cSld>
-  <p:clrMapOvr>
-    <a:masterClrMapping/>
-  </p:clrMapOvr>
-</p:sld>
-</file>
-
-<file path=ppt/slides/slide11.xml><?xml version="1.0" encoding="utf-8"?>
-<p:sld xmlns:a="http://schemas.openxmlformats.org/drawingml/2006/main" xmlns:r="http://schemas.openxmlformats.org/officeDocument/2006/relationships" xmlns:mc="http://schemas.openxmlformats.org/markup-compatibility/2006" xmlns:mv="urn:schemas-microsoft-com:mac:vml" xmlns:p="http://schemas.openxmlformats.org/presentationml/2006/main" xmlns:c="http://schemas.openxmlformats.org/drawingml/2006/chart" xmlns:dgm="http://schemas.openxmlformats.org/drawingml/2006/diagram" xmlns:o="urn:schemas-microsoft-com:office:office" xmlns:v="urn:schemas-microsoft-com:vml" xmlns:pvml="urn:schemas-microsoft-com:office:powerpoint" xmlns:com="http://schemas.openxmlformats.org/drawingml/2006/compatibility" xmlns:p14="http://schemas.microsoft.com/office/powerpoint/2010/main" xmlns:p15="http://schemas.microsoft.com/office/powerpoint/2012/main" xmlns:ahyp="http://schemas.microsoft.com/office/drawing/2018/hyperlinkcolor">
-  <p:cSld>
-    <p:spTree>
-      <p:nvGrpSpPr>
-        <p:cNvPr id="104" name="Shape 104"/>
-        <p:cNvGrpSpPr/>
-        <p:nvPr/>
-      </p:nvGrpSpPr>
-      <p:grpSpPr>
-        <a:xfrm>
-          <a:off x="0" y="0"/>
-          <a:ext cx="0" cy="0"/>
-          <a:chOff x="0" y="0"/>
-          <a:chExt cx="0" cy="0"/>
-        </a:xfrm>
-      </p:grpSpPr>
-      <p:sp>
-        <p:nvSpPr>
-          <p:cNvPr id="105" name="Google Shape;105;g3b8409de4d6_0_28"/>
-          <p:cNvSpPr txBox="1"/>
-          <p:nvPr>
-            <p:ph type="title"/>
-          </p:nvPr>
-        </p:nvSpPr>
-        <p:spPr>
-          <a:xfrm>
-            <a:off x="457200" y="274638"/>
-            <a:ext cx="8229600" cy="1143000"/>
-          </a:xfrm>
-          <a:prstGeom prst="rect">
-            <a:avLst/>
-          </a:prstGeom>
-        </p:spPr>
-        <p:txBody>
-          <a:bodyPr anchorCtr="0" anchor="b" bIns="91425" lIns="91425" spcFirstLastPara="1" rIns="91425" wrap="square" tIns="91425">
-            <a:noAutofit/>
-          </a:bodyPr>
-          <a:lstStyle/>
-          <a:p>
-            <a:pPr indent="0" lvl="0" marL="0" rtl="0" algn="l">
-              <a:spcBef>
-                <a:spcPts val="0"/>
-              </a:spcBef>
-              <a:spcAft>
-                <a:spcPts val="0"/>
-              </a:spcAft>
-              <a:buNone/>
-            </a:pPr>
-            <a:r>
-              <a:rPr lang="en"/>
-              <a:t>Tokens Today — Claude Code</a:t>
-            </a:r>
-            <a:endParaRPr/>
-          </a:p>
-        </p:txBody>
-      </p:sp>
-      <p:pic>
-        <p:nvPicPr>
-          <p:cNvPr id="106" name="Google Shape;106;g3b8409de4d6_0_28"/>
+          <p:cNvPr id="108" name="Google Shape;108;g3b938ea6dd9_0_11"/>
           <p:cNvPicPr preferRelativeResize="0"/>
           <p:nvPr/>
         </p:nvPicPr>
@@ -8047,12 +8054,12 @@
 </p:sld>
 </file>
 
-<file path=ppt/slides/slide12.xml><?xml version="1.0" encoding="utf-8"?>
+<file path=ppt/slides/slide11.xml><?xml version="1.0" encoding="utf-8"?>
 <p:sld xmlns:a="http://schemas.openxmlformats.org/drawingml/2006/main" xmlns:r="http://schemas.openxmlformats.org/officeDocument/2006/relationships" xmlns:mc="http://schemas.openxmlformats.org/markup-compatibility/2006" xmlns:mv="urn:schemas-microsoft-com:mac:vml" xmlns:p="http://schemas.openxmlformats.org/presentationml/2006/main" xmlns:c="http://schemas.openxmlformats.org/drawingml/2006/chart" xmlns:dgm="http://schemas.openxmlformats.org/drawingml/2006/diagram" xmlns:o="urn:schemas-microsoft-com:office:office" xmlns:v="urn:schemas-microsoft-com:vml" xmlns:pvml="urn:schemas-microsoft-com:office:powerpoint" xmlns:com="http://schemas.openxmlformats.org/drawingml/2006/compatibility" xmlns:p14="http://schemas.microsoft.com/office/powerpoint/2010/main" xmlns:p15="http://schemas.microsoft.com/office/powerpoint/2012/main" xmlns:ahyp="http://schemas.microsoft.com/office/drawing/2018/hyperlinkcolor">
   <p:cSld>
     <p:spTree>
       <p:nvGrpSpPr>
-        <p:cNvPr id="110" name="Shape 110"/>
+        <p:cNvPr id="112" name="Shape 112"/>
         <p:cNvGrpSpPr/>
         <p:nvPr/>
       </p:nvGrpSpPr>
@@ -8066,343 +8073,7 @@
       </p:grpSpPr>
       <p:sp>
         <p:nvSpPr>
-          <p:cNvPr id="111" name="Google Shape;111;g3b8409de4d6_0_4"/>
-          <p:cNvSpPr txBox="1"/>
-          <p:nvPr>
-            <p:ph type="title"/>
-          </p:nvPr>
-        </p:nvSpPr>
-        <p:spPr>
-          <a:xfrm>
-            <a:off x="457200" y="274638"/>
-            <a:ext cx="8229600" cy="1143000"/>
-          </a:xfrm>
-          <a:prstGeom prst="rect">
-            <a:avLst/>
-          </a:prstGeom>
-        </p:spPr>
-        <p:txBody>
-          <a:bodyPr anchorCtr="0" anchor="b" bIns="91425" lIns="91425" spcFirstLastPara="1" rIns="91425" wrap="square" tIns="91425">
-            <a:noAutofit/>
-          </a:bodyPr>
-          <a:lstStyle/>
-          <a:p>
-            <a:pPr indent="0" lvl="0" marL="0" rtl="0" algn="l">
-              <a:spcBef>
-                <a:spcPts val="0"/>
-              </a:spcBef>
-              <a:spcAft>
-                <a:spcPts val="0"/>
-              </a:spcAft>
-              <a:buNone/>
-            </a:pPr>
-            <a:r>
-              <a:rPr lang="en"/>
-              <a:t>Tokenization</a:t>
-            </a:r>
-            <a:endParaRPr/>
-          </a:p>
-        </p:txBody>
-      </p:sp>
-      <p:sp>
-        <p:nvSpPr>
-          <p:cNvPr id="112" name="Google Shape;112;g3b8409de4d6_0_4"/>
-          <p:cNvSpPr txBox="1"/>
-          <p:nvPr>
-            <p:ph idx="1" type="body"/>
-          </p:nvPr>
-        </p:nvSpPr>
-        <p:spPr>
-          <a:xfrm>
-            <a:off x="457200" y="1600200"/>
-            <a:ext cx="8229600" cy="4967700"/>
-          </a:xfrm>
-          <a:prstGeom prst="rect">
-            <a:avLst/>
-          </a:prstGeom>
-        </p:spPr>
-        <p:txBody>
-          <a:bodyPr anchorCtr="0" anchor="t" bIns="91425" lIns="91425" spcFirstLastPara="1" rIns="91425" wrap="square" tIns="91425">
-            <a:noAutofit/>
-          </a:bodyPr>
-          <a:lstStyle/>
-          <a:p>
-            <a:pPr indent="0" lvl="0" marL="0" rtl="0" algn="l">
-              <a:spcBef>
-                <a:spcPts val="600"/>
-              </a:spcBef>
-              <a:spcAft>
-                <a:spcPts val="0"/>
-              </a:spcAft>
-              <a:buNone/>
-            </a:pPr>
-            <a:r>
-              <a:t/>
-            </a:r>
-            <a:endParaRPr/>
-          </a:p>
-        </p:txBody>
-      </p:sp>
-    </p:spTree>
-  </p:cSld>
-  <p:clrMapOvr>
-    <a:masterClrMapping/>
-  </p:clrMapOvr>
-</p:sld>
-</file>
-
-<file path=ppt/slides/slide13.xml><?xml version="1.0" encoding="utf-8"?>
-<p:sld xmlns:a="http://schemas.openxmlformats.org/drawingml/2006/main" xmlns:r="http://schemas.openxmlformats.org/officeDocument/2006/relationships" xmlns:mc="http://schemas.openxmlformats.org/markup-compatibility/2006" xmlns:mv="urn:schemas-microsoft-com:mac:vml" xmlns:p="http://schemas.openxmlformats.org/presentationml/2006/main" xmlns:c="http://schemas.openxmlformats.org/drawingml/2006/chart" xmlns:dgm="http://schemas.openxmlformats.org/drawingml/2006/diagram" xmlns:o="urn:schemas-microsoft-com:office:office" xmlns:v="urn:schemas-microsoft-com:vml" xmlns:pvml="urn:schemas-microsoft-com:office:powerpoint" xmlns:com="http://schemas.openxmlformats.org/drawingml/2006/compatibility" xmlns:p14="http://schemas.microsoft.com/office/powerpoint/2010/main" xmlns:p15="http://schemas.microsoft.com/office/powerpoint/2012/main" xmlns:ahyp="http://schemas.microsoft.com/office/drawing/2018/hyperlinkcolor">
-  <p:cSld>
-    <p:spTree>
-      <p:nvGrpSpPr>
-        <p:cNvPr id="116" name="Shape 116"/>
-        <p:cNvGrpSpPr/>
-        <p:nvPr/>
-      </p:nvGrpSpPr>
-      <p:grpSpPr>
-        <a:xfrm>
-          <a:off x="0" y="0"/>
-          <a:ext cx="0" cy="0"/>
-          <a:chOff x="0" y="0"/>
-          <a:chExt cx="0" cy="0"/>
-        </a:xfrm>
-      </p:grpSpPr>
-      <p:sp>
-        <p:nvSpPr>
-          <p:cNvPr id="117" name="Google Shape;117;g3b8409de4d6_0_35"/>
-          <p:cNvSpPr txBox="1"/>
-          <p:nvPr>
-            <p:ph type="title"/>
-          </p:nvPr>
-        </p:nvSpPr>
-        <p:spPr>
-          <a:xfrm>
-            <a:off x="457200" y="274638"/>
-            <a:ext cx="8229600" cy="1143000"/>
-          </a:xfrm>
-          <a:prstGeom prst="rect">
-            <a:avLst/>
-          </a:prstGeom>
-        </p:spPr>
-        <p:txBody>
-          <a:bodyPr anchorCtr="0" anchor="b" bIns="91425" lIns="91425" spcFirstLastPara="1" rIns="91425" wrap="square" tIns="91425">
-            <a:noAutofit/>
-          </a:bodyPr>
-          <a:lstStyle/>
-          <a:p>
-            <a:pPr indent="0" lvl="0" marL="0" rtl="0" algn="l">
-              <a:spcBef>
-                <a:spcPts val="0"/>
-              </a:spcBef>
-              <a:spcAft>
-                <a:spcPts val="0"/>
-              </a:spcAft>
-              <a:buNone/>
-            </a:pPr>
-            <a:r>
-              <a:rPr lang="en"/>
-              <a:t>Why do we Tokenize?</a:t>
-            </a:r>
-            <a:endParaRPr/>
-          </a:p>
-        </p:txBody>
-      </p:sp>
-      <p:sp>
-        <p:nvSpPr>
-          <p:cNvPr id="118" name="Google Shape;118;g3b8409de4d6_0_35"/>
-          <p:cNvSpPr txBox="1"/>
-          <p:nvPr>
-            <p:ph idx="1" type="body"/>
-          </p:nvPr>
-        </p:nvSpPr>
-        <p:spPr>
-          <a:xfrm>
-            <a:off x="457200" y="1600200"/>
-            <a:ext cx="8229600" cy="4967700"/>
-          </a:xfrm>
-          <a:prstGeom prst="rect">
-            <a:avLst/>
-          </a:prstGeom>
-        </p:spPr>
-        <p:txBody>
-          <a:bodyPr anchorCtr="0" anchor="t" bIns="91425" lIns="91425" spcFirstLastPara="1" rIns="91425" wrap="square" tIns="91425">
-            <a:noAutofit/>
-          </a:bodyPr>
-          <a:lstStyle/>
-          <a:p>
-            <a:pPr indent="0" lvl="0" marL="0" rtl="0" algn="l">
-              <a:spcBef>
-                <a:spcPts val="600"/>
-              </a:spcBef>
-              <a:spcAft>
-                <a:spcPts val="0"/>
-              </a:spcAft>
-              <a:buNone/>
-            </a:pPr>
-            <a:r>
-              <a:t/>
-            </a:r>
-            <a:endParaRPr/>
-          </a:p>
-        </p:txBody>
-      </p:sp>
-    </p:spTree>
-  </p:cSld>
-  <p:clrMapOvr>
-    <a:masterClrMapping/>
-  </p:clrMapOvr>
-</p:sld>
-</file>
-
-<file path=ppt/slides/slide14.xml><?xml version="1.0" encoding="utf-8"?>
-<p:sld xmlns:a="http://schemas.openxmlformats.org/drawingml/2006/main" xmlns:r="http://schemas.openxmlformats.org/officeDocument/2006/relationships" xmlns:mc="http://schemas.openxmlformats.org/markup-compatibility/2006" xmlns:mv="urn:schemas-microsoft-com:mac:vml" xmlns:p="http://schemas.openxmlformats.org/presentationml/2006/main" xmlns:c="http://schemas.openxmlformats.org/drawingml/2006/chart" xmlns:dgm="http://schemas.openxmlformats.org/drawingml/2006/diagram" xmlns:o="urn:schemas-microsoft-com:office:office" xmlns:v="urn:schemas-microsoft-com:vml" xmlns:pvml="urn:schemas-microsoft-com:office:powerpoint" xmlns:com="http://schemas.openxmlformats.org/drawingml/2006/compatibility" xmlns:p14="http://schemas.microsoft.com/office/powerpoint/2010/main" xmlns:p15="http://schemas.microsoft.com/office/powerpoint/2012/main" xmlns:ahyp="http://schemas.microsoft.com/office/drawing/2018/hyperlinkcolor">
-  <p:cSld>
-    <p:spTree>
-      <p:nvGrpSpPr>
-        <p:cNvPr id="122" name="Shape 122"/>
-        <p:cNvGrpSpPr/>
-        <p:nvPr/>
-      </p:nvGrpSpPr>
-      <p:grpSpPr>
-        <a:xfrm>
-          <a:off x="0" y="0"/>
-          <a:ext cx="0" cy="0"/>
-          <a:chOff x="0" y="0"/>
-          <a:chExt cx="0" cy="0"/>
-        </a:xfrm>
-      </p:grpSpPr>
-      <p:sp>
-        <p:nvSpPr>
-          <p:cNvPr id="123" name="Google Shape;123;g3b8409de4d6_0_103"/>
-          <p:cNvSpPr txBox="1"/>
-          <p:nvPr>
-            <p:ph type="title"/>
-          </p:nvPr>
-        </p:nvSpPr>
-        <p:spPr>
-          <a:xfrm>
-            <a:off x="457200" y="274638"/>
-            <a:ext cx="8229600" cy="1143000"/>
-          </a:xfrm>
-          <a:prstGeom prst="rect">
-            <a:avLst/>
-          </a:prstGeom>
-        </p:spPr>
-        <p:txBody>
-          <a:bodyPr anchorCtr="0" anchor="b" bIns="91425" lIns="91425" spcFirstLastPara="1" rIns="91425" wrap="square" tIns="91425">
-            <a:noAutofit/>
-          </a:bodyPr>
-          <a:lstStyle/>
-          <a:p>
-            <a:pPr indent="0" lvl="0" marL="0" rtl="0" algn="l">
-              <a:spcBef>
-                <a:spcPts val="0"/>
-              </a:spcBef>
-              <a:spcAft>
-                <a:spcPts val="0"/>
-              </a:spcAft>
-              <a:buNone/>
-            </a:pPr>
-            <a:r>
-              <a:rPr lang="en">
-                <a:solidFill>
-                  <a:srgbClr val="A31415"/>
-                </a:solidFill>
-                <a:latin typeface="Consolas"/>
-                <a:ea typeface="Consolas"/>
-                <a:cs typeface="Consolas"/>
-                <a:sym typeface="Consolas"/>
-              </a:rPr>
-              <a:t>p</a:t>
-            </a:r>
-            <a:r>
-              <a:rPr lang="en">
-                <a:solidFill>
-                  <a:srgbClr val="A31415"/>
-                </a:solidFill>
-                <a:latin typeface="Consolas"/>
-                <a:ea typeface="Consolas"/>
-                <a:cs typeface="Consolas"/>
-                <a:sym typeface="Consolas"/>
-              </a:rPr>
-              <a:t>rogramming</a:t>
-            </a:r>
-            <a:r>
-              <a:rPr lang="en"/>
-              <a:t>: Classes</a:t>
-            </a:r>
-            <a:endParaRPr/>
-          </a:p>
-        </p:txBody>
-      </p:sp>
-      <p:sp>
-        <p:nvSpPr>
-          <p:cNvPr id="124" name="Google Shape;124;g3b8409de4d6_0_103"/>
-          <p:cNvSpPr txBox="1"/>
-          <p:nvPr>
-            <p:ph idx="1" type="body"/>
-          </p:nvPr>
-        </p:nvSpPr>
-        <p:spPr>
-          <a:xfrm>
-            <a:off x="457200" y="1600200"/>
-            <a:ext cx="8229600" cy="4967700"/>
-          </a:xfrm>
-          <a:prstGeom prst="rect">
-            <a:avLst/>
-          </a:prstGeom>
-        </p:spPr>
-        <p:txBody>
-          <a:bodyPr anchorCtr="0" anchor="t" bIns="91425" lIns="91425" spcFirstLastPara="1" rIns="91425" wrap="square" tIns="91425">
-            <a:noAutofit/>
-          </a:bodyPr>
-          <a:lstStyle/>
-          <a:p>
-            <a:pPr indent="0" lvl="0" marL="0" rtl="0" algn="l">
-              <a:spcBef>
-                <a:spcPts val="600"/>
-              </a:spcBef>
-              <a:spcAft>
-                <a:spcPts val="0"/>
-              </a:spcAft>
-              <a:buNone/>
-            </a:pPr>
-            <a:r>
-              <a:t/>
-            </a:r>
-            <a:endParaRPr/>
-          </a:p>
-        </p:txBody>
-      </p:sp>
-    </p:spTree>
-  </p:cSld>
-  <p:clrMapOvr>
-    <a:masterClrMapping/>
-  </p:clrMapOvr>
-</p:sld>
-</file>
-
-<file path=ppt/slides/slide15.xml><?xml version="1.0" encoding="utf-8"?>
-<p:sld xmlns:a="http://schemas.openxmlformats.org/drawingml/2006/main" xmlns:r="http://schemas.openxmlformats.org/officeDocument/2006/relationships" xmlns:mc="http://schemas.openxmlformats.org/markup-compatibility/2006" xmlns:mv="urn:schemas-microsoft-com:mac:vml" xmlns:p="http://schemas.openxmlformats.org/presentationml/2006/main" xmlns:c="http://schemas.openxmlformats.org/drawingml/2006/chart" xmlns:dgm="http://schemas.openxmlformats.org/drawingml/2006/diagram" xmlns:o="urn:schemas-microsoft-com:office:office" xmlns:v="urn:schemas-microsoft-com:vml" xmlns:pvml="urn:schemas-microsoft-com:office:powerpoint" xmlns:com="http://schemas.openxmlformats.org/drawingml/2006/compatibility" xmlns:p14="http://schemas.microsoft.com/office/powerpoint/2010/main" xmlns:p15="http://schemas.microsoft.com/office/powerpoint/2012/main" xmlns:ahyp="http://schemas.microsoft.com/office/drawing/2018/hyperlinkcolor">
-  <p:cSld>
-    <p:spTree>
-      <p:nvGrpSpPr>
-        <p:cNvPr id="128" name="Shape 128"/>
-        <p:cNvGrpSpPr/>
-        <p:nvPr/>
-      </p:nvGrpSpPr>
-      <p:grpSpPr>
-        <a:xfrm>
-          <a:off x="0" y="0"/>
-          <a:ext cx="0" cy="0"/>
-          <a:chOff x="0" y="0"/>
-          <a:chExt cx="0" cy="0"/>
-        </a:xfrm>
-      </p:grpSpPr>
-      <p:sp>
-        <p:nvSpPr>
-          <p:cNvPr id="129" name="Google Shape;129;g3b8409de4d6_0_95"/>
+          <p:cNvPr id="113" name="Google Shape;113;g3ba79990f52_0_5"/>
           <p:cNvSpPr txBox="1"/>
           <p:nvPr>
             <p:ph type="title"/>
@@ -8450,7 +8121,7 @@
       </p:sp>
       <p:sp>
         <p:nvSpPr>
-          <p:cNvPr id="130" name="Google Shape;130;g3b8409de4d6_0_95"/>
+          <p:cNvPr id="114" name="Google Shape;114;g3ba79990f52_0_5"/>
           <p:cNvSpPr txBox="1"/>
           <p:nvPr>
             <p:ph idx="1" type="body"/>
@@ -8976,7 +8647,7 @@
       </p:sp>
       <p:sp>
         <p:nvSpPr>
-          <p:cNvPr id="131" name="Google Shape;131;g3b8409de4d6_0_95"/>
+          <p:cNvPr id="115" name="Google Shape;115;g3ba79990f52_0_5"/>
           <p:cNvSpPr txBox="1"/>
           <p:nvPr/>
         </p:nvSpPr>
@@ -9042,7 +8713,7 @@
       </p:sp>
       <p:sp>
         <p:nvSpPr>
-          <p:cNvPr id="132" name="Google Shape;132;g3b8409de4d6_0_95"/>
+          <p:cNvPr id="116" name="Google Shape;116;g3ba79990f52_0_5"/>
           <p:cNvSpPr/>
           <p:nvPr/>
         </p:nvSpPr>
@@ -9105,7 +8776,7 @@
       </p:sp>
       <p:pic>
         <p:nvPicPr>
-          <p:cNvPr id="133" name="Google Shape;133;g3b8409de4d6_0_95"/>
+          <p:cNvPr id="117" name="Google Shape;117;g3ba79990f52_0_5"/>
           <p:cNvPicPr preferRelativeResize="0"/>
           <p:nvPr/>
         </p:nvPicPr>
@@ -9138,12 +8809,12 @@
 </p:sld>
 </file>
 
-<file path=ppt/slides/slide16.xml><?xml version="1.0" encoding="utf-8"?>
+<file path=ppt/slides/slide12.xml><?xml version="1.0" encoding="utf-8"?>
 <p:sld xmlns:a="http://schemas.openxmlformats.org/drawingml/2006/main" xmlns:r="http://schemas.openxmlformats.org/officeDocument/2006/relationships" xmlns:mc="http://schemas.openxmlformats.org/markup-compatibility/2006" xmlns:mv="urn:schemas-microsoft-com:mac:vml" xmlns:p="http://schemas.openxmlformats.org/presentationml/2006/main" xmlns:c="http://schemas.openxmlformats.org/drawingml/2006/chart" xmlns:dgm="http://schemas.openxmlformats.org/drawingml/2006/diagram" xmlns:o="urn:schemas-microsoft-com:office:office" xmlns:v="urn:schemas-microsoft-com:vml" xmlns:pvml="urn:schemas-microsoft-com:office:powerpoint" xmlns:com="http://schemas.openxmlformats.org/drawingml/2006/compatibility" xmlns:p14="http://schemas.microsoft.com/office/powerpoint/2010/main" xmlns:p15="http://schemas.microsoft.com/office/powerpoint/2012/main" xmlns:ahyp="http://schemas.microsoft.com/office/drawing/2018/hyperlinkcolor">
   <p:cSld>
     <p:spTree>
       <p:nvGrpSpPr>
-        <p:cNvPr id="137" name="Shape 137"/>
+        <p:cNvPr id="121" name="Shape 121"/>
         <p:cNvGrpSpPr/>
         <p:nvPr/>
       </p:nvGrpSpPr>
@@ -9157,7 +8828,7 @@
       </p:grpSpPr>
       <p:sp>
         <p:nvSpPr>
-          <p:cNvPr id="138" name="Google Shape;138;g3b8409de4d6_0_40"/>
+          <p:cNvPr id="122" name="Google Shape;122;g3b938ea6dd9_0_16"/>
           <p:cNvSpPr txBox="1"/>
           <p:nvPr>
             <p:ph type="title"/>
@@ -9189,19 +8860,15 @@
             </a:pPr>
             <a:r>
               <a:rPr lang="en"/>
-              <a:t>Byte-Pair Encoding Tokenization </a:t>
-            </a:r>
-            <a:r>
-              <a:rPr lang="en" sz="1800"/>
-              <a:t>(1994)</a:t>
-            </a:r>
-            <a:endParaRPr sz="1800"/>
+              <a:t>Why do we Tokenize?</a:t>
+            </a:r>
+            <a:endParaRPr/>
           </a:p>
         </p:txBody>
       </p:sp>
       <p:sp>
         <p:nvSpPr>
-          <p:cNvPr id="139" name="Google Shape;139;g3b8409de4d6_0_40"/>
+          <p:cNvPr id="123" name="Google Shape;123;g3b938ea6dd9_0_16"/>
           <p:cNvSpPr txBox="1"/>
           <p:nvPr>
             <p:ph idx="1" type="body"/>
@@ -9246,12 +8913,12 @@
 </p:sld>
 </file>
 
-<file path=ppt/slides/slide17.xml><?xml version="1.0" encoding="utf-8"?>
+<file path=ppt/slides/slide13.xml><?xml version="1.0" encoding="utf-8"?>
 <p:sld xmlns:a="http://schemas.openxmlformats.org/drawingml/2006/main" xmlns:r="http://schemas.openxmlformats.org/officeDocument/2006/relationships" xmlns:mc="http://schemas.openxmlformats.org/markup-compatibility/2006" xmlns:mv="urn:schemas-microsoft-com:mac:vml" xmlns:p="http://schemas.openxmlformats.org/presentationml/2006/main" xmlns:c="http://schemas.openxmlformats.org/drawingml/2006/chart" xmlns:dgm="http://schemas.openxmlformats.org/drawingml/2006/diagram" xmlns:o="urn:schemas-microsoft-com:office:office" xmlns:v="urn:schemas-microsoft-com:vml" xmlns:pvml="urn:schemas-microsoft-com:office:powerpoint" xmlns:com="http://schemas.openxmlformats.org/drawingml/2006/compatibility" xmlns:p14="http://schemas.microsoft.com/office/powerpoint/2010/main" xmlns:p15="http://schemas.microsoft.com/office/powerpoint/2012/main" xmlns:ahyp="http://schemas.microsoft.com/office/drawing/2018/hyperlinkcolor">
   <p:cSld>
     <p:spTree>
       <p:nvGrpSpPr>
-        <p:cNvPr id="143" name="Shape 143"/>
+        <p:cNvPr id="127" name="Shape 127"/>
         <p:cNvGrpSpPr/>
         <p:nvPr/>
       </p:nvGrpSpPr>
@@ -9265,7 +8932,7 @@
       </p:grpSpPr>
       <p:sp>
         <p:nvSpPr>
-          <p:cNvPr id="144" name="Google Shape;144;g3b8409de4d6_0_118"/>
+          <p:cNvPr id="128" name="Google Shape;128;g3b8409de4d6_0_9"/>
           <p:cNvSpPr txBox="1"/>
           <p:nvPr>
             <p:ph type="title"/>
@@ -9296,20 +8963,8 @@
               <a:buNone/>
             </a:pPr>
             <a:r>
-              <a:rPr lang="en">
-                <a:solidFill>
-                  <a:srgbClr val="A31415"/>
-                </a:solidFill>
-                <a:latin typeface="Consolas"/>
-                <a:ea typeface="Consolas"/>
-                <a:cs typeface="Consolas"/>
-                <a:sym typeface="Consolas"/>
-              </a:rPr>
-              <a:t>programming</a:t>
-            </a:r>
-            <a:r>
               <a:rPr lang="en"/>
-              <a:t>: Regex</a:t>
+              <a:t>What is a Token</a:t>
             </a:r>
             <a:endParaRPr/>
           </a:p>
@@ -9317,7 +8972,7 @@
       </p:sp>
       <p:sp>
         <p:nvSpPr>
-          <p:cNvPr id="145" name="Google Shape;145;g3b8409de4d6_0_118"/>
+          <p:cNvPr id="129" name="Google Shape;129;g3b8409de4d6_0_9"/>
           <p:cNvSpPr txBox="1"/>
           <p:nvPr>
             <p:ph idx="1" type="body"/>
@@ -9362,12 +9017,12 @@
 </p:sld>
 </file>
 
-<file path=ppt/slides/slide18.xml><?xml version="1.0" encoding="utf-8"?>
+<file path=ppt/slides/slide14.xml><?xml version="1.0" encoding="utf-8"?>
 <p:sld xmlns:a="http://schemas.openxmlformats.org/drawingml/2006/main" xmlns:r="http://schemas.openxmlformats.org/officeDocument/2006/relationships" xmlns:mc="http://schemas.openxmlformats.org/markup-compatibility/2006" xmlns:mv="urn:schemas-microsoft-com:mac:vml" xmlns:p="http://schemas.openxmlformats.org/presentationml/2006/main" xmlns:c="http://schemas.openxmlformats.org/drawingml/2006/chart" xmlns:dgm="http://schemas.openxmlformats.org/drawingml/2006/diagram" xmlns:o="urn:schemas-microsoft-com:office:office" xmlns:v="urn:schemas-microsoft-com:vml" xmlns:pvml="urn:schemas-microsoft-com:office:powerpoint" xmlns:com="http://schemas.openxmlformats.org/drawingml/2006/compatibility" xmlns:p14="http://schemas.microsoft.com/office/powerpoint/2010/main" xmlns:p15="http://schemas.microsoft.com/office/powerpoint/2012/main" xmlns:ahyp="http://schemas.microsoft.com/office/drawing/2018/hyperlinkcolor">
   <p:cSld>
     <p:spTree>
       <p:nvGrpSpPr>
-        <p:cNvPr id="149" name="Shape 149"/>
+        <p:cNvPr id="133" name="Shape 133"/>
         <p:cNvGrpSpPr/>
         <p:nvPr/>
       </p:nvGrpSpPr>
@@ -9381,7 +9036,7 @@
       </p:grpSpPr>
       <p:sp>
         <p:nvSpPr>
-          <p:cNvPr id="150" name="Google Shape;150;g3b8409de4d6_0_126"/>
+          <p:cNvPr id="134" name="Google Shape;134;g3b8409de4d6_0_4"/>
           <p:cNvSpPr txBox="1"/>
           <p:nvPr>
             <p:ph type="title"/>
@@ -9412,20 +9067,8 @@
               <a:buNone/>
             </a:pPr>
             <a:r>
-              <a:rPr lang="en">
-                <a:solidFill>
-                  <a:srgbClr val="A31415"/>
-                </a:solidFill>
-                <a:latin typeface="Consolas"/>
-                <a:ea typeface="Consolas"/>
-                <a:cs typeface="Consolas"/>
-                <a:sym typeface="Consolas"/>
-              </a:rPr>
-              <a:t>programming</a:t>
-            </a:r>
-            <a:r>
               <a:rPr lang="en"/>
-              <a:t>: List Slices</a:t>
+              <a:t>Tokenization</a:t>
             </a:r>
             <a:endParaRPr/>
           </a:p>
@@ -9433,7 +9076,7 @@
       </p:sp>
       <p:sp>
         <p:nvSpPr>
-          <p:cNvPr id="151" name="Google Shape;151;g3b8409de4d6_0_126"/>
+          <p:cNvPr id="135" name="Google Shape;135;g3b8409de4d6_0_4"/>
           <p:cNvSpPr txBox="1"/>
           <p:nvPr>
             <p:ph idx="1" type="body"/>
@@ -9478,12 +9121,12 @@
 </p:sld>
 </file>
 
-<file path=ppt/slides/slide19.xml><?xml version="1.0" encoding="utf-8"?>
+<file path=ppt/slides/slide15.xml><?xml version="1.0" encoding="utf-8"?>
 <p:sld xmlns:a="http://schemas.openxmlformats.org/drawingml/2006/main" xmlns:r="http://schemas.openxmlformats.org/officeDocument/2006/relationships" xmlns:mc="http://schemas.openxmlformats.org/markup-compatibility/2006" xmlns:mv="urn:schemas-microsoft-com:mac:vml" xmlns:p="http://schemas.openxmlformats.org/presentationml/2006/main" xmlns:c="http://schemas.openxmlformats.org/drawingml/2006/chart" xmlns:dgm="http://schemas.openxmlformats.org/drawingml/2006/diagram" xmlns:o="urn:schemas-microsoft-com:office:office" xmlns:v="urn:schemas-microsoft-com:vml" xmlns:pvml="urn:schemas-microsoft-com:office:powerpoint" xmlns:com="http://schemas.openxmlformats.org/drawingml/2006/compatibility" xmlns:p14="http://schemas.microsoft.com/office/powerpoint/2010/main" xmlns:p15="http://schemas.microsoft.com/office/powerpoint/2012/main" xmlns:ahyp="http://schemas.microsoft.com/office/drawing/2018/hyperlinkcolor">
   <p:cSld>
     <p:spTree>
       <p:nvGrpSpPr>
-        <p:cNvPr id="155" name="Shape 155"/>
+        <p:cNvPr id="139" name="Shape 139"/>
         <p:cNvGrpSpPr/>
         <p:nvPr/>
       </p:nvGrpSpPr>
@@ -9497,7 +9140,7 @@
       </p:grpSpPr>
       <p:sp>
         <p:nvSpPr>
-          <p:cNvPr id="156" name="Google Shape;156;g3b8409de4d6_0_108"/>
+          <p:cNvPr id="140" name="Google Shape;140;g3b8409de4d6_0_103"/>
           <p:cNvSpPr txBox="1"/>
           <p:nvPr>
             <p:ph type="title"/>
@@ -9528,8 +9171,32 @@
               <a:buNone/>
             </a:pPr>
             <a:r>
+              <a:rPr lang="en">
+                <a:solidFill>
+                  <a:srgbClr val="A31415"/>
+                </a:solidFill>
+                <a:latin typeface="Consolas"/>
+                <a:ea typeface="Consolas"/>
+                <a:cs typeface="Consolas"/>
+                <a:sym typeface="Consolas"/>
+              </a:rPr>
+              <a:t>p</a:t>
+            </a:r>
+            <a:r>
+              <a:rPr lang="en">
+                <a:solidFill>
+                  <a:srgbClr val="A31415"/>
+                </a:solidFill>
+                <a:latin typeface="Consolas"/>
+                <a:ea typeface="Consolas"/>
+                <a:cs typeface="Consolas"/>
+                <a:sym typeface="Consolas"/>
+              </a:rPr>
+              <a:t>rogramming</a:t>
+            </a:r>
+            <a:r>
               <a:rPr lang="en"/>
-              <a:t>nanochat Tokenizer</a:t>
+              <a:t>: Classes</a:t>
             </a:r>
             <a:endParaRPr/>
           </a:p>
@@ -9537,7 +9204,1102 @@
       </p:sp>
       <p:sp>
         <p:nvSpPr>
-          <p:cNvPr id="157" name="Google Shape;157;g3b8409de4d6_0_108"/>
+          <p:cNvPr id="141" name="Google Shape;141;g3b8409de4d6_0_103"/>
+          <p:cNvSpPr txBox="1"/>
+          <p:nvPr>
+            <p:ph idx="1" type="body"/>
+          </p:nvPr>
+        </p:nvSpPr>
+        <p:spPr>
+          <a:xfrm>
+            <a:off x="457200" y="1600200"/>
+            <a:ext cx="8229600" cy="4967700"/>
+          </a:xfrm>
+          <a:prstGeom prst="rect">
+            <a:avLst/>
+          </a:prstGeom>
+        </p:spPr>
+        <p:txBody>
+          <a:bodyPr anchorCtr="0" anchor="t" bIns="91425" lIns="91425" spcFirstLastPara="1" rIns="91425" wrap="square" tIns="91425">
+            <a:noAutofit/>
+          </a:bodyPr>
+          <a:lstStyle/>
+          <a:p>
+            <a:pPr indent="0" lvl="0" marL="0" rtl="0" algn="l">
+              <a:spcBef>
+                <a:spcPts val="600"/>
+              </a:spcBef>
+              <a:spcAft>
+                <a:spcPts val="0"/>
+              </a:spcAft>
+              <a:buNone/>
+            </a:pPr>
+            <a:r>
+              <a:t/>
+            </a:r>
+            <a:endParaRPr/>
+          </a:p>
+        </p:txBody>
+      </p:sp>
+    </p:spTree>
+  </p:cSld>
+  <p:clrMapOvr>
+    <a:masterClrMapping/>
+  </p:clrMapOvr>
+</p:sld>
+</file>
+
+<file path=ppt/slides/slide16.xml><?xml version="1.0" encoding="utf-8"?>
+<p:sld xmlns:a="http://schemas.openxmlformats.org/drawingml/2006/main" xmlns:r="http://schemas.openxmlformats.org/officeDocument/2006/relationships" xmlns:mc="http://schemas.openxmlformats.org/markup-compatibility/2006" xmlns:mv="urn:schemas-microsoft-com:mac:vml" xmlns:p="http://schemas.openxmlformats.org/presentationml/2006/main" xmlns:c="http://schemas.openxmlformats.org/drawingml/2006/chart" xmlns:dgm="http://schemas.openxmlformats.org/drawingml/2006/diagram" xmlns:o="urn:schemas-microsoft-com:office:office" xmlns:v="urn:schemas-microsoft-com:vml" xmlns:pvml="urn:schemas-microsoft-com:office:powerpoint" xmlns:com="http://schemas.openxmlformats.org/drawingml/2006/compatibility" xmlns:p14="http://schemas.microsoft.com/office/powerpoint/2010/main" xmlns:p15="http://schemas.microsoft.com/office/powerpoint/2012/main" xmlns:ahyp="http://schemas.microsoft.com/office/drawing/2018/hyperlinkcolor">
+  <p:cSld>
+    <p:spTree>
+      <p:nvGrpSpPr>
+        <p:cNvPr id="145" name="Shape 145"/>
+        <p:cNvGrpSpPr/>
+        <p:nvPr/>
+      </p:nvGrpSpPr>
+      <p:grpSpPr>
+        <a:xfrm>
+          <a:off x="0" y="0"/>
+          <a:ext cx="0" cy="0"/>
+          <a:chOff x="0" y="0"/>
+          <a:chExt cx="0" cy="0"/>
+        </a:xfrm>
+      </p:grpSpPr>
+      <p:sp>
+        <p:nvSpPr>
+          <p:cNvPr id="146" name="Google Shape;146;g3b8409de4d6_0_95"/>
+          <p:cNvSpPr txBox="1"/>
+          <p:nvPr>
+            <p:ph type="title"/>
+          </p:nvPr>
+        </p:nvSpPr>
+        <p:spPr>
+          <a:xfrm>
+            <a:off x="457200" y="274638"/>
+            <a:ext cx="8229600" cy="1143000"/>
+          </a:xfrm>
+          <a:prstGeom prst="rect">
+            <a:avLst/>
+          </a:prstGeom>
+          <a:noFill/>
+          <a:ln>
+            <a:noFill/>
+          </a:ln>
+        </p:spPr>
+        <p:txBody>
+          <a:bodyPr anchorCtr="0" anchor="b" bIns="91425" lIns="91425" spcFirstLastPara="1" rIns="91425" wrap="square" tIns="91425">
+            <a:noAutofit/>
+          </a:bodyPr>
+          <a:lstStyle/>
+          <a:p>
+            <a:pPr indent="0" lvl="0" marL="0" rtl="0" algn="l">
+              <a:lnSpc>
+                <a:spcPct val="100000"/>
+              </a:lnSpc>
+              <a:spcBef>
+                <a:spcPts val="0"/>
+              </a:spcBef>
+              <a:spcAft>
+                <a:spcPts val="0"/>
+              </a:spcAft>
+              <a:buSzPts val="3600"/>
+              <a:buNone/>
+            </a:pPr>
+            <a:r>
+              <a:rPr lang="en"/>
+              <a:t>Last Class - Text as Data</a:t>
+            </a:r>
+            <a:endParaRPr/>
+          </a:p>
+        </p:txBody>
+      </p:sp>
+      <p:sp>
+        <p:nvSpPr>
+          <p:cNvPr id="147" name="Google Shape;147;g3b8409de4d6_0_95"/>
+          <p:cNvSpPr txBox="1"/>
+          <p:nvPr>
+            <p:ph idx="1" type="body"/>
+          </p:nvPr>
+        </p:nvSpPr>
+        <p:spPr>
+          <a:xfrm>
+            <a:off x="457200" y="1765116"/>
+            <a:ext cx="3078000" cy="4459800"/>
+          </a:xfrm>
+          <a:prstGeom prst="rect">
+            <a:avLst/>
+          </a:prstGeom>
+          <a:noFill/>
+          <a:ln cap="flat" cmpd="sng" w="35550">
+            <a:solidFill>
+              <a:srgbClr val="002B5B"/>
+            </a:solidFill>
+            <a:prstDash val="solid"/>
+            <a:round/>
+            <a:headEnd len="sm" w="sm" type="none"/>
+            <a:tailEnd len="sm" w="sm" type="none"/>
+          </a:ln>
+        </p:spPr>
+        <p:txBody>
+          <a:bodyPr anchorCtr="0" anchor="t" bIns="85325" lIns="85325" spcFirstLastPara="1" rIns="85325" wrap="square" tIns="85325">
+            <a:noAutofit/>
+          </a:bodyPr>
+          <a:lstStyle/>
+          <a:p>
+            <a:pPr indent="0" lvl="0" marL="0" rtl="0" algn="l">
+              <a:lnSpc>
+                <a:spcPct val="100000"/>
+              </a:lnSpc>
+              <a:spcBef>
+                <a:spcPts val="560"/>
+              </a:spcBef>
+              <a:spcAft>
+                <a:spcPts val="0"/>
+              </a:spcAft>
+              <a:buSzPts val="2800"/>
+              <a:buNone/>
+            </a:pPr>
+            <a:r>
+              <a:rPr lang="en" sz="1120">
+                <a:latin typeface="Consolas"/>
+                <a:ea typeface="Consolas"/>
+                <a:cs typeface="Consolas"/>
+                <a:sym typeface="Consolas"/>
+              </a:rPr>
+              <a:t>"Jabberwocky"</a:t>
+            </a:r>
+            <a:endParaRPr sz="1120">
+              <a:latin typeface="Consolas"/>
+              <a:ea typeface="Consolas"/>
+              <a:cs typeface="Consolas"/>
+              <a:sym typeface="Consolas"/>
+            </a:endParaRPr>
+          </a:p>
+          <a:p>
+            <a:pPr indent="0" lvl="0" marL="0" rtl="0" algn="l">
+              <a:lnSpc>
+                <a:spcPct val="100000"/>
+              </a:lnSpc>
+              <a:spcBef>
+                <a:spcPts val="560"/>
+              </a:spcBef>
+              <a:spcAft>
+                <a:spcPts val="0"/>
+              </a:spcAft>
+              <a:buSzPts val="2800"/>
+              <a:buNone/>
+            </a:pPr>
+            <a:r>
+              <a:rPr lang="en" sz="1120">
+                <a:latin typeface="Consolas"/>
+                <a:ea typeface="Consolas"/>
+                <a:cs typeface="Consolas"/>
+                <a:sym typeface="Consolas"/>
+              </a:rPr>
+              <a:t>by Lewis Carroll</a:t>
+            </a:r>
+            <a:endParaRPr sz="1120">
+              <a:latin typeface="Consolas"/>
+              <a:ea typeface="Consolas"/>
+              <a:cs typeface="Consolas"/>
+              <a:sym typeface="Consolas"/>
+            </a:endParaRPr>
+          </a:p>
+          <a:p>
+            <a:pPr indent="0" lvl="0" marL="0" rtl="0" algn="l">
+              <a:lnSpc>
+                <a:spcPct val="100000"/>
+              </a:lnSpc>
+              <a:spcBef>
+                <a:spcPts val="560"/>
+              </a:spcBef>
+              <a:spcAft>
+                <a:spcPts val="0"/>
+              </a:spcAft>
+              <a:buSzPts val="2800"/>
+              <a:buNone/>
+            </a:pPr>
+            <a:r>
+              <a:t/>
+            </a:r>
+            <a:endParaRPr sz="1120">
+              <a:latin typeface="Consolas"/>
+              <a:ea typeface="Consolas"/>
+              <a:cs typeface="Consolas"/>
+              <a:sym typeface="Consolas"/>
+            </a:endParaRPr>
+          </a:p>
+          <a:p>
+            <a:pPr indent="0" lvl="0" marL="0" rtl="0" algn="l">
+              <a:lnSpc>
+                <a:spcPct val="100000"/>
+              </a:lnSpc>
+              <a:spcBef>
+                <a:spcPts val="560"/>
+              </a:spcBef>
+              <a:spcAft>
+                <a:spcPts val="0"/>
+              </a:spcAft>
+              <a:buSzPts val="2800"/>
+              <a:buNone/>
+            </a:pPr>
+            <a:r>
+              <a:rPr lang="en" sz="1120">
+                <a:latin typeface="Consolas"/>
+                <a:ea typeface="Consolas"/>
+                <a:cs typeface="Consolas"/>
+                <a:sym typeface="Consolas"/>
+              </a:rPr>
+              <a:t>'Twas brillig, and the slithy toves</a:t>
+            </a:r>
+            <a:endParaRPr sz="1120">
+              <a:latin typeface="Consolas"/>
+              <a:ea typeface="Consolas"/>
+              <a:cs typeface="Consolas"/>
+              <a:sym typeface="Consolas"/>
+            </a:endParaRPr>
+          </a:p>
+          <a:p>
+            <a:pPr indent="0" lvl="0" marL="0" rtl="0" algn="l">
+              <a:lnSpc>
+                <a:spcPct val="100000"/>
+              </a:lnSpc>
+              <a:spcBef>
+                <a:spcPts val="560"/>
+              </a:spcBef>
+              <a:spcAft>
+                <a:spcPts val="0"/>
+              </a:spcAft>
+              <a:buSzPts val="2800"/>
+              <a:buNone/>
+            </a:pPr>
+            <a:r>
+              <a:rPr lang="en" sz="1120">
+                <a:latin typeface="Consolas"/>
+                <a:ea typeface="Consolas"/>
+                <a:cs typeface="Consolas"/>
+                <a:sym typeface="Consolas"/>
+              </a:rPr>
+              <a:t>Did gyre and gimble in the wabe;</a:t>
+            </a:r>
+            <a:endParaRPr sz="1120">
+              <a:latin typeface="Consolas"/>
+              <a:ea typeface="Consolas"/>
+              <a:cs typeface="Consolas"/>
+              <a:sym typeface="Consolas"/>
+            </a:endParaRPr>
+          </a:p>
+          <a:p>
+            <a:pPr indent="0" lvl="0" marL="0" rtl="0" algn="l">
+              <a:lnSpc>
+                <a:spcPct val="100000"/>
+              </a:lnSpc>
+              <a:spcBef>
+                <a:spcPts val="560"/>
+              </a:spcBef>
+              <a:spcAft>
+                <a:spcPts val="0"/>
+              </a:spcAft>
+              <a:buSzPts val="2800"/>
+              <a:buNone/>
+            </a:pPr>
+            <a:r>
+              <a:rPr lang="en" sz="1120">
+                <a:latin typeface="Consolas"/>
+                <a:ea typeface="Consolas"/>
+                <a:cs typeface="Consolas"/>
+                <a:sym typeface="Consolas"/>
+              </a:rPr>
+              <a:t>All mimsy were the borogoves,</a:t>
+            </a:r>
+            <a:endParaRPr sz="1120">
+              <a:latin typeface="Consolas"/>
+              <a:ea typeface="Consolas"/>
+              <a:cs typeface="Consolas"/>
+              <a:sym typeface="Consolas"/>
+            </a:endParaRPr>
+          </a:p>
+          <a:p>
+            <a:pPr indent="0" lvl="0" marL="0" rtl="0" algn="l">
+              <a:lnSpc>
+                <a:spcPct val="100000"/>
+              </a:lnSpc>
+              <a:spcBef>
+                <a:spcPts val="560"/>
+              </a:spcBef>
+              <a:spcAft>
+                <a:spcPts val="0"/>
+              </a:spcAft>
+              <a:buSzPts val="2800"/>
+              <a:buNone/>
+            </a:pPr>
+            <a:r>
+              <a:rPr lang="en" sz="1120">
+                <a:latin typeface="Consolas"/>
+                <a:ea typeface="Consolas"/>
+                <a:cs typeface="Consolas"/>
+                <a:sym typeface="Consolas"/>
+              </a:rPr>
+              <a:t>And the mome raths outgrabe.</a:t>
+            </a:r>
+            <a:endParaRPr sz="1120">
+              <a:latin typeface="Consolas"/>
+              <a:ea typeface="Consolas"/>
+              <a:cs typeface="Consolas"/>
+              <a:sym typeface="Consolas"/>
+            </a:endParaRPr>
+          </a:p>
+          <a:p>
+            <a:pPr indent="0" lvl="0" marL="0" rtl="0" algn="l">
+              <a:lnSpc>
+                <a:spcPct val="100000"/>
+              </a:lnSpc>
+              <a:spcBef>
+                <a:spcPts val="560"/>
+              </a:spcBef>
+              <a:spcAft>
+                <a:spcPts val="0"/>
+              </a:spcAft>
+              <a:buSzPts val="2800"/>
+              <a:buNone/>
+            </a:pPr>
+            <a:r>
+              <a:t/>
+            </a:r>
+            <a:endParaRPr sz="1120">
+              <a:latin typeface="Consolas"/>
+              <a:ea typeface="Consolas"/>
+              <a:cs typeface="Consolas"/>
+              <a:sym typeface="Consolas"/>
+            </a:endParaRPr>
+          </a:p>
+          <a:p>
+            <a:pPr indent="0" lvl="0" marL="0" rtl="0" algn="l">
+              <a:lnSpc>
+                <a:spcPct val="100000"/>
+              </a:lnSpc>
+              <a:spcBef>
+                <a:spcPts val="560"/>
+              </a:spcBef>
+              <a:spcAft>
+                <a:spcPts val="0"/>
+              </a:spcAft>
+              <a:buSzPts val="2800"/>
+              <a:buNone/>
+            </a:pPr>
+            <a:r>
+              <a:rPr lang="en" sz="1120">
+                <a:latin typeface="Consolas"/>
+                <a:ea typeface="Consolas"/>
+                <a:cs typeface="Consolas"/>
+                <a:sym typeface="Consolas"/>
+              </a:rPr>
+              <a:t>"Beware the Jabberwock, my son!</a:t>
+            </a:r>
+            <a:endParaRPr sz="1120">
+              <a:latin typeface="Consolas"/>
+              <a:ea typeface="Consolas"/>
+              <a:cs typeface="Consolas"/>
+              <a:sym typeface="Consolas"/>
+            </a:endParaRPr>
+          </a:p>
+          <a:p>
+            <a:pPr indent="0" lvl="0" marL="0" rtl="0" algn="l">
+              <a:lnSpc>
+                <a:spcPct val="100000"/>
+              </a:lnSpc>
+              <a:spcBef>
+                <a:spcPts val="560"/>
+              </a:spcBef>
+              <a:spcAft>
+                <a:spcPts val="0"/>
+              </a:spcAft>
+              <a:buSzPts val="2800"/>
+              <a:buNone/>
+            </a:pPr>
+            <a:r>
+              <a:rPr lang="en" sz="1120">
+                <a:latin typeface="Consolas"/>
+                <a:ea typeface="Consolas"/>
+                <a:cs typeface="Consolas"/>
+                <a:sym typeface="Consolas"/>
+              </a:rPr>
+              <a:t>The jaws that bite, the claws that catch!</a:t>
+            </a:r>
+            <a:endParaRPr sz="1120">
+              <a:latin typeface="Consolas"/>
+              <a:ea typeface="Consolas"/>
+              <a:cs typeface="Consolas"/>
+              <a:sym typeface="Consolas"/>
+            </a:endParaRPr>
+          </a:p>
+          <a:p>
+            <a:pPr indent="0" lvl="0" marL="0" rtl="0" algn="l">
+              <a:lnSpc>
+                <a:spcPct val="100000"/>
+              </a:lnSpc>
+              <a:spcBef>
+                <a:spcPts val="560"/>
+              </a:spcBef>
+              <a:spcAft>
+                <a:spcPts val="0"/>
+              </a:spcAft>
+              <a:buSzPts val="2800"/>
+              <a:buNone/>
+            </a:pPr>
+            <a:r>
+              <a:rPr lang="en" sz="1120">
+                <a:latin typeface="Consolas"/>
+                <a:ea typeface="Consolas"/>
+                <a:cs typeface="Consolas"/>
+                <a:sym typeface="Consolas"/>
+              </a:rPr>
+              <a:t>Beware the Jubjub bird, and shun</a:t>
+            </a:r>
+            <a:endParaRPr sz="1120">
+              <a:latin typeface="Consolas"/>
+              <a:ea typeface="Consolas"/>
+              <a:cs typeface="Consolas"/>
+              <a:sym typeface="Consolas"/>
+            </a:endParaRPr>
+          </a:p>
+          <a:p>
+            <a:pPr indent="0" lvl="0" marL="0" rtl="0" algn="l">
+              <a:lnSpc>
+                <a:spcPct val="100000"/>
+              </a:lnSpc>
+              <a:spcBef>
+                <a:spcPts val="560"/>
+              </a:spcBef>
+              <a:spcAft>
+                <a:spcPts val="0"/>
+              </a:spcAft>
+              <a:buSzPts val="2800"/>
+              <a:buNone/>
+            </a:pPr>
+            <a:r>
+              <a:rPr lang="en" sz="1120">
+                <a:latin typeface="Consolas"/>
+                <a:ea typeface="Consolas"/>
+                <a:cs typeface="Consolas"/>
+                <a:sym typeface="Consolas"/>
+              </a:rPr>
+              <a:t>The frumious Bandersnatch!"</a:t>
+            </a:r>
+            <a:endParaRPr sz="1120">
+              <a:latin typeface="Consolas"/>
+              <a:ea typeface="Consolas"/>
+              <a:cs typeface="Consolas"/>
+              <a:sym typeface="Consolas"/>
+            </a:endParaRPr>
+          </a:p>
+          <a:p>
+            <a:pPr indent="0" lvl="0" marL="0" rtl="0" algn="l">
+              <a:lnSpc>
+                <a:spcPct val="100000"/>
+              </a:lnSpc>
+              <a:spcBef>
+                <a:spcPts val="560"/>
+              </a:spcBef>
+              <a:spcAft>
+                <a:spcPts val="0"/>
+              </a:spcAft>
+              <a:buSzPts val="2800"/>
+              <a:buNone/>
+            </a:pPr>
+            <a:r>
+              <a:t/>
+            </a:r>
+            <a:endParaRPr sz="1120">
+              <a:latin typeface="Consolas"/>
+              <a:ea typeface="Consolas"/>
+              <a:cs typeface="Consolas"/>
+              <a:sym typeface="Consolas"/>
+            </a:endParaRPr>
+          </a:p>
+          <a:p>
+            <a:pPr indent="0" lvl="0" marL="0" rtl="0" algn="l">
+              <a:lnSpc>
+                <a:spcPct val="100000"/>
+              </a:lnSpc>
+              <a:spcBef>
+                <a:spcPts val="560"/>
+              </a:spcBef>
+              <a:spcAft>
+                <a:spcPts val="0"/>
+              </a:spcAft>
+              <a:buSzPts val="2800"/>
+              <a:buNone/>
+            </a:pPr>
+            <a:r>
+              <a:rPr lang="en" sz="1120">
+                <a:latin typeface="Consolas"/>
+                <a:ea typeface="Consolas"/>
+                <a:cs typeface="Consolas"/>
+                <a:sym typeface="Consolas"/>
+              </a:rPr>
+              <a:t>He took his vorpal sword in hand:</a:t>
+            </a:r>
+            <a:endParaRPr sz="1120">
+              <a:latin typeface="Consolas"/>
+              <a:ea typeface="Consolas"/>
+              <a:cs typeface="Consolas"/>
+              <a:sym typeface="Consolas"/>
+            </a:endParaRPr>
+          </a:p>
+          <a:p>
+            <a:pPr indent="0" lvl="0" marL="0" rtl="0" algn="l">
+              <a:lnSpc>
+                <a:spcPct val="100000"/>
+              </a:lnSpc>
+              <a:spcBef>
+                <a:spcPts val="560"/>
+              </a:spcBef>
+              <a:spcAft>
+                <a:spcPts val="0"/>
+              </a:spcAft>
+              <a:buSzPts val="2800"/>
+              <a:buNone/>
+            </a:pPr>
+            <a:r>
+              <a:rPr lang="en" sz="1120">
+                <a:latin typeface="Consolas"/>
+                <a:ea typeface="Consolas"/>
+                <a:cs typeface="Consolas"/>
+                <a:sym typeface="Consolas"/>
+              </a:rPr>
+              <a:t>Long time the manxome foe he sought—</a:t>
+            </a:r>
+            <a:endParaRPr sz="1120">
+              <a:latin typeface="Consolas"/>
+              <a:ea typeface="Consolas"/>
+              <a:cs typeface="Consolas"/>
+              <a:sym typeface="Consolas"/>
+            </a:endParaRPr>
+          </a:p>
+          <a:p>
+            <a:pPr indent="0" lvl="0" marL="0" rtl="0" algn="l">
+              <a:lnSpc>
+                <a:spcPct val="100000"/>
+              </a:lnSpc>
+              <a:spcBef>
+                <a:spcPts val="560"/>
+              </a:spcBef>
+              <a:spcAft>
+                <a:spcPts val="0"/>
+              </a:spcAft>
+              <a:buSzPts val="2800"/>
+              <a:buNone/>
+            </a:pPr>
+            <a:r>
+              <a:rPr lang="en" sz="1120">
+                <a:latin typeface="Consolas"/>
+                <a:ea typeface="Consolas"/>
+                <a:cs typeface="Consolas"/>
+                <a:sym typeface="Consolas"/>
+              </a:rPr>
+              <a:t>So rested he by the Tumtum tree,</a:t>
+            </a:r>
+            <a:endParaRPr sz="1120">
+              <a:latin typeface="Consolas"/>
+              <a:ea typeface="Consolas"/>
+              <a:cs typeface="Consolas"/>
+              <a:sym typeface="Consolas"/>
+            </a:endParaRPr>
+          </a:p>
+          <a:p>
+            <a:pPr indent="0" lvl="0" marL="0" rtl="0" algn="l">
+              <a:lnSpc>
+                <a:spcPct val="100000"/>
+              </a:lnSpc>
+              <a:spcBef>
+                <a:spcPts val="560"/>
+              </a:spcBef>
+              <a:spcAft>
+                <a:spcPts val="0"/>
+              </a:spcAft>
+              <a:buSzPts val="2800"/>
+              <a:buNone/>
+            </a:pPr>
+            <a:r>
+              <a:rPr lang="en" sz="1120">
+                <a:latin typeface="Consolas"/>
+                <a:ea typeface="Consolas"/>
+                <a:cs typeface="Consolas"/>
+                <a:sym typeface="Consolas"/>
+              </a:rPr>
+              <a:t>And stood awhile in thought.</a:t>
+            </a:r>
+            <a:endParaRPr sz="1120">
+              <a:latin typeface="Consolas"/>
+              <a:ea typeface="Consolas"/>
+              <a:cs typeface="Consolas"/>
+              <a:sym typeface="Consolas"/>
+            </a:endParaRPr>
+          </a:p>
+        </p:txBody>
+      </p:sp>
+      <p:sp>
+        <p:nvSpPr>
+          <p:cNvPr id="148" name="Google Shape;148;g3b8409de4d6_0_95"/>
+          <p:cNvSpPr txBox="1"/>
+          <p:nvPr/>
+        </p:nvSpPr>
+        <p:spPr>
+          <a:xfrm>
+            <a:off x="1401418" y="1465801"/>
+            <a:ext cx="2133600" cy="251100"/>
+          </a:xfrm>
+          <a:prstGeom prst="rect">
+            <a:avLst/>
+          </a:prstGeom>
+          <a:noFill/>
+          <a:ln>
+            <a:noFill/>
+          </a:ln>
+        </p:spPr>
+        <p:txBody>
+          <a:bodyPr anchorCtr="0" anchor="ctr" bIns="85325" lIns="85325" spcFirstLastPara="1" rIns="85325" wrap="square" tIns="85325">
+            <a:noAutofit/>
+          </a:bodyPr>
+          <a:lstStyle/>
+          <a:p>
+            <a:pPr indent="0" lvl="0" marL="0" marR="0" rtl="0" algn="r">
+              <a:lnSpc>
+                <a:spcPct val="100000"/>
+              </a:lnSpc>
+              <a:spcBef>
+                <a:spcPts val="0"/>
+              </a:spcBef>
+              <a:spcAft>
+                <a:spcPts val="0"/>
+              </a:spcAft>
+              <a:buClr>
+                <a:srgbClr val="000000"/>
+              </a:buClr>
+              <a:buSzPts val="1680"/>
+              <a:buFont typeface="Arial"/>
+              <a:buNone/>
+            </a:pPr>
+            <a:r>
+              <a:rPr b="1" i="0" lang="en" sz="1680" u="none" cap="none" strike="noStrike">
+                <a:solidFill>
+                  <a:srgbClr val="DCB439"/>
+                </a:solidFill>
+                <a:latin typeface="Consolas"/>
+                <a:ea typeface="Consolas"/>
+                <a:cs typeface="Consolas"/>
+                <a:sym typeface="Consolas"/>
+              </a:rPr>
+              <a:t>jabberwocky.txt</a:t>
+            </a:r>
+            <a:endParaRPr b="1" i="0" sz="1680" u="none" cap="none" strike="noStrike">
+              <a:solidFill>
+                <a:srgbClr val="DCB439"/>
+              </a:solidFill>
+              <a:latin typeface="Consolas"/>
+              <a:ea typeface="Consolas"/>
+              <a:cs typeface="Consolas"/>
+              <a:sym typeface="Consolas"/>
+            </a:endParaRPr>
+          </a:p>
+        </p:txBody>
+      </p:sp>
+      <p:sp>
+        <p:nvSpPr>
+          <p:cNvPr id="149" name="Google Shape;149;g3b8409de4d6_0_95"/>
+          <p:cNvSpPr/>
+          <p:nvPr/>
+        </p:nvSpPr>
+        <p:spPr>
+          <a:xfrm>
+            <a:off x="457200" y="1417650"/>
+            <a:ext cx="3078000" cy="347400"/>
+          </a:xfrm>
+          <a:prstGeom prst="rect">
+            <a:avLst/>
+          </a:prstGeom>
+          <a:noFill/>
+          <a:ln cap="flat" cmpd="sng" w="35550">
+            <a:solidFill>
+              <a:srgbClr val="002B5B"/>
+            </a:solidFill>
+            <a:prstDash val="solid"/>
+            <a:round/>
+            <a:headEnd len="sm" w="sm" type="none"/>
+            <a:tailEnd len="sm" w="sm" type="none"/>
+          </a:ln>
+        </p:spPr>
+        <p:txBody>
+          <a:bodyPr anchorCtr="0" anchor="ctr" bIns="85325" lIns="85325" spcFirstLastPara="1" rIns="85325" wrap="square" tIns="85325">
+            <a:noAutofit/>
+          </a:bodyPr>
+          <a:lstStyle/>
+          <a:p>
+            <a:pPr indent="0" lvl="0" marL="0" marR="0" rtl="0" algn="r">
+              <a:lnSpc>
+                <a:spcPct val="100000"/>
+              </a:lnSpc>
+              <a:spcBef>
+                <a:spcPts val="0"/>
+              </a:spcBef>
+              <a:spcAft>
+                <a:spcPts val="0"/>
+              </a:spcAft>
+              <a:buClr>
+                <a:srgbClr val="000000"/>
+              </a:buClr>
+              <a:buSzPts val="1307"/>
+              <a:buFont typeface="Arial"/>
+              <a:buNone/>
+            </a:pPr>
+            <a:r>
+              <a:t/>
+            </a:r>
+            <a:endParaRPr b="0" i="0" sz="1306" u="none" cap="none" strike="noStrike">
+              <a:solidFill>
+                <a:srgbClr val="000000"/>
+              </a:solidFill>
+              <a:latin typeface="Arial"/>
+              <a:ea typeface="Arial"/>
+              <a:cs typeface="Arial"/>
+              <a:sym typeface="Arial"/>
+            </a:endParaRPr>
+          </a:p>
+        </p:txBody>
+      </p:sp>
+      <p:pic>
+        <p:nvPicPr>
+          <p:cNvPr id="150" name="Google Shape;150;g3b8409de4d6_0_95"/>
+          <p:cNvPicPr preferRelativeResize="0"/>
+          <p:nvPr/>
+        </p:nvPicPr>
+        <p:blipFill rotWithShape="1">
+          <a:blip r:embed="rId3">
+            <a:alphaModFix/>
+          </a:blip>
+          <a:srcRect b="12536" l="18278" r="18430" t="12303"/>
+          <a:stretch/>
+        </p:blipFill>
+        <p:spPr>
+          <a:xfrm>
+            <a:off x="493859" y="1447565"/>
+            <a:ext cx="242227" cy="287648"/>
+          </a:xfrm>
+          <a:prstGeom prst="rect">
+            <a:avLst/>
+          </a:prstGeom>
+          <a:noFill/>
+          <a:ln>
+            <a:noFill/>
+          </a:ln>
+        </p:spPr>
+      </p:pic>
+    </p:spTree>
+  </p:cSld>
+  <p:clrMapOvr>
+    <a:masterClrMapping/>
+  </p:clrMapOvr>
+</p:sld>
+</file>
+
+<file path=ppt/slides/slide17.xml><?xml version="1.0" encoding="utf-8"?>
+<p:sld xmlns:a="http://schemas.openxmlformats.org/drawingml/2006/main" xmlns:r="http://schemas.openxmlformats.org/officeDocument/2006/relationships" xmlns:mc="http://schemas.openxmlformats.org/markup-compatibility/2006" xmlns:mv="urn:schemas-microsoft-com:mac:vml" xmlns:p="http://schemas.openxmlformats.org/presentationml/2006/main" xmlns:c="http://schemas.openxmlformats.org/drawingml/2006/chart" xmlns:dgm="http://schemas.openxmlformats.org/drawingml/2006/diagram" xmlns:o="urn:schemas-microsoft-com:office:office" xmlns:v="urn:schemas-microsoft-com:vml" xmlns:pvml="urn:schemas-microsoft-com:office:powerpoint" xmlns:com="http://schemas.openxmlformats.org/drawingml/2006/compatibility" xmlns:p14="http://schemas.microsoft.com/office/powerpoint/2010/main" xmlns:p15="http://schemas.microsoft.com/office/powerpoint/2012/main" xmlns:ahyp="http://schemas.microsoft.com/office/drawing/2018/hyperlinkcolor">
+  <p:cSld>
+    <p:spTree>
+      <p:nvGrpSpPr>
+        <p:cNvPr id="154" name="Shape 154"/>
+        <p:cNvGrpSpPr/>
+        <p:nvPr/>
+      </p:nvGrpSpPr>
+      <p:grpSpPr>
+        <a:xfrm>
+          <a:off x="0" y="0"/>
+          <a:ext cx="0" cy="0"/>
+          <a:chOff x="0" y="0"/>
+          <a:chExt cx="0" cy="0"/>
+        </a:xfrm>
+      </p:grpSpPr>
+      <p:sp>
+        <p:nvSpPr>
+          <p:cNvPr id="155" name="Google Shape;155;g3b8409de4d6_0_40"/>
+          <p:cNvSpPr txBox="1"/>
+          <p:nvPr>
+            <p:ph type="title"/>
+          </p:nvPr>
+        </p:nvSpPr>
+        <p:spPr>
+          <a:xfrm>
+            <a:off x="457200" y="274638"/>
+            <a:ext cx="8229600" cy="1143000"/>
+          </a:xfrm>
+          <a:prstGeom prst="rect">
+            <a:avLst/>
+          </a:prstGeom>
+        </p:spPr>
+        <p:txBody>
+          <a:bodyPr anchorCtr="0" anchor="b" bIns="91425" lIns="91425" spcFirstLastPara="1" rIns="91425" wrap="square" tIns="91425">
+            <a:noAutofit/>
+          </a:bodyPr>
+          <a:lstStyle/>
+          <a:p>
+            <a:pPr indent="0" lvl="0" marL="0" rtl="0" algn="l">
+              <a:spcBef>
+                <a:spcPts val="0"/>
+              </a:spcBef>
+              <a:spcAft>
+                <a:spcPts val="0"/>
+              </a:spcAft>
+              <a:buNone/>
+            </a:pPr>
+            <a:r>
+              <a:rPr lang="en"/>
+              <a:t>Byte-Pair Encoding Tokenization </a:t>
+            </a:r>
+            <a:r>
+              <a:rPr lang="en" sz="1800"/>
+              <a:t>(1994)</a:t>
+            </a:r>
+            <a:endParaRPr sz="1800"/>
+          </a:p>
+        </p:txBody>
+      </p:sp>
+      <p:sp>
+        <p:nvSpPr>
+          <p:cNvPr id="156" name="Google Shape;156;g3b8409de4d6_0_40"/>
+          <p:cNvSpPr txBox="1"/>
+          <p:nvPr>
+            <p:ph idx="1" type="body"/>
+          </p:nvPr>
+        </p:nvSpPr>
+        <p:spPr>
+          <a:xfrm>
+            <a:off x="457200" y="1600200"/>
+            <a:ext cx="8229600" cy="4967700"/>
+          </a:xfrm>
+          <a:prstGeom prst="rect">
+            <a:avLst/>
+          </a:prstGeom>
+        </p:spPr>
+        <p:txBody>
+          <a:bodyPr anchorCtr="0" anchor="t" bIns="91425" lIns="91425" spcFirstLastPara="1" rIns="91425" wrap="square" tIns="91425">
+            <a:noAutofit/>
+          </a:bodyPr>
+          <a:lstStyle/>
+          <a:p>
+            <a:pPr indent="0" lvl="0" marL="0" rtl="0" algn="l">
+              <a:spcBef>
+                <a:spcPts val="600"/>
+              </a:spcBef>
+              <a:spcAft>
+                <a:spcPts val="0"/>
+              </a:spcAft>
+              <a:buNone/>
+            </a:pPr>
+            <a:r>
+              <a:t/>
+            </a:r>
+            <a:endParaRPr/>
+          </a:p>
+        </p:txBody>
+      </p:sp>
+    </p:spTree>
+  </p:cSld>
+  <p:clrMapOvr>
+    <a:masterClrMapping/>
+  </p:clrMapOvr>
+</p:sld>
+</file>
+
+<file path=ppt/slides/slide18.xml><?xml version="1.0" encoding="utf-8"?>
+<p:sld xmlns:a="http://schemas.openxmlformats.org/drawingml/2006/main" xmlns:r="http://schemas.openxmlformats.org/officeDocument/2006/relationships" xmlns:mc="http://schemas.openxmlformats.org/markup-compatibility/2006" xmlns:mv="urn:schemas-microsoft-com:mac:vml" xmlns:p="http://schemas.openxmlformats.org/presentationml/2006/main" xmlns:c="http://schemas.openxmlformats.org/drawingml/2006/chart" xmlns:dgm="http://schemas.openxmlformats.org/drawingml/2006/diagram" xmlns:o="urn:schemas-microsoft-com:office:office" xmlns:v="urn:schemas-microsoft-com:vml" xmlns:pvml="urn:schemas-microsoft-com:office:powerpoint" xmlns:com="http://schemas.openxmlformats.org/drawingml/2006/compatibility" xmlns:p14="http://schemas.microsoft.com/office/powerpoint/2010/main" xmlns:p15="http://schemas.microsoft.com/office/powerpoint/2012/main" xmlns:ahyp="http://schemas.microsoft.com/office/drawing/2018/hyperlinkcolor">
+  <p:cSld>
+    <p:spTree>
+      <p:nvGrpSpPr>
+        <p:cNvPr id="160" name="Shape 160"/>
+        <p:cNvGrpSpPr/>
+        <p:nvPr/>
+      </p:nvGrpSpPr>
+      <p:grpSpPr>
+        <a:xfrm>
+          <a:off x="0" y="0"/>
+          <a:ext cx="0" cy="0"/>
+          <a:chOff x="0" y="0"/>
+          <a:chExt cx="0" cy="0"/>
+        </a:xfrm>
+      </p:grpSpPr>
+      <p:sp>
+        <p:nvSpPr>
+          <p:cNvPr id="161" name="Google Shape;161;g3b8409de4d6_0_118"/>
+          <p:cNvSpPr txBox="1"/>
+          <p:nvPr>
+            <p:ph type="title"/>
+          </p:nvPr>
+        </p:nvSpPr>
+        <p:spPr>
+          <a:xfrm>
+            <a:off x="457200" y="274638"/>
+            <a:ext cx="8229600" cy="1143000"/>
+          </a:xfrm>
+          <a:prstGeom prst="rect">
+            <a:avLst/>
+          </a:prstGeom>
+        </p:spPr>
+        <p:txBody>
+          <a:bodyPr anchorCtr="0" anchor="b" bIns="91425" lIns="91425" spcFirstLastPara="1" rIns="91425" wrap="square" tIns="91425">
+            <a:noAutofit/>
+          </a:bodyPr>
+          <a:lstStyle/>
+          <a:p>
+            <a:pPr indent="0" lvl="0" marL="0" rtl="0" algn="l">
+              <a:spcBef>
+                <a:spcPts val="0"/>
+              </a:spcBef>
+              <a:spcAft>
+                <a:spcPts val="0"/>
+              </a:spcAft>
+              <a:buNone/>
+            </a:pPr>
+            <a:r>
+              <a:rPr lang="en">
+                <a:solidFill>
+                  <a:srgbClr val="A31415"/>
+                </a:solidFill>
+                <a:latin typeface="Consolas"/>
+                <a:ea typeface="Consolas"/>
+                <a:cs typeface="Consolas"/>
+                <a:sym typeface="Consolas"/>
+              </a:rPr>
+              <a:t>programming</a:t>
+            </a:r>
+            <a:r>
+              <a:rPr lang="en"/>
+              <a:t>: Regex</a:t>
+            </a:r>
+            <a:endParaRPr/>
+          </a:p>
+        </p:txBody>
+      </p:sp>
+      <p:sp>
+        <p:nvSpPr>
+          <p:cNvPr id="162" name="Google Shape;162;g3b8409de4d6_0_118"/>
+          <p:cNvSpPr txBox="1"/>
+          <p:nvPr>
+            <p:ph idx="1" type="body"/>
+          </p:nvPr>
+        </p:nvSpPr>
+        <p:spPr>
+          <a:xfrm>
+            <a:off x="457200" y="1600200"/>
+            <a:ext cx="8229600" cy="4967700"/>
+          </a:xfrm>
+          <a:prstGeom prst="rect">
+            <a:avLst/>
+          </a:prstGeom>
+        </p:spPr>
+        <p:txBody>
+          <a:bodyPr anchorCtr="0" anchor="t" bIns="91425" lIns="91425" spcFirstLastPara="1" rIns="91425" wrap="square" tIns="91425">
+            <a:noAutofit/>
+          </a:bodyPr>
+          <a:lstStyle/>
+          <a:p>
+            <a:pPr indent="0" lvl="0" marL="0" rtl="0" algn="l">
+              <a:spcBef>
+                <a:spcPts val="600"/>
+              </a:spcBef>
+              <a:spcAft>
+                <a:spcPts val="0"/>
+              </a:spcAft>
+              <a:buNone/>
+            </a:pPr>
+            <a:r>
+              <a:t/>
+            </a:r>
+            <a:endParaRPr/>
+          </a:p>
+        </p:txBody>
+      </p:sp>
+    </p:spTree>
+  </p:cSld>
+  <p:clrMapOvr>
+    <a:masterClrMapping/>
+  </p:clrMapOvr>
+</p:sld>
+</file>
+
+<file path=ppt/slides/slide19.xml><?xml version="1.0" encoding="utf-8"?>
+<p:sld xmlns:a="http://schemas.openxmlformats.org/drawingml/2006/main" xmlns:r="http://schemas.openxmlformats.org/officeDocument/2006/relationships" xmlns:mc="http://schemas.openxmlformats.org/markup-compatibility/2006" xmlns:mv="urn:schemas-microsoft-com:mac:vml" xmlns:p="http://schemas.openxmlformats.org/presentationml/2006/main" xmlns:c="http://schemas.openxmlformats.org/drawingml/2006/chart" xmlns:dgm="http://schemas.openxmlformats.org/drawingml/2006/diagram" xmlns:o="urn:schemas-microsoft-com:office:office" xmlns:v="urn:schemas-microsoft-com:vml" xmlns:pvml="urn:schemas-microsoft-com:office:powerpoint" xmlns:com="http://schemas.openxmlformats.org/drawingml/2006/compatibility" xmlns:p14="http://schemas.microsoft.com/office/powerpoint/2010/main" xmlns:p15="http://schemas.microsoft.com/office/powerpoint/2012/main" xmlns:ahyp="http://schemas.microsoft.com/office/drawing/2018/hyperlinkcolor">
+  <p:cSld>
+    <p:spTree>
+      <p:nvGrpSpPr>
+        <p:cNvPr id="166" name="Shape 166"/>
+        <p:cNvGrpSpPr/>
+        <p:nvPr/>
+      </p:nvGrpSpPr>
+      <p:grpSpPr>
+        <a:xfrm>
+          <a:off x="0" y="0"/>
+          <a:ext cx="0" cy="0"/>
+          <a:chOff x="0" y="0"/>
+          <a:chExt cx="0" cy="0"/>
+        </a:xfrm>
+      </p:grpSpPr>
+      <p:sp>
+        <p:nvSpPr>
+          <p:cNvPr id="167" name="Google Shape;167;g3b8409de4d6_0_126"/>
+          <p:cNvSpPr txBox="1"/>
+          <p:nvPr>
+            <p:ph type="title"/>
+          </p:nvPr>
+        </p:nvSpPr>
+        <p:spPr>
+          <a:xfrm>
+            <a:off x="457200" y="274638"/>
+            <a:ext cx="8229600" cy="1143000"/>
+          </a:xfrm>
+          <a:prstGeom prst="rect">
+            <a:avLst/>
+          </a:prstGeom>
+        </p:spPr>
+        <p:txBody>
+          <a:bodyPr anchorCtr="0" anchor="b" bIns="91425" lIns="91425" spcFirstLastPara="1" rIns="91425" wrap="square" tIns="91425">
+            <a:noAutofit/>
+          </a:bodyPr>
+          <a:lstStyle/>
+          <a:p>
+            <a:pPr indent="0" lvl="0" marL="0" rtl="0" algn="l">
+              <a:spcBef>
+                <a:spcPts val="0"/>
+              </a:spcBef>
+              <a:spcAft>
+                <a:spcPts val="0"/>
+              </a:spcAft>
+              <a:buNone/>
+            </a:pPr>
+            <a:r>
+              <a:rPr lang="en">
+                <a:solidFill>
+                  <a:srgbClr val="A31415"/>
+                </a:solidFill>
+                <a:latin typeface="Consolas"/>
+                <a:ea typeface="Consolas"/>
+                <a:cs typeface="Consolas"/>
+                <a:sym typeface="Consolas"/>
+              </a:rPr>
+              <a:t>programming</a:t>
+            </a:r>
+            <a:r>
+              <a:rPr lang="en"/>
+              <a:t>: List Slices</a:t>
+            </a:r>
+            <a:endParaRPr/>
+          </a:p>
+        </p:txBody>
+      </p:sp>
+      <p:sp>
+        <p:nvSpPr>
+          <p:cNvPr id="168" name="Google Shape;168;g3b8409de4d6_0_126"/>
           <p:cNvSpPr txBox="1"/>
           <p:nvPr>
             <p:ph idx="1" type="body"/>
@@ -9642,6 +10404,110 @@
       <p:sp>
         <p:nvSpPr>
           <p:cNvPr id="41" name="Google Shape;41;g3b8409de4d6_0_60"/>
+          <p:cNvSpPr txBox="1"/>
+          <p:nvPr>
+            <p:ph idx="1" type="body"/>
+          </p:nvPr>
+        </p:nvSpPr>
+        <p:spPr>
+          <a:xfrm>
+            <a:off x="457200" y="1600200"/>
+            <a:ext cx="8229600" cy="4967700"/>
+          </a:xfrm>
+          <a:prstGeom prst="rect">
+            <a:avLst/>
+          </a:prstGeom>
+        </p:spPr>
+        <p:txBody>
+          <a:bodyPr anchorCtr="0" anchor="t" bIns="91425" lIns="91425" spcFirstLastPara="1" rIns="91425" wrap="square" tIns="91425">
+            <a:noAutofit/>
+          </a:bodyPr>
+          <a:lstStyle/>
+          <a:p>
+            <a:pPr indent="0" lvl="0" marL="0" rtl="0" algn="l">
+              <a:spcBef>
+                <a:spcPts val="600"/>
+              </a:spcBef>
+              <a:spcAft>
+                <a:spcPts val="0"/>
+              </a:spcAft>
+              <a:buNone/>
+            </a:pPr>
+            <a:r>
+              <a:t/>
+            </a:r>
+            <a:endParaRPr/>
+          </a:p>
+        </p:txBody>
+      </p:sp>
+    </p:spTree>
+  </p:cSld>
+  <p:clrMapOvr>
+    <a:masterClrMapping/>
+  </p:clrMapOvr>
+</p:sld>
+</file>
+
+<file path=ppt/slides/slide20.xml><?xml version="1.0" encoding="utf-8"?>
+<p:sld xmlns:a="http://schemas.openxmlformats.org/drawingml/2006/main" xmlns:r="http://schemas.openxmlformats.org/officeDocument/2006/relationships" xmlns:mc="http://schemas.openxmlformats.org/markup-compatibility/2006" xmlns:mv="urn:schemas-microsoft-com:mac:vml" xmlns:p="http://schemas.openxmlformats.org/presentationml/2006/main" xmlns:c="http://schemas.openxmlformats.org/drawingml/2006/chart" xmlns:dgm="http://schemas.openxmlformats.org/drawingml/2006/diagram" xmlns:o="urn:schemas-microsoft-com:office:office" xmlns:v="urn:schemas-microsoft-com:vml" xmlns:pvml="urn:schemas-microsoft-com:office:powerpoint" xmlns:com="http://schemas.openxmlformats.org/drawingml/2006/compatibility" xmlns:p14="http://schemas.microsoft.com/office/powerpoint/2010/main" xmlns:p15="http://schemas.microsoft.com/office/powerpoint/2012/main" xmlns:ahyp="http://schemas.microsoft.com/office/drawing/2018/hyperlinkcolor">
+  <p:cSld>
+    <p:spTree>
+      <p:nvGrpSpPr>
+        <p:cNvPr id="172" name="Shape 172"/>
+        <p:cNvGrpSpPr/>
+        <p:nvPr/>
+      </p:nvGrpSpPr>
+      <p:grpSpPr>
+        <a:xfrm>
+          <a:off x="0" y="0"/>
+          <a:ext cx="0" cy="0"/>
+          <a:chOff x="0" y="0"/>
+          <a:chExt cx="0" cy="0"/>
+        </a:xfrm>
+      </p:grpSpPr>
+      <p:sp>
+        <p:nvSpPr>
+          <p:cNvPr id="173" name="Google Shape;173;g3b8409de4d6_0_108"/>
+          <p:cNvSpPr txBox="1"/>
+          <p:nvPr>
+            <p:ph type="title"/>
+          </p:nvPr>
+        </p:nvSpPr>
+        <p:spPr>
+          <a:xfrm>
+            <a:off x="457200" y="274638"/>
+            <a:ext cx="8229600" cy="1143000"/>
+          </a:xfrm>
+          <a:prstGeom prst="rect">
+            <a:avLst/>
+          </a:prstGeom>
+        </p:spPr>
+        <p:txBody>
+          <a:bodyPr anchorCtr="0" anchor="b" bIns="91425" lIns="91425" spcFirstLastPara="1" rIns="91425" wrap="square" tIns="91425">
+            <a:noAutofit/>
+          </a:bodyPr>
+          <a:lstStyle/>
+          <a:p>
+            <a:pPr indent="0" lvl="0" marL="0" rtl="0" algn="l">
+              <a:spcBef>
+                <a:spcPts val="0"/>
+              </a:spcBef>
+              <a:spcAft>
+                <a:spcPts val="0"/>
+              </a:spcAft>
+              <a:buNone/>
+            </a:pPr>
+            <a:r>
+              <a:rPr lang="en"/>
+              <a:t>nanochat Tokenizer</a:t>
+            </a:r>
+            <a:endParaRPr/>
+          </a:p>
+        </p:txBody>
+      </p:sp>
+      <p:sp>
+        <p:nvSpPr>
+          <p:cNvPr id="174" name="Google Shape;174;g3b8409de4d6_0_108"/>
           <p:cNvSpPr txBox="1"/>
           <p:nvPr>
             <p:ph idx="1" type="body"/>
@@ -10848,726 +11714,24 @@
           <a:chExt cx="0" cy="0"/>
         </a:xfrm>
       </p:grpSpPr>
-      <p:sp>
-        <p:nvSpPr>
-          <p:cNvPr id="77" name="Google Shape;77;g3ba79990f52_0_5"/>
-          <p:cNvSpPr txBox="1"/>
-          <p:nvPr>
-            <p:ph type="title"/>
-          </p:nvPr>
-        </p:nvSpPr>
-        <p:spPr>
-          <a:xfrm>
-            <a:off x="457200" y="274638"/>
-            <a:ext cx="8229600" cy="1143000"/>
-          </a:xfrm>
-          <a:prstGeom prst="rect">
-            <a:avLst/>
-          </a:prstGeom>
-          <a:noFill/>
-          <a:ln>
-            <a:noFill/>
-          </a:ln>
-        </p:spPr>
-        <p:txBody>
-          <a:bodyPr anchorCtr="0" anchor="b" bIns="91425" lIns="91425" spcFirstLastPara="1" rIns="91425" wrap="square" tIns="91425">
-            <a:noAutofit/>
-          </a:bodyPr>
-          <a:lstStyle/>
-          <a:p>
-            <a:pPr indent="0" lvl="0" marL="0" rtl="0" algn="l">
-              <a:lnSpc>
-                <a:spcPct val="100000"/>
-              </a:lnSpc>
-              <a:spcBef>
-                <a:spcPts val="0"/>
-              </a:spcBef>
-              <a:spcAft>
-                <a:spcPts val="0"/>
-              </a:spcAft>
-              <a:buSzPts val="3600"/>
-              <a:buNone/>
-            </a:pPr>
-            <a:r>
-              <a:rPr lang="en"/>
-              <a:t>Last Class - Text as Data</a:t>
-            </a:r>
-            <a:endParaRPr/>
-          </a:p>
-        </p:txBody>
-      </p:sp>
-      <p:sp>
-        <p:nvSpPr>
-          <p:cNvPr id="78" name="Google Shape;78;g3ba79990f52_0_5"/>
-          <p:cNvSpPr txBox="1"/>
-          <p:nvPr>
-            <p:ph idx="1" type="body"/>
-          </p:nvPr>
-        </p:nvSpPr>
-        <p:spPr>
-          <a:xfrm>
-            <a:off x="457200" y="1765116"/>
-            <a:ext cx="3078000" cy="4459800"/>
-          </a:xfrm>
-          <a:prstGeom prst="rect">
-            <a:avLst/>
-          </a:prstGeom>
-          <a:noFill/>
-          <a:ln cap="flat" cmpd="sng" w="35550">
-            <a:solidFill>
-              <a:srgbClr val="002B5B"/>
-            </a:solidFill>
-            <a:prstDash val="solid"/>
-            <a:round/>
-            <a:headEnd len="sm" w="sm" type="none"/>
-            <a:tailEnd len="sm" w="sm" type="none"/>
-          </a:ln>
-        </p:spPr>
-        <p:txBody>
-          <a:bodyPr anchorCtr="0" anchor="t" bIns="85325" lIns="85325" spcFirstLastPara="1" rIns="85325" wrap="square" tIns="85325">
-            <a:noAutofit/>
-          </a:bodyPr>
-          <a:lstStyle/>
-          <a:p>
-            <a:pPr indent="0" lvl="0" marL="0" rtl="0" algn="l">
-              <a:lnSpc>
-                <a:spcPct val="100000"/>
-              </a:lnSpc>
-              <a:spcBef>
-                <a:spcPts val="560"/>
-              </a:spcBef>
-              <a:spcAft>
-                <a:spcPts val="0"/>
-              </a:spcAft>
-              <a:buSzPts val="2800"/>
-              <a:buNone/>
-            </a:pPr>
-            <a:r>
-              <a:rPr lang="en" sz="1120">
-                <a:latin typeface="Consolas"/>
-                <a:ea typeface="Consolas"/>
-                <a:cs typeface="Consolas"/>
-                <a:sym typeface="Consolas"/>
-              </a:rPr>
-              <a:t>"Jabberwocky"</a:t>
-            </a:r>
-            <a:endParaRPr sz="1120">
-              <a:latin typeface="Consolas"/>
-              <a:ea typeface="Consolas"/>
-              <a:cs typeface="Consolas"/>
-              <a:sym typeface="Consolas"/>
-            </a:endParaRPr>
-          </a:p>
-          <a:p>
-            <a:pPr indent="0" lvl="0" marL="0" rtl="0" algn="l">
-              <a:lnSpc>
-                <a:spcPct val="100000"/>
-              </a:lnSpc>
-              <a:spcBef>
-                <a:spcPts val="560"/>
-              </a:spcBef>
-              <a:spcAft>
-                <a:spcPts val="0"/>
-              </a:spcAft>
-              <a:buSzPts val="2800"/>
-              <a:buNone/>
-            </a:pPr>
-            <a:r>
-              <a:rPr lang="en" sz="1120">
-                <a:latin typeface="Consolas"/>
-                <a:ea typeface="Consolas"/>
-                <a:cs typeface="Consolas"/>
-                <a:sym typeface="Consolas"/>
-              </a:rPr>
-              <a:t>by Lewis Carroll</a:t>
-            </a:r>
-            <a:endParaRPr sz="1120">
-              <a:latin typeface="Consolas"/>
-              <a:ea typeface="Consolas"/>
-              <a:cs typeface="Consolas"/>
-              <a:sym typeface="Consolas"/>
-            </a:endParaRPr>
-          </a:p>
-          <a:p>
-            <a:pPr indent="0" lvl="0" marL="0" rtl="0" algn="l">
-              <a:lnSpc>
-                <a:spcPct val="100000"/>
-              </a:lnSpc>
-              <a:spcBef>
-                <a:spcPts val="560"/>
-              </a:spcBef>
-              <a:spcAft>
-                <a:spcPts val="0"/>
-              </a:spcAft>
-              <a:buSzPts val="2800"/>
-              <a:buNone/>
-            </a:pPr>
-            <a:r>
-              <a:t/>
-            </a:r>
-            <a:endParaRPr sz="1120">
-              <a:latin typeface="Consolas"/>
-              <a:ea typeface="Consolas"/>
-              <a:cs typeface="Consolas"/>
-              <a:sym typeface="Consolas"/>
-            </a:endParaRPr>
-          </a:p>
-          <a:p>
-            <a:pPr indent="0" lvl="0" marL="0" rtl="0" algn="l">
-              <a:lnSpc>
-                <a:spcPct val="100000"/>
-              </a:lnSpc>
-              <a:spcBef>
-                <a:spcPts val="560"/>
-              </a:spcBef>
-              <a:spcAft>
-                <a:spcPts val="0"/>
-              </a:spcAft>
-              <a:buSzPts val="2800"/>
-              <a:buNone/>
-            </a:pPr>
-            <a:r>
-              <a:rPr lang="en" sz="1120">
-                <a:latin typeface="Consolas"/>
-                <a:ea typeface="Consolas"/>
-                <a:cs typeface="Consolas"/>
-                <a:sym typeface="Consolas"/>
-              </a:rPr>
-              <a:t>'Twas brillig, and the slithy toves</a:t>
-            </a:r>
-            <a:endParaRPr sz="1120">
-              <a:latin typeface="Consolas"/>
-              <a:ea typeface="Consolas"/>
-              <a:cs typeface="Consolas"/>
-              <a:sym typeface="Consolas"/>
-            </a:endParaRPr>
-          </a:p>
-          <a:p>
-            <a:pPr indent="0" lvl="0" marL="0" rtl="0" algn="l">
-              <a:lnSpc>
-                <a:spcPct val="100000"/>
-              </a:lnSpc>
-              <a:spcBef>
-                <a:spcPts val="560"/>
-              </a:spcBef>
-              <a:spcAft>
-                <a:spcPts val="0"/>
-              </a:spcAft>
-              <a:buSzPts val="2800"/>
-              <a:buNone/>
-            </a:pPr>
-            <a:r>
-              <a:rPr lang="en" sz="1120">
-                <a:latin typeface="Consolas"/>
-                <a:ea typeface="Consolas"/>
-                <a:cs typeface="Consolas"/>
-                <a:sym typeface="Consolas"/>
-              </a:rPr>
-              <a:t>Did gyre and gimble in the wabe;</a:t>
-            </a:r>
-            <a:endParaRPr sz="1120">
-              <a:latin typeface="Consolas"/>
-              <a:ea typeface="Consolas"/>
-              <a:cs typeface="Consolas"/>
-              <a:sym typeface="Consolas"/>
-            </a:endParaRPr>
-          </a:p>
-          <a:p>
-            <a:pPr indent="0" lvl="0" marL="0" rtl="0" algn="l">
-              <a:lnSpc>
-                <a:spcPct val="100000"/>
-              </a:lnSpc>
-              <a:spcBef>
-                <a:spcPts val="560"/>
-              </a:spcBef>
-              <a:spcAft>
-                <a:spcPts val="0"/>
-              </a:spcAft>
-              <a:buSzPts val="2800"/>
-              <a:buNone/>
-            </a:pPr>
-            <a:r>
-              <a:rPr lang="en" sz="1120">
-                <a:latin typeface="Consolas"/>
-                <a:ea typeface="Consolas"/>
-                <a:cs typeface="Consolas"/>
-                <a:sym typeface="Consolas"/>
-              </a:rPr>
-              <a:t>All mimsy were the borogoves,</a:t>
-            </a:r>
-            <a:endParaRPr sz="1120">
-              <a:latin typeface="Consolas"/>
-              <a:ea typeface="Consolas"/>
-              <a:cs typeface="Consolas"/>
-              <a:sym typeface="Consolas"/>
-            </a:endParaRPr>
-          </a:p>
-          <a:p>
-            <a:pPr indent="0" lvl="0" marL="0" rtl="0" algn="l">
-              <a:lnSpc>
-                <a:spcPct val="100000"/>
-              </a:lnSpc>
-              <a:spcBef>
-                <a:spcPts val="560"/>
-              </a:spcBef>
-              <a:spcAft>
-                <a:spcPts val="0"/>
-              </a:spcAft>
-              <a:buSzPts val="2800"/>
-              <a:buNone/>
-            </a:pPr>
-            <a:r>
-              <a:rPr lang="en" sz="1120">
-                <a:latin typeface="Consolas"/>
-                <a:ea typeface="Consolas"/>
-                <a:cs typeface="Consolas"/>
-                <a:sym typeface="Consolas"/>
-              </a:rPr>
-              <a:t>And the mome raths outgrabe.</a:t>
-            </a:r>
-            <a:endParaRPr sz="1120">
-              <a:latin typeface="Consolas"/>
-              <a:ea typeface="Consolas"/>
-              <a:cs typeface="Consolas"/>
-              <a:sym typeface="Consolas"/>
-            </a:endParaRPr>
-          </a:p>
-          <a:p>
-            <a:pPr indent="0" lvl="0" marL="0" rtl="0" algn="l">
-              <a:lnSpc>
-                <a:spcPct val="100000"/>
-              </a:lnSpc>
-              <a:spcBef>
-                <a:spcPts val="560"/>
-              </a:spcBef>
-              <a:spcAft>
-                <a:spcPts val="0"/>
-              </a:spcAft>
-              <a:buSzPts val="2800"/>
-              <a:buNone/>
-            </a:pPr>
-            <a:r>
-              <a:t/>
-            </a:r>
-            <a:endParaRPr sz="1120">
-              <a:latin typeface="Consolas"/>
-              <a:ea typeface="Consolas"/>
-              <a:cs typeface="Consolas"/>
-              <a:sym typeface="Consolas"/>
-            </a:endParaRPr>
-          </a:p>
-          <a:p>
-            <a:pPr indent="0" lvl="0" marL="0" rtl="0" algn="l">
-              <a:lnSpc>
-                <a:spcPct val="100000"/>
-              </a:lnSpc>
-              <a:spcBef>
-                <a:spcPts val="560"/>
-              </a:spcBef>
-              <a:spcAft>
-                <a:spcPts val="0"/>
-              </a:spcAft>
-              <a:buSzPts val="2800"/>
-              <a:buNone/>
-            </a:pPr>
-            <a:r>
-              <a:rPr lang="en" sz="1120">
-                <a:latin typeface="Consolas"/>
-                <a:ea typeface="Consolas"/>
-                <a:cs typeface="Consolas"/>
-                <a:sym typeface="Consolas"/>
-              </a:rPr>
-              <a:t>"Beware the Jabberwock, my son!</a:t>
-            </a:r>
-            <a:endParaRPr sz="1120">
-              <a:latin typeface="Consolas"/>
-              <a:ea typeface="Consolas"/>
-              <a:cs typeface="Consolas"/>
-              <a:sym typeface="Consolas"/>
-            </a:endParaRPr>
-          </a:p>
-          <a:p>
-            <a:pPr indent="0" lvl="0" marL="0" rtl="0" algn="l">
-              <a:lnSpc>
-                <a:spcPct val="100000"/>
-              </a:lnSpc>
-              <a:spcBef>
-                <a:spcPts val="560"/>
-              </a:spcBef>
-              <a:spcAft>
-                <a:spcPts val="0"/>
-              </a:spcAft>
-              <a:buSzPts val="2800"/>
-              <a:buNone/>
-            </a:pPr>
-            <a:r>
-              <a:rPr lang="en" sz="1120">
-                <a:latin typeface="Consolas"/>
-                <a:ea typeface="Consolas"/>
-                <a:cs typeface="Consolas"/>
-                <a:sym typeface="Consolas"/>
-              </a:rPr>
-              <a:t>The jaws that bite, the claws that catch!</a:t>
-            </a:r>
-            <a:endParaRPr sz="1120">
-              <a:latin typeface="Consolas"/>
-              <a:ea typeface="Consolas"/>
-              <a:cs typeface="Consolas"/>
-              <a:sym typeface="Consolas"/>
-            </a:endParaRPr>
-          </a:p>
-          <a:p>
-            <a:pPr indent="0" lvl="0" marL="0" rtl="0" algn="l">
-              <a:lnSpc>
-                <a:spcPct val="100000"/>
-              </a:lnSpc>
-              <a:spcBef>
-                <a:spcPts val="560"/>
-              </a:spcBef>
-              <a:spcAft>
-                <a:spcPts val="0"/>
-              </a:spcAft>
-              <a:buSzPts val="2800"/>
-              <a:buNone/>
-            </a:pPr>
-            <a:r>
-              <a:rPr lang="en" sz="1120">
-                <a:latin typeface="Consolas"/>
-                <a:ea typeface="Consolas"/>
-                <a:cs typeface="Consolas"/>
-                <a:sym typeface="Consolas"/>
-              </a:rPr>
-              <a:t>Beware the Jubjub bird, and shun</a:t>
-            </a:r>
-            <a:endParaRPr sz="1120">
-              <a:latin typeface="Consolas"/>
-              <a:ea typeface="Consolas"/>
-              <a:cs typeface="Consolas"/>
-              <a:sym typeface="Consolas"/>
-            </a:endParaRPr>
-          </a:p>
-          <a:p>
-            <a:pPr indent="0" lvl="0" marL="0" rtl="0" algn="l">
-              <a:lnSpc>
-                <a:spcPct val="100000"/>
-              </a:lnSpc>
-              <a:spcBef>
-                <a:spcPts val="560"/>
-              </a:spcBef>
-              <a:spcAft>
-                <a:spcPts val="0"/>
-              </a:spcAft>
-              <a:buSzPts val="2800"/>
-              <a:buNone/>
-            </a:pPr>
-            <a:r>
-              <a:rPr lang="en" sz="1120">
-                <a:latin typeface="Consolas"/>
-                <a:ea typeface="Consolas"/>
-                <a:cs typeface="Consolas"/>
-                <a:sym typeface="Consolas"/>
-              </a:rPr>
-              <a:t>The frumious Bandersnatch!"</a:t>
-            </a:r>
-            <a:endParaRPr sz="1120">
-              <a:latin typeface="Consolas"/>
-              <a:ea typeface="Consolas"/>
-              <a:cs typeface="Consolas"/>
-              <a:sym typeface="Consolas"/>
-            </a:endParaRPr>
-          </a:p>
-          <a:p>
-            <a:pPr indent="0" lvl="0" marL="0" rtl="0" algn="l">
-              <a:lnSpc>
-                <a:spcPct val="100000"/>
-              </a:lnSpc>
-              <a:spcBef>
-                <a:spcPts val="560"/>
-              </a:spcBef>
-              <a:spcAft>
-                <a:spcPts val="0"/>
-              </a:spcAft>
-              <a:buSzPts val="2800"/>
-              <a:buNone/>
-            </a:pPr>
-            <a:r>
-              <a:t/>
-            </a:r>
-            <a:endParaRPr sz="1120">
-              <a:latin typeface="Consolas"/>
-              <a:ea typeface="Consolas"/>
-              <a:cs typeface="Consolas"/>
-              <a:sym typeface="Consolas"/>
-            </a:endParaRPr>
-          </a:p>
-          <a:p>
-            <a:pPr indent="0" lvl="0" marL="0" rtl="0" algn="l">
-              <a:lnSpc>
-                <a:spcPct val="100000"/>
-              </a:lnSpc>
-              <a:spcBef>
-                <a:spcPts val="560"/>
-              </a:spcBef>
-              <a:spcAft>
-                <a:spcPts val="0"/>
-              </a:spcAft>
-              <a:buSzPts val="2800"/>
-              <a:buNone/>
-            </a:pPr>
-            <a:r>
-              <a:rPr lang="en" sz="1120">
-                <a:latin typeface="Consolas"/>
-                <a:ea typeface="Consolas"/>
-                <a:cs typeface="Consolas"/>
-                <a:sym typeface="Consolas"/>
-              </a:rPr>
-              <a:t>He took his vorpal sword in hand:</a:t>
-            </a:r>
-            <a:endParaRPr sz="1120">
-              <a:latin typeface="Consolas"/>
-              <a:ea typeface="Consolas"/>
-              <a:cs typeface="Consolas"/>
-              <a:sym typeface="Consolas"/>
-            </a:endParaRPr>
-          </a:p>
-          <a:p>
-            <a:pPr indent="0" lvl="0" marL="0" rtl="0" algn="l">
-              <a:lnSpc>
-                <a:spcPct val="100000"/>
-              </a:lnSpc>
-              <a:spcBef>
-                <a:spcPts val="560"/>
-              </a:spcBef>
-              <a:spcAft>
-                <a:spcPts val="0"/>
-              </a:spcAft>
-              <a:buSzPts val="2800"/>
-              <a:buNone/>
-            </a:pPr>
-            <a:r>
-              <a:rPr lang="en" sz="1120">
-                <a:latin typeface="Consolas"/>
-                <a:ea typeface="Consolas"/>
-                <a:cs typeface="Consolas"/>
-                <a:sym typeface="Consolas"/>
-              </a:rPr>
-              <a:t>Long time the manxome foe he sought—</a:t>
-            </a:r>
-            <a:endParaRPr sz="1120">
-              <a:latin typeface="Consolas"/>
-              <a:ea typeface="Consolas"/>
-              <a:cs typeface="Consolas"/>
-              <a:sym typeface="Consolas"/>
-            </a:endParaRPr>
-          </a:p>
-          <a:p>
-            <a:pPr indent="0" lvl="0" marL="0" rtl="0" algn="l">
-              <a:lnSpc>
-                <a:spcPct val="100000"/>
-              </a:lnSpc>
-              <a:spcBef>
-                <a:spcPts val="560"/>
-              </a:spcBef>
-              <a:spcAft>
-                <a:spcPts val="0"/>
-              </a:spcAft>
-              <a:buSzPts val="2800"/>
-              <a:buNone/>
-            </a:pPr>
-            <a:r>
-              <a:rPr lang="en" sz="1120">
-                <a:latin typeface="Consolas"/>
-                <a:ea typeface="Consolas"/>
-                <a:cs typeface="Consolas"/>
-                <a:sym typeface="Consolas"/>
-              </a:rPr>
-              <a:t>So rested he by the Tumtum tree,</a:t>
-            </a:r>
-            <a:endParaRPr sz="1120">
-              <a:latin typeface="Consolas"/>
-              <a:ea typeface="Consolas"/>
-              <a:cs typeface="Consolas"/>
-              <a:sym typeface="Consolas"/>
-            </a:endParaRPr>
-          </a:p>
-          <a:p>
-            <a:pPr indent="0" lvl="0" marL="0" rtl="0" algn="l">
-              <a:lnSpc>
-                <a:spcPct val="100000"/>
-              </a:lnSpc>
-              <a:spcBef>
-                <a:spcPts val="560"/>
-              </a:spcBef>
-              <a:spcAft>
-                <a:spcPts val="0"/>
-              </a:spcAft>
-              <a:buSzPts val="2800"/>
-              <a:buNone/>
-            </a:pPr>
-            <a:r>
-              <a:rPr lang="en" sz="1120">
-                <a:latin typeface="Consolas"/>
-                <a:ea typeface="Consolas"/>
-                <a:cs typeface="Consolas"/>
-                <a:sym typeface="Consolas"/>
-              </a:rPr>
-              <a:t>And stood awhile in thought.</a:t>
-            </a:r>
-            <a:endParaRPr sz="1120">
-              <a:latin typeface="Consolas"/>
-              <a:ea typeface="Consolas"/>
-              <a:cs typeface="Consolas"/>
-              <a:sym typeface="Consolas"/>
-            </a:endParaRPr>
-          </a:p>
-        </p:txBody>
-      </p:sp>
-      <p:sp>
-        <p:nvSpPr>
-          <p:cNvPr id="79" name="Google Shape;79;g3ba79990f52_0_5"/>
-          <p:cNvSpPr txBox="1"/>
-          <p:nvPr/>
-        </p:nvSpPr>
-        <p:spPr>
-          <a:xfrm>
-            <a:off x="1401418" y="1465801"/>
-            <a:ext cx="2133600" cy="251100"/>
-          </a:xfrm>
-          <a:prstGeom prst="rect">
-            <a:avLst/>
-          </a:prstGeom>
-          <a:noFill/>
-          <a:ln>
-            <a:noFill/>
-          </a:ln>
-        </p:spPr>
-        <p:txBody>
-          <a:bodyPr anchorCtr="0" anchor="ctr" bIns="85325" lIns="85325" spcFirstLastPara="1" rIns="85325" wrap="square" tIns="85325">
-            <a:noAutofit/>
-          </a:bodyPr>
-          <a:lstStyle/>
-          <a:p>
-            <a:pPr indent="0" lvl="0" marL="0" marR="0" rtl="0" algn="r">
-              <a:lnSpc>
-                <a:spcPct val="100000"/>
-              </a:lnSpc>
-              <a:spcBef>
-                <a:spcPts val="0"/>
-              </a:spcBef>
-              <a:spcAft>
-                <a:spcPts val="0"/>
-              </a:spcAft>
-              <a:buClr>
-                <a:srgbClr val="000000"/>
-              </a:buClr>
-              <a:buSzPts val="1680"/>
-              <a:buFont typeface="Arial"/>
-              <a:buNone/>
-            </a:pPr>
-            <a:r>
-              <a:rPr b="1" i="0" lang="en" sz="1680" u="none" cap="none" strike="noStrike">
-                <a:solidFill>
-                  <a:srgbClr val="DCB439"/>
-                </a:solidFill>
-                <a:latin typeface="Consolas"/>
-                <a:ea typeface="Consolas"/>
-                <a:cs typeface="Consolas"/>
-                <a:sym typeface="Consolas"/>
-              </a:rPr>
-              <a:t>jabberwocky.txt</a:t>
-            </a:r>
-            <a:endParaRPr b="1" i="0" sz="1680" u="none" cap="none" strike="noStrike">
-              <a:solidFill>
-                <a:srgbClr val="DCB439"/>
-              </a:solidFill>
-              <a:latin typeface="Consolas"/>
-              <a:ea typeface="Consolas"/>
-              <a:cs typeface="Consolas"/>
-              <a:sym typeface="Consolas"/>
-            </a:endParaRPr>
-          </a:p>
-        </p:txBody>
-      </p:sp>
-      <p:sp>
-        <p:nvSpPr>
-          <p:cNvPr id="80" name="Google Shape;80;g3ba79990f52_0_5"/>
-          <p:cNvSpPr/>
-          <p:nvPr/>
-        </p:nvSpPr>
-        <p:spPr>
-          <a:xfrm>
-            <a:off x="457200" y="1417650"/>
-            <a:ext cx="3078000" cy="347400"/>
-          </a:xfrm>
-          <a:prstGeom prst="rect">
-            <a:avLst/>
-          </a:prstGeom>
-          <a:noFill/>
-          <a:ln cap="flat" cmpd="sng" w="35550">
-            <a:solidFill>
-              <a:srgbClr val="002B5B"/>
-            </a:solidFill>
-            <a:prstDash val="solid"/>
-            <a:round/>
-            <a:headEnd len="sm" w="sm" type="none"/>
-            <a:tailEnd len="sm" w="sm" type="none"/>
-          </a:ln>
-        </p:spPr>
-        <p:txBody>
-          <a:bodyPr anchorCtr="0" anchor="ctr" bIns="85325" lIns="85325" spcFirstLastPara="1" rIns="85325" wrap="square" tIns="85325">
-            <a:noAutofit/>
-          </a:bodyPr>
-          <a:lstStyle/>
-          <a:p>
-            <a:pPr indent="0" lvl="0" marL="0" marR="0" rtl="0" algn="r">
-              <a:lnSpc>
-                <a:spcPct val="100000"/>
-              </a:lnSpc>
-              <a:spcBef>
-                <a:spcPts val="0"/>
-              </a:spcBef>
-              <a:spcAft>
-                <a:spcPts val="0"/>
-              </a:spcAft>
-              <a:buClr>
-                <a:srgbClr val="000000"/>
-              </a:buClr>
-              <a:buSzPts val="1307"/>
-              <a:buFont typeface="Arial"/>
-              <a:buNone/>
-            </a:pPr>
-            <a:r>
-              <a:t/>
-            </a:r>
-            <a:endParaRPr b="0" i="0" sz="1306" u="none" cap="none" strike="noStrike">
-              <a:solidFill>
-                <a:srgbClr val="000000"/>
-              </a:solidFill>
-              <a:latin typeface="Arial"/>
-              <a:ea typeface="Arial"/>
-              <a:cs typeface="Arial"/>
-              <a:sym typeface="Arial"/>
-            </a:endParaRPr>
-          </a:p>
-        </p:txBody>
-      </p:sp>
       <p:pic>
         <p:nvPicPr>
-          <p:cNvPr id="81" name="Google Shape;81;g3ba79990f52_0_5"/>
+          <p:cNvPr id="77" name="Google Shape;77;g3b938ea6dd9_0_26"/>
           <p:cNvPicPr preferRelativeResize="0"/>
           <p:nvPr/>
         </p:nvPicPr>
-        <p:blipFill rotWithShape="1">
+        <p:blipFill>
           <a:blip r:embed="rId3">
             <a:alphaModFix/>
           </a:blip>
-          <a:srcRect b="12536" l="18278" r="18430" t="12303"/>
-          <a:stretch/>
+          <a:stretch>
+            <a:fillRect/>
+          </a:stretch>
         </p:blipFill>
         <p:spPr>
           <a:xfrm>
-            <a:off x="493859" y="1447565"/>
-            <a:ext cx="242227" cy="287648"/>
+            <a:off x="1188100" y="272038"/>
+            <a:ext cx="6767796" cy="5135563"/>
           </a:xfrm>
           <a:prstGeom prst="rect">
             <a:avLst/>
@@ -11578,6 +11742,532 @@
           </a:ln>
         </p:spPr>
       </p:pic>
+      <p:sp>
+        <p:nvSpPr>
+          <p:cNvPr id="78" name="Google Shape;78;g3b938ea6dd9_0_26"/>
+          <p:cNvSpPr/>
+          <p:nvPr/>
+        </p:nvSpPr>
+        <p:spPr>
+          <a:xfrm>
+            <a:off x="141850" y="5005700"/>
+            <a:ext cx="4103700" cy="1620300"/>
+          </a:xfrm>
+          <a:prstGeom prst="roundRect">
+            <a:avLst>
+              <a:gd fmla="val 16667" name="adj"/>
+            </a:avLst>
+          </a:prstGeom>
+          <a:solidFill>
+            <a:srgbClr val="CFE2F3"/>
+          </a:solidFill>
+          <a:ln>
+            <a:noFill/>
+          </a:ln>
+        </p:spPr>
+        <p:txBody>
+          <a:bodyPr anchorCtr="0" anchor="ctr" bIns="91425" lIns="91425" spcFirstLastPara="1" rIns="91425" wrap="square" tIns="91425">
+            <a:noAutofit/>
+          </a:bodyPr>
+          <a:lstStyle/>
+          <a:p>
+            <a:pPr indent="0" lvl="0" marL="0" rtl="0" algn="ctr">
+              <a:spcBef>
+                <a:spcPts val="0"/>
+              </a:spcBef>
+              <a:spcAft>
+                <a:spcPts val="0"/>
+              </a:spcAft>
+              <a:buNone/>
+            </a:pPr>
+            <a:r>
+              <a:t/>
+            </a:r>
+            <a:endParaRPr sz="1000"/>
+          </a:p>
+        </p:txBody>
+      </p:sp>
+      <p:sp>
+        <p:nvSpPr>
+          <p:cNvPr id="79" name="Google Shape;79;g3b938ea6dd9_0_26"/>
+          <p:cNvSpPr/>
+          <p:nvPr/>
+        </p:nvSpPr>
+        <p:spPr>
+          <a:xfrm>
+            <a:off x="1967900" y="4527075"/>
+            <a:ext cx="449400" cy="188700"/>
+          </a:xfrm>
+          <a:prstGeom prst="rect">
+            <a:avLst/>
+          </a:prstGeom>
+          <a:solidFill>
+            <a:schemeClr val="lt1"/>
+          </a:solidFill>
+          <a:ln cap="flat" cmpd="sng" w="9525">
+            <a:solidFill>
+              <a:schemeClr val="lt1"/>
+            </a:solidFill>
+            <a:prstDash val="solid"/>
+            <a:round/>
+            <a:headEnd len="sm" w="sm" type="none"/>
+            <a:tailEnd len="sm" w="sm" type="none"/>
+          </a:ln>
+        </p:spPr>
+        <p:txBody>
+          <a:bodyPr anchorCtr="0" anchor="ctr" bIns="91425" lIns="91425" spcFirstLastPara="1" rIns="91425" wrap="square" tIns="91425">
+            <a:noAutofit/>
+          </a:bodyPr>
+          <a:lstStyle/>
+          <a:p>
+            <a:pPr indent="0" lvl="0" marL="0" rtl="0" algn="ctr">
+              <a:spcBef>
+                <a:spcPts val="0"/>
+              </a:spcBef>
+              <a:spcAft>
+                <a:spcPts val="0"/>
+              </a:spcAft>
+              <a:buNone/>
+            </a:pPr>
+            <a:r>
+              <a:t/>
+            </a:r>
+            <a:endParaRPr/>
+          </a:p>
+        </p:txBody>
+      </p:sp>
+      <p:sp>
+        <p:nvSpPr>
+          <p:cNvPr id="80" name="Google Shape;80;g3b938ea6dd9_0_26"/>
+          <p:cNvSpPr/>
+          <p:nvPr/>
+        </p:nvSpPr>
+        <p:spPr>
+          <a:xfrm>
+            <a:off x="1699450" y="5124463"/>
+            <a:ext cx="988500" cy="305400"/>
+          </a:xfrm>
+          <a:prstGeom prst="roundRect">
+            <a:avLst>
+              <a:gd fmla="val 16667" name="adj"/>
+            </a:avLst>
+          </a:prstGeom>
+          <a:solidFill>
+            <a:srgbClr val="ABFF95"/>
+          </a:solidFill>
+          <a:ln cap="flat" cmpd="sng" w="9525">
+            <a:solidFill>
+              <a:schemeClr val="dk1"/>
+            </a:solidFill>
+            <a:prstDash val="solid"/>
+            <a:round/>
+            <a:headEnd len="sm" w="sm" type="none"/>
+            <a:tailEnd len="sm" w="sm" type="none"/>
+          </a:ln>
+        </p:spPr>
+        <p:txBody>
+          <a:bodyPr anchorCtr="0" anchor="ctr" bIns="91425" lIns="91425" spcFirstLastPara="1" rIns="91425" wrap="square" tIns="91425">
+            <a:noAutofit/>
+          </a:bodyPr>
+          <a:lstStyle/>
+          <a:p>
+            <a:pPr indent="0" lvl="0" marL="0" rtl="0" algn="ctr">
+              <a:spcBef>
+                <a:spcPts val="0"/>
+              </a:spcBef>
+              <a:spcAft>
+                <a:spcPts val="0"/>
+              </a:spcAft>
+              <a:buNone/>
+            </a:pPr>
+            <a:r>
+              <a:rPr lang="en" sz="1000"/>
+              <a:t>Embeddings</a:t>
+            </a:r>
+            <a:endParaRPr sz="1000"/>
+          </a:p>
+        </p:txBody>
+      </p:sp>
+      <p:cxnSp>
+        <p:nvCxnSpPr>
+          <p:cNvPr id="81" name="Google Shape;81;g3b938ea6dd9_0_26"/>
+          <p:cNvCxnSpPr>
+            <a:stCxn id="80" idx="0"/>
+          </p:cNvCxnSpPr>
+          <p:nvPr/>
+        </p:nvCxnSpPr>
+        <p:spPr>
+          <a:xfrm flipH="1" rot="10800000">
+            <a:off x="2193700" y="4326163"/>
+            <a:ext cx="600" cy="798300"/>
+          </a:xfrm>
+          <a:prstGeom prst="straightConnector1">
+            <a:avLst/>
+          </a:prstGeom>
+          <a:noFill/>
+          <a:ln cap="flat" cmpd="sng" w="19050">
+            <a:solidFill>
+              <a:schemeClr val="dk2"/>
+            </a:solidFill>
+            <a:prstDash val="solid"/>
+            <a:round/>
+            <a:headEnd len="med" w="med" type="none"/>
+            <a:tailEnd len="med" w="med" type="none"/>
+          </a:ln>
+        </p:spPr>
+      </p:cxnSp>
+      <p:sp>
+        <p:nvSpPr>
+          <p:cNvPr id="82" name="Google Shape;82;g3b938ea6dd9_0_26"/>
+          <p:cNvSpPr/>
+          <p:nvPr/>
+        </p:nvSpPr>
+        <p:spPr>
+          <a:xfrm>
+            <a:off x="1699450" y="5623075"/>
+            <a:ext cx="988500" cy="305400"/>
+          </a:xfrm>
+          <a:prstGeom prst="roundRect">
+            <a:avLst>
+              <a:gd fmla="val 16667" name="adj"/>
+            </a:avLst>
+          </a:prstGeom>
+          <a:solidFill>
+            <a:srgbClr val="FFF995"/>
+          </a:solidFill>
+          <a:ln cap="flat" cmpd="sng" w="9525">
+            <a:solidFill>
+              <a:schemeClr val="dk1"/>
+            </a:solidFill>
+            <a:prstDash val="solid"/>
+            <a:round/>
+            <a:headEnd len="sm" w="sm" type="none"/>
+            <a:tailEnd len="sm" w="sm" type="none"/>
+          </a:ln>
+        </p:spPr>
+        <p:txBody>
+          <a:bodyPr anchorCtr="0" anchor="ctr" bIns="91425" lIns="91425" spcFirstLastPara="1" rIns="91425" wrap="square" tIns="91425">
+            <a:noAutofit/>
+          </a:bodyPr>
+          <a:lstStyle/>
+          <a:p>
+            <a:pPr indent="0" lvl="0" marL="0" rtl="0" algn="ctr">
+              <a:spcBef>
+                <a:spcPts val="0"/>
+              </a:spcBef>
+              <a:spcAft>
+                <a:spcPts val="0"/>
+              </a:spcAft>
+              <a:buNone/>
+            </a:pPr>
+            <a:r>
+              <a:rPr lang="en" sz="1000"/>
+              <a:t>Tokenizer</a:t>
+            </a:r>
+            <a:endParaRPr sz="1000"/>
+          </a:p>
+        </p:txBody>
+      </p:sp>
+      <p:cxnSp>
+        <p:nvCxnSpPr>
+          <p:cNvPr id="83" name="Google Shape;83;g3b938ea6dd9_0_26"/>
+          <p:cNvCxnSpPr>
+            <a:stCxn id="82" idx="0"/>
+            <a:endCxn id="80" idx="2"/>
+          </p:cNvCxnSpPr>
+          <p:nvPr/>
+        </p:nvCxnSpPr>
+        <p:spPr>
+          <a:xfrm rot="10800000">
+            <a:off x="2193700" y="5429875"/>
+            <a:ext cx="0" cy="193200"/>
+          </a:xfrm>
+          <a:prstGeom prst="straightConnector1">
+            <a:avLst/>
+          </a:prstGeom>
+          <a:noFill/>
+          <a:ln cap="flat" cmpd="sng" w="19050">
+            <a:solidFill>
+              <a:schemeClr val="dk2"/>
+            </a:solidFill>
+            <a:prstDash val="solid"/>
+            <a:round/>
+            <a:headEnd len="med" w="med" type="none"/>
+            <a:tailEnd len="med" w="med" type="none"/>
+          </a:ln>
+        </p:spPr>
+      </p:cxnSp>
+      <p:sp>
+        <p:nvSpPr>
+          <p:cNvPr id="84" name="Google Shape;84;g3b938ea6dd9_0_26"/>
+          <p:cNvSpPr txBox="1"/>
+          <p:nvPr>
+            <p:ph type="title"/>
+          </p:nvPr>
+        </p:nvSpPr>
+        <p:spPr>
+          <a:xfrm>
+            <a:off x="4935975" y="5937925"/>
+            <a:ext cx="3755100" cy="688200"/>
+          </a:xfrm>
+          <a:prstGeom prst="rect">
+            <a:avLst/>
+          </a:prstGeom>
+        </p:spPr>
+        <p:txBody>
+          <a:bodyPr anchorCtr="0" anchor="b" bIns="91425" lIns="91425" spcFirstLastPara="1" rIns="91425" wrap="square" tIns="91425">
+            <a:noAutofit/>
+          </a:bodyPr>
+          <a:lstStyle/>
+          <a:p>
+            <a:pPr indent="0" lvl="0" marL="0" rtl="0" algn="l">
+              <a:spcBef>
+                <a:spcPts val="0"/>
+              </a:spcBef>
+              <a:spcAft>
+                <a:spcPts val="0"/>
+              </a:spcAft>
+              <a:buNone/>
+            </a:pPr>
+            <a:r>
+              <a:rPr lang="en"/>
+              <a:t>Where are we?</a:t>
+            </a:r>
+            <a:endParaRPr/>
+          </a:p>
+        </p:txBody>
+      </p:sp>
+      <p:sp>
+        <p:nvSpPr>
+          <p:cNvPr id="85" name="Google Shape;85;g3b938ea6dd9_0_26"/>
+          <p:cNvSpPr/>
+          <p:nvPr/>
+        </p:nvSpPr>
+        <p:spPr>
+          <a:xfrm>
+            <a:off x="316150" y="6143950"/>
+            <a:ext cx="3755100" cy="305400"/>
+          </a:xfrm>
+          <a:prstGeom prst="roundRect">
+            <a:avLst>
+              <a:gd fmla="val 16667" name="adj"/>
+            </a:avLst>
+          </a:prstGeom>
+          <a:solidFill>
+            <a:srgbClr val="95DCFF"/>
+          </a:solidFill>
+          <a:ln cap="flat" cmpd="sng" w="9525">
+            <a:solidFill>
+              <a:schemeClr val="dk1"/>
+            </a:solidFill>
+            <a:prstDash val="solid"/>
+            <a:round/>
+            <a:headEnd len="sm" w="sm" type="none"/>
+            <a:tailEnd len="sm" w="sm" type="none"/>
+          </a:ln>
+        </p:spPr>
+        <p:txBody>
+          <a:bodyPr anchorCtr="0" anchor="ctr" bIns="91425" lIns="91425" spcFirstLastPara="1" rIns="91425" wrap="square" tIns="91425">
+            <a:noAutofit/>
+          </a:bodyPr>
+          <a:lstStyle/>
+          <a:p>
+            <a:pPr indent="0" lvl="0" marL="0" rtl="0" algn="ctr">
+              <a:spcBef>
+                <a:spcPts val="0"/>
+              </a:spcBef>
+              <a:spcAft>
+                <a:spcPts val="0"/>
+              </a:spcAft>
+              <a:buNone/>
+            </a:pPr>
+            <a:r>
+              <a:rPr lang="en" sz="1000"/>
+              <a:t>Prompt: “Please help me with my homework!!”</a:t>
+            </a:r>
+            <a:endParaRPr sz="1000"/>
+          </a:p>
+        </p:txBody>
+      </p:sp>
+      <p:cxnSp>
+        <p:nvCxnSpPr>
+          <p:cNvPr id="86" name="Google Shape;86;g3b938ea6dd9_0_26"/>
+          <p:cNvCxnSpPr>
+            <a:stCxn id="85" idx="0"/>
+            <a:endCxn id="82" idx="2"/>
+          </p:cNvCxnSpPr>
+          <p:nvPr/>
+        </p:nvCxnSpPr>
+        <p:spPr>
+          <a:xfrm rot="10800000">
+            <a:off x="2193700" y="5928550"/>
+            <a:ext cx="0" cy="215400"/>
+          </a:xfrm>
+          <a:prstGeom prst="straightConnector1">
+            <a:avLst/>
+          </a:prstGeom>
+          <a:noFill/>
+          <a:ln cap="flat" cmpd="sng" w="19050">
+            <a:solidFill>
+              <a:schemeClr val="dk2"/>
+            </a:solidFill>
+            <a:prstDash val="solid"/>
+            <a:round/>
+            <a:headEnd len="med" w="med" type="none"/>
+            <a:tailEnd len="med" w="med" type="none"/>
+          </a:ln>
+        </p:spPr>
+      </p:cxnSp>
+      <p:sp>
+        <p:nvSpPr>
+          <p:cNvPr id="87" name="Google Shape;87;g3b938ea6dd9_0_26"/>
+          <p:cNvSpPr/>
+          <p:nvPr/>
+        </p:nvSpPr>
+        <p:spPr>
+          <a:xfrm>
+            <a:off x="1919150" y="1087850"/>
+            <a:ext cx="546900" cy="188700"/>
+          </a:xfrm>
+          <a:prstGeom prst="rect">
+            <a:avLst/>
+          </a:prstGeom>
+          <a:solidFill>
+            <a:schemeClr val="lt1"/>
+          </a:solidFill>
+          <a:ln cap="flat" cmpd="sng" w="9525">
+            <a:solidFill>
+              <a:schemeClr val="lt1"/>
+            </a:solidFill>
+            <a:prstDash val="solid"/>
+            <a:round/>
+            <a:headEnd len="sm" w="sm" type="none"/>
+            <a:tailEnd len="sm" w="sm" type="none"/>
+          </a:ln>
+        </p:spPr>
+        <p:txBody>
+          <a:bodyPr anchorCtr="0" anchor="ctr" bIns="91425" lIns="91425" spcFirstLastPara="1" rIns="91425" wrap="square" tIns="91425">
+            <a:noAutofit/>
+          </a:bodyPr>
+          <a:lstStyle/>
+          <a:p>
+            <a:pPr indent="0" lvl="0" marL="0" rtl="0" algn="ctr">
+              <a:spcBef>
+                <a:spcPts val="0"/>
+              </a:spcBef>
+              <a:spcAft>
+                <a:spcPts val="0"/>
+              </a:spcAft>
+              <a:buNone/>
+            </a:pPr>
+            <a:r>
+              <a:t/>
+            </a:r>
+            <a:endParaRPr/>
+          </a:p>
+        </p:txBody>
+      </p:sp>
+      <p:sp>
+        <p:nvSpPr>
+          <p:cNvPr id="88" name="Google Shape;88;g3b938ea6dd9_0_26"/>
+          <p:cNvSpPr/>
+          <p:nvPr/>
+        </p:nvSpPr>
+        <p:spPr>
+          <a:xfrm>
+            <a:off x="646550" y="342100"/>
+            <a:ext cx="3092100" cy="934500"/>
+          </a:xfrm>
+          <a:prstGeom prst="roundRect">
+            <a:avLst>
+              <a:gd fmla="val 16667" name="adj"/>
+            </a:avLst>
+          </a:prstGeom>
+          <a:solidFill>
+            <a:srgbClr val="D9EAD3"/>
+          </a:solidFill>
+          <a:ln>
+            <a:noFill/>
+          </a:ln>
+        </p:spPr>
+        <p:txBody>
+          <a:bodyPr anchorCtr="0" anchor="ctr" bIns="91425" lIns="91425" spcFirstLastPara="1" rIns="91425" wrap="square" tIns="91425">
+            <a:noAutofit/>
+          </a:bodyPr>
+          <a:lstStyle/>
+          <a:p>
+            <a:pPr indent="0" lvl="0" marL="0" rtl="0" algn="ctr">
+              <a:spcBef>
+                <a:spcPts val="0"/>
+              </a:spcBef>
+              <a:spcAft>
+                <a:spcPts val="0"/>
+              </a:spcAft>
+              <a:buNone/>
+            </a:pPr>
+            <a:r>
+              <a:t/>
+            </a:r>
+            <a:endParaRPr sz="1000"/>
+          </a:p>
+        </p:txBody>
+      </p:sp>
+      <p:sp>
+        <p:nvSpPr>
+          <p:cNvPr id="89" name="Google Shape;89;g3b938ea6dd9_0_26"/>
+          <p:cNvSpPr/>
+          <p:nvPr/>
+        </p:nvSpPr>
+        <p:spPr>
+          <a:xfrm>
+            <a:off x="891500" y="496750"/>
+            <a:ext cx="2602200" cy="625200"/>
+          </a:xfrm>
+          <a:prstGeom prst="roundRect">
+            <a:avLst>
+              <a:gd fmla="val 16667" name="adj"/>
+            </a:avLst>
+          </a:prstGeom>
+          <a:solidFill>
+            <a:srgbClr val="ABFF95"/>
+          </a:solidFill>
+          <a:ln cap="flat" cmpd="sng" w="9525">
+            <a:solidFill>
+              <a:schemeClr val="dk1"/>
+            </a:solidFill>
+            <a:prstDash val="solid"/>
+            <a:round/>
+            <a:headEnd len="sm" w="sm" type="none"/>
+            <a:tailEnd len="sm" w="sm" type="none"/>
+          </a:ln>
+        </p:spPr>
+        <p:txBody>
+          <a:bodyPr anchorCtr="0" anchor="ctr" bIns="91425" lIns="91425" spcFirstLastPara="1" rIns="91425" wrap="square" tIns="91425">
+            <a:noAutofit/>
+          </a:bodyPr>
+          <a:lstStyle/>
+          <a:p>
+            <a:pPr indent="0" lvl="0" marL="0" rtl="0" algn="l">
+              <a:spcBef>
+                <a:spcPts val="0"/>
+              </a:spcBef>
+              <a:spcAft>
+                <a:spcPts val="0"/>
+              </a:spcAft>
+              <a:buNone/>
+            </a:pPr>
+            <a:r>
+              <a:rPr lang="en" sz="1000"/>
+              <a:t>Response</a:t>
+            </a:r>
+            <a:r>
+              <a:rPr lang="en" sz="1000"/>
+              <a:t>: “Certainly, as a large language model I’d be happy to help you cheat on your homework assignment”</a:t>
+            </a:r>
+            <a:endParaRPr sz="1000"/>
+          </a:p>
+        </p:txBody>
+      </p:sp>
     </p:spTree>
   </p:cSld>
   <p:clrMapOvr>
@@ -11591,7 +12281,7 @@
   <p:cSld>
     <p:spTree>
       <p:nvGrpSpPr>
-        <p:cNvPr id="85" name="Shape 85"/>
+        <p:cNvPr id="93" name="Shape 93"/>
         <p:cNvGrpSpPr/>
         <p:nvPr/>
       </p:nvGrpSpPr>
@@ -11605,7 +12295,7 @@
       </p:grpSpPr>
       <p:sp>
         <p:nvSpPr>
-          <p:cNvPr id="86" name="Google Shape;86;g3b8409de4d6_0_9"/>
+          <p:cNvPr id="94" name="Google Shape;94;g3b938ea6dd9_0_0"/>
           <p:cNvSpPr txBox="1"/>
           <p:nvPr>
             <p:ph type="title"/>
@@ -11637,110 +12327,6 @@
             </a:pPr>
             <a:r>
               <a:rPr lang="en"/>
-              <a:t>What is a Token</a:t>
-            </a:r>
-            <a:endParaRPr/>
-          </a:p>
-        </p:txBody>
-      </p:sp>
-      <p:sp>
-        <p:nvSpPr>
-          <p:cNvPr id="87" name="Google Shape;87;g3b8409de4d6_0_9"/>
-          <p:cNvSpPr txBox="1"/>
-          <p:nvPr>
-            <p:ph idx="1" type="body"/>
-          </p:nvPr>
-        </p:nvSpPr>
-        <p:spPr>
-          <a:xfrm>
-            <a:off x="457200" y="1600200"/>
-            <a:ext cx="8229600" cy="4967700"/>
-          </a:xfrm>
-          <a:prstGeom prst="rect">
-            <a:avLst/>
-          </a:prstGeom>
-        </p:spPr>
-        <p:txBody>
-          <a:bodyPr anchorCtr="0" anchor="t" bIns="91425" lIns="91425" spcFirstLastPara="1" rIns="91425" wrap="square" tIns="91425">
-            <a:noAutofit/>
-          </a:bodyPr>
-          <a:lstStyle/>
-          <a:p>
-            <a:pPr indent="0" lvl="0" marL="0" rtl="0" algn="l">
-              <a:spcBef>
-                <a:spcPts val="600"/>
-              </a:spcBef>
-              <a:spcAft>
-                <a:spcPts val="0"/>
-              </a:spcAft>
-              <a:buNone/>
-            </a:pPr>
-            <a:r>
-              <a:t/>
-            </a:r>
-            <a:endParaRPr/>
-          </a:p>
-        </p:txBody>
-      </p:sp>
-    </p:spTree>
-  </p:cSld>
-  <p:clrMapOvr>
-    <a:masterClrMapping/>
-  </p:clrMapOvr>
-</p:sld>
-</file>
-
-<file path=ppt/slides/slide9.xml><?xml version="1.0" encoding="utf-8"?>
-<p:sld xmlns:a="http://schemas.openxmlformats.org/drawingml/2006/main" xmlns:r="http://schemas.openxmlformats.org/officeDocument/2006/relationships" xmlns:mc="http://schemas.openxmlformats.org/markup-compatibility/2006" xmlns:mv="urn:schemas-microsoft-com:mac:vml" xmlns:p="http://schemas.openxmlformats.org/presentationml/2006/main" xmlns:c="http://schemas.openxmlformats.org/drawingml/2006/chart" xmlns:dgm="http://schemas.openxmlformats.org/drawingml/2006/diagram" xmlns:o="urn:schemas-microsoft-com:office:office" xmlns:v="urn:schemas-microsoft-com:vml" xmlns:pvml="urn:schemas-microsoft-com:office:powerpoint" xmlns:com="http://schemas.openxmlformats.org/drawingml/2006/compatibility" xmlns:p14="http://schemas.microsoft.com/office/powerpoint/2010/main" xmlns:p15="http://schemas.microsoft.com/office/powerpoint/2012/main" xmlns:ahyp="http://schemas.microsoft.com/office/drawing/2018/hyperlinkcolor">
-  <p:cSld>
-    <p:spTree>
-      <p:nvGrpSpPr>
-        <p:cNvPr id="91" name="Shape 91"/>
-        <p:cNvGrpSpPr/>
-        <p:nvPr/>
-      </p:nvGrpSpPr>
-      <p:grpSpPr>
-        <a:xfrm>
-          <a:off x="0" y="0"/>
-          <a:ext cx="0" cy="0"/>
-          <a:chOff x="0" y="0"/>
-          <a:chExt cx="0" cy="0"/>
-        </a:xfrm>
-      </p:grpSpPr>
-      <p:sp>
-        <p:nvSpPr>
-          <p:cNvPr id="92" name="Google Shape;92;g3b8409de4d6_0_14"/>
-          <p:cNvSpPr txBox="1"/>
-          <p:nvPr>
-            <p:ph type="title"/>
-          </p:nvPr>
-        </p:nvSpPr>
-        <p:spPr>
-          <a:xfrm>
-            <a:off x="457200" y="274638"/>
-            <a:ext cx="8229600" cy="1143000"/>
-          </a:xfrm>
-          <a:prstGeom prst="rect">
-            <a:avLst/>
-          </a:prstGeom>
-        </p:spPr>
-        <p:txBody>
-          <a:bodyPr anchorCtr="0" anchor="b" bIns="91425" lIns="91425" spcFirstLastPara="1" rIns="91425" wrap="square" tIns="91425">
-            <a:noAutofit/>
-          </a:bodyPr>
-          <a:lstStyle/>
-          <a:p>
-            <a:pPr indent="0" lvl="0" marL="0" rtl="0" algn="l">
-              <a:spcBef>
-                <a:spcPts val="0"/>
-              </a:spcBef>
-              <a:spcAft>
-                <a:spcPts val="0"/>
-              </a:spcAft>
-              <a:buNone/>
-            </a:pPr>
-            <a:r>
-              <a:rPr lang="en"/>
               <a:t>Tokens Today — OpenAI API</a:t>
             </a:r>
             <a:endParaRPr/>
@@ -11749,7 +12335,7 @@
       </p:sp>
       <p:pic>
         <p:nvPicPr>
-          <p:cNvPr id="93" name="Google Shape;93;g3b8409de4d6_0_14" title="Screenshot 2026-01-15 at 3.42.24 PM.png"/>
+          <p:cNvPr id="95" name="Google Shape;95;g3b938ea6dd9_0_0" title="Screenshot 2026-01-15 at 3.42.24 PM.png"/>
           <p:cNvPicPr preferRelativeResize="0"/>
           <p:nvPr/>
         </p:nvPicPr>
@@ -11777,7 +12363,7 @@
       </p:pic>
       <p:sp>
         <p:nvSpPr>
-          <p:cNvPr id="94" name="Google Shape;94;g3b8409de4d6_0_14"/>
+          <p:cNvPr id="96" name="Google Shape;96;g3b938ea6dd9_0_0"/>
           <p:cNvSpPr txBox="1"/>
           <p:nvPr/>
         </p:nvSpPr>
@@ -11853,6 +12439,99 @@
           </a:p>
         </p:txBody>
       </p:sp>
+    </p:spTree>
+  </p:cSld>
+  <p:clrMapOvr>
+    <a:masterClrMapping/>
+  </p:clrMapOvr>
+</p:sld>
+</file>
+
+<file path=ppt/slides/slide9.xml><?xml version="1.0" encoding="utf-8"?>
+<p:sld xmlns:a="http://schemas.openxmlformats.org/drawingml/2006/main" xmlns:r="http://schemas.openxmlformats.org/officeDocument/2006/relationships" xmlns:mc="http://schemas.openxmlformats.org/markup-compatibility/2006" xmlns:mv="urn:schemas-microsoft-com:mac:vml" xmlns:p="http://schemas.openxmlformats.org/presentationml/2006/main" xmlns:c="http://schemas.openxmlformats.org/drawingml/2006/chart" xmlns:dgm="http://schemas.openxmlformats.org/drawingml/2006/diagram" xmlns:o="urn:schemas-microsoft-com:office:office" xmlns:v="urn:schemas-microsoft-com:vml" xmlns:pvml="urn:schemas-microsoft-com:office:powerpoint" xmlns:com="http://schemas.openxmlformats.org/drawingml/2006/compatibility" xmlns:p14="http://schemas.microsoft.com/office/powerpoint/2010/main" xmlns:p15="http://schemas.microsoft.com/office/powerpoint/2012/main" xmlns:ahyp="http://schemas.microsoft.com/office/drawing/2018/hyperlinkcolor">
+  <p:cSld>
+    <p:spTree>
+      <p:nvGrpSpPr>
+        <p:cNvPr id="100" name="Shape 100"/>
+        <p:cNvGrpSpPr/>
+        <p:nvPr/>
+      </p:nvGrpSpPr>
+      <p:grpSpPr>
+        <a:xfrm>
+          <a:off x="0" y="0"/>
+          <a:ext cx="0" cy="0"/>
+          <a:chOff x="0" y="0"/>
+          <a:chExt cx="0" cy="0"/>
+        </a:xfrm>
+      </p:grpSpPr>
+      <p:sp>
+        <p:nvSpPr>
+          <p:cNvPr id="101" name="Google Shape;101;g3b938ea6dd9_0_6"/>
+          <p:cNvSpPr txBox="1"/>
+          <p:nvPr>
+            <p:ph type="title"/>
+          </p:nvPr>
+        </p:nvSpPr>
+        <p:spPr>
+          <a:xfrm>
+            <a:off x="457200" y="274638"/>
+            <a:ext cx="8229600" cy="1143000"/>
+          </a:xfrm>
+          <a:prstGeom prst="rect">
+            <a:avLst/>
+          </a:prstGeom>
+        </p:spPr>
+        <p:txBody>
+          <a:bodyPr anchorCtr="0" anchor="b" bIns="91425" lIns="91425" spcFirstLastPara="1" rIns="91425" wrap="square" tIns="91425">
+            <a:noAutofit/>
+          </a:bodyPr>
+          <a:lstStyle/>
+          <a:p>
+            <a:pPr indent="0" lvl="0" marL="0" rtl="0" algn="l">
+              <a:spcBef>
+                <a:spcPts val="0"/>
+              </a:spcBef>
+              <a:spcAft>
+                <a:spcPts val="0"/>
+              </a:spcAft>
+              <a:buNone/>
+            </a:pPr>
+            <a:r>
+              <a:rPr lang="en"/>
+              <a:t>Tokens Today — Anthropic API</a:t>
+            </a:r>
+            <a:endParaRPr/>
+          </a:p>
+        </p:txBody>
+      </p:sp>
+      <p:pic>
+        <p:nvPicPr>
+          <p:cNvPr id="102" name="Google Shape;102;g3b938ea6dd9_0_6" title="Screenshot 2026-01-15 at 3.43.15 PM.png"/>
+          <p:cNvPicPr preferRelativeResize="0"/>
+          <p:nvPr/>
+        </p:nvPicPr>
+        <p:blipFill>
+          <a:blip r:embed="rId3">
+            <a:alphaModFix/>
+          </a:blip>
+          <a:stretch>
+            <a:fillRect/>
+          </a:stretch>
+        </p:blipFill>
+        <p:spPr>
+          <a:xfrm>
+            <a:off x="540650" y="1551799"/>
+            <a:ext cx="8062699" cy="5115250"/>
+          </a:xfrm>
+          <a:prstGeom prst="rect">
+            <a:avLst/>
+          </a:prstGeom>
+          <a:noFill/>
+          <a:ln>
+            <a:noFill/>
+          </a:ln>
+        </p:spPr>
+      </p:pic>
     </p:spTree>
   </p:cSld>
   <p:clrMapOvr>

</xml_diff>

<commit_message>
Trying to update powerpoint?
</commit_message>
<xml_diff>
--- a/Blank/Lecture_03_ Tokenization.pptx
+++ b/Blank/Lecture_03_ Tokenization.pptx
@@ -265,7 +265,7 @@
   </p:defaultTextStyle>
   <p:extLst>
     <p:ext uri="GoogleSlidesCustomDataVersion2">
-      <go:slidesCustomData xmlns:go="http://customooxmlschemas.google.com/" r:id="rId28" roundtripDataSignature="AMtx7mjujfq3vujPPNzkxA1DTADXdiakew=="/>
+      <go:slidesCustomData xmlns:go="http://customooxmlschemas.google.com/" r:id="rId28" roundtripDataSignature="AMtx7mgTAqUK2jDlIVNpNW/mkDxBuJKBZg=="/>
     </p:ext>
   </p:extLst>
 </p:presentation>
@@ -2340,7 +2340,7 @@
   <p:cSld>
     <p:spTree>
       <p:nvGrpSpPr>
-        <p:cNvPr id="202" name="Shape 202"/>
+        <p:cNvPr id="203" name="Shape 203"/>
         <p:cNvGrpSpPr/>
         <p:nvPr/>
       </p:nvGrpSpPr>
@@ -2354,7 +2354,7 @@
       </p:grpSpPr>
       <p:sp>
         <p:nvSpPr>
-          <p:cNvPr id="203" name="Google Shape;203;g3b8409de4d6_0_108:notes"/>
+          <p:cNvPr id="204" name="Google Shape;204;g3b8409de4d6_0_108:notes"/>
           <p:cNvSpPr/>
           <p:nvPr>
             <p:ph idx="2" type="sldImg"/>
@@ -2389,7 +2389,7 @@
       </p:sp>
       <p:sp>
         <p:nvSpPr>
-          <p:cNvPr id="204" name="Google Shape;204;g3b8409de4d6_0_108:notes"/>
+          <p:cNvPr id="205" name="Google Shape;205;g3b8409de4d6_0_108:notes"/>
           <p:cNvSpPr txBox="1"/>
           <p:nvPr>
             <p:ph idx="1" type="body"/>
@@ -11784,7 +11784,7 @@
         <p:spPr>
           <a:xfrm>
             <a:off x="457200" y="1600200"/>
-            <a:ext cx="8229600" cy="4967700"/>
+            <a:ext cx="8229600" cy="988200"/>
           </a:xfrm>
           <a:prstGeom prst="rect">
             <a:avLst/>
@@ -11857,6 +11857,131 @@
               <a:t/>
             </a:r>
             <a:endParaRPr/>
+          </a:p>
+        </p:txBody>
+      </p:sp>
+      <p:sp>
+        <p:nvSpPr>
+          <p:cNvPr id="202" name="Google Shape;202;g3b938ea6dd9_0_93"/>
+          <p:cNvSpPr txBox="1"/>
+          <p:nvPr/>
+        </p:nvSpPr>
+        <p:spPr>
+          <a:xfrm>
+            <a:off x="457200" y="2588400"/>
+            <a:ext cx="8229600" cy="3855000"/>
+          </a:xfrm>
+          <a:prstGeom prst="rect">
+            <a:avLst/>
+          </a:prstGeom>
+          <a:noFill/>
+          <a:ln>
+            <a:noFill/>
+          </a:ln>
+        </p:spPr>
+        <p:txBody>
+          <a:bodyPr anchorCtr="0" anchor="t" bIns="91425" lIns="91425" spcFirstLastPara="1" rIns="91425" wrap="square" tIns="91425">
+            <a:noAutofit/>
+          </a:bodyPr>
+          <a:lstStyle/>
+          <a:p>
+            <a:pPr indent="0" lvl="0" marL="0" rtl="0" algn="l">
+              <a:spcBef>
+                <a:spcPts val="0"/>
+              </a:spcBef>
+              <a:spcAft>
+                <a:spcPts val="0"/>
+              </a:spcAft>
+              <a:buNone/>
+            </a:pPr>
+            <a:r>
+              <a:rPr b="1" lang="en" sz="3000">
+                <a:solidFill>
+                  <a:srgbClr val="002B5B"/>
+                </a:solidFill>
+              </a:rPr>
+              <a:t>BPE</a:t>
+            </a:r>
+            <a:r>
+              <a:rPr lang="en" sz="3000">
+                <a:solidFill>
+                  <a:schemeClr val="dk1"/>
+                </a:solidFill>
+              </a:rPr>
+              <a:t> is excellent at breaking down words statistically, but </a:t>
+            </a:r>
+            <a:r>
+              <a:rPr b="1" lang="en" sz="3000">
+                <a:solidFill>
+                  <a:srgbClr val="A31415"/>
+                </a:solidFill>
+              </a:rPr>
+              <a:t>it can make suboptimal merges</a:t>
+            </a:r>
+            <a:r>
+              <a:rPr lang="en" sz="3000">
+                <a:solidFill>
+                  <a:schemeClr val="dk1"/>
+                </a:solidFill>
+              </a:rPr>
+              <a:t> like combining punctuation with words. </a:t>
+            </a:r>
+            <a:endParaRPr sz="3000">
+              <a:solidFill>
+                <a:schemeClr val="dk1"/>
+              </a:solidFill>
+            </a:endParaRPr>
+          </a:p>
+          <a:p>
+            <a:pPr indent="0" lvl="0" marL="0" rtl="0" algn="l">
+              <a:spcBef>
+                <a:spcPts val="0"/>
+              </a:spcBef>
+              <a:spcAft>
+                <a:spcPts val="0"/>
+              </a:spcAft>
+              <a:buNone/>
+            </a:pPr>
+            <a:r>
+              <a:t/>
+            </a:r>
+            <a:endParaRPr sz="3000">
+              <a:solidFill>
+                <a:schemeClr val="dk1"/>
+              </a:solidFill>
+            </a:endParaRPr>
+          </a:p>
+          <a:p>
+            <a:pPr indent="0" lvl="0" marL="0" rtl="0" algn="l">
+              <a:spcBef>
+                <a:spcPts val="0"/>
+              </a:spcBef>
+              <a:spcAft>
+                <a:spcPts val="0"/>
+              </a:spcAft>
+              <a:buNone/>
+            </a:pPr>
+            <a:r>
+              <a:rPr b="1" lang="en" sz="3000">
+                <a:solidFill>
+                  <a:srgbClr val="465510"/>
+                </a:solidFill>
+              </a:rPr>
+              <a:t>Regex acts as a "pre-filter"</a:t>
+            </a:r>
+            <a:r>
+              <a:rPr lang="en" sz="3000">
+                <a:solidFill>
+                  <a:schemeClr val="dk1"/>
+                </a:solidFill>
+              </a:rPr>
+              <a:t> to prevent these issues, ensuring that letters, numbers, punctuation, and whitespace split.</a:t>
+            </a:r>
+            <a:endParaRPr sz="3000">
+              <a:solidFill>
+                <a:schemeClr val="dk1"/>
+              </a:solidFill>
+            </a:endParaRPr>
           </a:p>
         </p:txBody>
       </p:sp>
@@ -11873,7 +11998,7 @@
   <p:cSld>
     <p:spTree>
       <p:nvGrpSpPr>
-        <p:cNvPr id="205" name="Shape 205"/>
+        <p:cNvPr id="206" name="Shape 206"/>
         <p:cNvGrpSpPr/>
         <p:nvPr/>
       </p:nvGrpSpPr>
@@ -11887,7 +12012,7 @@
       </p:grpSpPr>
       <p:sp>
         <p:nvSpPr>
-          <p:cNvPr id="206" name="Google Shape;206;g3b8409de4d6_0_108"/>
+          <p:cNvPr id="207" name="Google Shape;207;g3b8409de4d6_0_108"/>
           <p:cNvSpPr txBox="1"/>
           <p:nvPr>
             <p:ph type="title"/>
@@ -11927,7 +12052,7 @@
       </p:sp>
       <p:sp>
         <p:nvSpPr>
-          <p:cNvPr id="207" name="Google Shape;207;g3b8409de4d6_0_108"/>
+          <p:cNvPr id="208" name="Google Shape;208;g3b8409de4d6_0_108"/>
           <p:cNvSpPr txBox="1"/>
           <p:nvPr>
             <p:ph idx="1" type="body"/>

</xml_diff>